<commit_message>
Slides_3.pptx updated (not complete)
</commit_message>
<xml_diff>
--- a/Slides_3.pptx
+++ b/Slides_3.pptx
@@ -5,11 +5,12 @@
     <p:sldMasterId id="2147483648" r:id="rId1"/>
   </p:sldMasterIdLst>
   <p:notesMasterIdLst>
-    <p:notesMasterId r:id="rId4"/>
+    <p:notesMasterId r:id="rId5"/>
   </p:notesMasterIdLst>
   <p:sldIdLst>
     <p:sldId id="332" r:id="rId2"/>
     <p:sldId id="256" r:id="rId3"/>
+    <p:sldId id="333" r:id="rId4"/>
   </p:sldIdLst>
   <p:sldSz cx="12192000" cy="6858000"/>
   <p:notesSz cx="6858000" cy="9144000"/>
@@ -463,6 +464,93 @@
     </a:lvl9pPr>
   </p:notesStyle>
 </p:notesMaster>
+</file>
+
+<file path=ppt/notesSlides/notesSlide1.xml><?xml version="1.0" encoding="utf-8"?>
+<p:notes xmlns:a="http://schemas.openxmlformats.org/drawingml/2006/main" xmlns:r="http://schemas.openxmlformats.org/officeDocument/2006/relationships" xmlns:p="http://schemas.openxmlformats.org/presentationml/2006/main">
+  <p:cSld>
+    <p:spTree>
+      <p:nvGrpSpPr>
+        <p:cNvPr id="1" name=""/>
+        <p:cNvGrpSpPr/>
+        <p:nvPr/>
+      </p:nvGrpSpPr>
+      <p:grpSpPr>
+        <a:xfrm>
+          <a:off x="0" y="0"/>
+          <a:ext cx="0" cy="0"/>
+          <a:chOff x="0" y="0"/>
+          <a:chExt cx="0" cy="0"/>
+        </a:xfrm>
+      </p:grpSpPr>
+      <p:sp>
+        <p:nvSpPr>
+          <p:cNvPr id="2" name="Slide Image Placeholder 1"/>
+          <p:cNvSpPr>
+            <a:spLocks noGrp="1" noRot="1" noChangeAspect="1"/>
+          </p:cNvSpPr>
+          <p:nvPr>
+            <p:ph type="sldImg"/>
+          </p:nvPr>
+        </p:nvSpPr>
+        <p:spPr/>
+      </p:sp>
+      <p:sp>
+        <p:nvSpPr>
+          <p:cNvPr id="3" name="Notes Placeholder 2"/>
+          <p:cNvSpPr>
+            <a:spLocks noGrp="1"/>
+          </p:cNvSpPr>
+          <p:nvPr>
+            <p:ph type="body" idx="1"/>
+          </p:nvPr>
+        </p:nvSpPr>
+        <p:spPr/>
+        <p:txBody>
+          <a:bodyPr/>
+          <a:lstStyle/>
+          <a:p>
+            <a:r>
+              <a:rPr lang="fr-FR" dirty="0"/>
+              <a:t>Lien vers l’article : https://arxiv.org/abs/2007.01547</a:t>
+            </a:r>
+          </a:p>
+        </p:txBody>
+      </p:sp>
+      <p:sp>
+        <p:nvSpPr>
+          <p:cNvPr id="4" name="Slide Number Placeholder 3"/>
+          <p:cNvSpPr>
+            <a:spLocks noGrp="1"/>
+          </p:cNvSpPr>
+          <p:nvPr>
+            <p:ph type="sldNum" sz="quarter" idx="5"/>
+          </p:nvPr>
+        </p:nvSpPr>
+        <p:spPr/>
+        <p:txBody>
+          <a:bodyPr/>
+          <a:lstStyle/>
+          <a:p>
+            <a:fld id="{B2732108-1823-42F2-979D-D6CF9D74D210}" type="slidenum">
+              <a:rPr lang="en-US" smtClean="0"/>
+              <a:t>3</a:t>
+            </a:fld>
+            <a:endParaRPr lang="en-US"/>
+          </a:p>
+        </p:txBody>
+      </p:sp>
+    </p:spTree>
+    <p:extLst>
+      <p:ext uri="{BB962C8B-B14F-4D97-AF65-F5344CB8AC3E}">
+        <p14:creationId xmlns:p14="http://schemas.microsoft.com/office/powerpoint/2010/main" val="544247630"/>
+      </p:ext>
+    </p:extLst>
+  </p:cSld>
+  <p:clrMapOvr>
+    <a:masterClrMapping/>
+  </p:clrMapOvr>
+</p:notes>
 </file>
 
 <file path=ppt/slideLayouts/slideLayout1.xml><?xml version="1.0" encoding="utf-8"?>
@@ -3697,12 +3785,14 @@
         </p:nvSpPr>
         <p:spPr/>
         <p:txBody>
-          <a:bodyPr/>
+          <a:bodyPr>
+            <a:normAutofit fontScale="90000"/>
+          </a:bodyPr>
           <a:lstStyle/>
           <a:p>
             <a:r>
               <a:rPr lang="en-US" dirty="0"/>
-              <a:t>Types of problems and associated losses</a:t>
+              <a:t>Optimizers’ review, types of problems and associated losses</a:t>
             </a:r>
           </a:p>
         </p:txBody>
@@ -3818,7 +3908,7 @@
         <p:spPr/>
         <p:txBody>
           <a:bodyPr>
-            <a:normAutofit/>
+            <a:normAutofit lnSpcReduction="10000"/>
           </a:bodyPr>
           <a:lstStyle/>
           <a:p>
@@ -3860,7 +3950,36 @@
               </a:rPr>
               <a:t>to reduce the loss.</a:t>
             </a:r>
-            <a:endParaRPr lang="en-US" dirty="0"/>
+          </a:p>
+          <a:p>
+            <a:pPr algn="just"/>
+            <a:r>
+              <a:rPr lang="en-US" dirty="0"/>
+              <a:t>Choosing the optimizer is considered to be among the most crucial design decisions in deep learning (reminder: we consider the optimizer as a hyperparameter (and similarly its parameters (</a:t>
+            </a:r>
+            <a:r>
+              <a:rPr lang="en-US" dirty="0" err="1"/>
+              <a:t>learning_rate</a:t>
+            </a:r>
+            <a:r>
+              <a:rPr lang="en-US" dirty="0"/>
+              <a:t>, </a:t>
+            </a:r>
+            <a:r>
+              <a:rPr lang="en-US" dirty="0" err="1"/>
+              <a:t>etc</a:t>
+            </a:r>
+            <a:r>
+              <a:rPr lang="en-US" dirty="0"/>
+              <a:t> …) are considered as hyperparameters)).</a:t>
+            </a:r>
+          </a:p>
+          <a:p>
+            <a:pPr algn="just"/>
+            <a:r>
+              <a:rPr lang="en-US" dirty="0"/>
+              <a:t>But the growing literature now lists hundreds of optimization methods.</a:t>
+            </a:r>
           </a:p>
         </p:txBody>
       </p:sp>
@@ -3874,6 +3993,398 @@
   <p:clrMapOvr>
     <a:masterClrMapping/>
   </p:clrMapOvr>
+  <p:timing>
+    <p:tnLst>
+      <p:par>
+        <p:cTn id="1" dur="indefinite" restart="never" nodeType="tmRoot">
+          <p:childTnLst>
+            <p:seq concurrent="1" nextAc="seek">
+              <p:cTn id="2" dur="indefinite" nodeType="mainSeq">
+                <p:childTnLst>
+                  <p:par>
+                    <p:cTn id="3" fill="hold">
+                      <p:stCondLst>
+                        <p:cond delay="indefinite"/>
+                      </p:stCondLst>
+                      <p:childTnLst>
+                        <p:par>
+                          <p:cTn id="4" fill="hold">
+                            <p:stCondLst>
+                              <p:cond delay="0"/>
+                            </p:stCondLst>
+                            <p:childTnLst>
+                              <p:par>
+                                <p:cTn id="5" presetID="10" presetClass="entr" presetSubtype="0" fill="hold" nodeType="clickEffect">
+                                  <p:stCondLst>
+                                    <p:cond delay="0"/>
+                                  </p:stCondLst>
+                                  <p:childTnLst>
+                                    <p:set>
+                                      <p:cBhvr>
+                                        <p:cTn id="6" dur="1" fill="hold">
+                                          <p:stCondLst>
+                                            <p:cond delay="0"/>
+                                          </p:stCondLst>
+                                        </p:cTn>
+                                        <p:tgtEl>
+                                          <p:spTgt spid="6">
+                                            <p:txEl>
+                                              <p:pRg st="3" end="3"/>
+                                            </p:txEl>
+                                          </p:spTgt>
+                                        </p:tgtEl>
+                                        <p:attrNameLst>
+                                          <p:attrName>style.visibility</p:attrName>
+                                        </p:attrNameLst>
+                                      </p:cBhvr>
+                                      <p:to>
+                                        <p:strVal val="visible"/>
+                                      </p:to>
+                                    </p:set>
+                                    <p:animEffect transition="in" filter="fade">
+                                      <p:cBhvr>
+                                        <p:cTn id="7" dur="500"/>
+                                        <p:tgtEl>
+                                          <p:spTgt spid="6">
+                                            <p:txEl>
+                                              <p:pRg st="3" end="3"/>
+                                            </p:txEl>
+                                          </p:spTgt>
+                                        </p:tgtEl>
+                                      </p:cBhvr>
+                                    </p:animEffect>
+                                  </p:childTnLst>
+                                </p:cTn>
+                              </p:par>
+                            </p:childTnLst>
+                          </p:cTn>
+                        </p:par>
+                      </p:childTnLst>
+                    </p:cTn>
+                  </p:par>
+                  <p:par>
+                    <p:cTn id="8" fill="hold">
+                      <p:stCondLst>
+                        <p:cond delay="indefinite"/>
+                      </p:stCondLst>
+                      <p:childTnLst>
+                        <p:par>
+                          <p:cTn id="9" fill="hold">
+                            <p:stCondLst>
+                              <p:cond delay="0"/>
+                            </p:stCondLst>
+                            <p:childTnLst>
+                              <p:par>
+                                <p:cTn id="10" presetID="10" presetClass="entr" presetSubtype="0" fill="hold" nodeType="clickEffect">
+                                  <p:stCondLst>
+                                    <p:cond delay="0"/>
+                                  </p:stCondLst>
+                                  <p:childTnLst>
+                                    <p:set>
+                                      <p:cBhvr>
+                                        <p:cTn id="11" dur="1" fill="hold">
+                                          <p:stCondLst>
+                                            <p:cond delay="0"/>
+                                          </p:stCondLst>
+                                        </p:cTn>
+                                        <p:tgtEl>
+                                          <p:spTgt spid="6">
+                                            <p:txEl>
+                                              <p:pRg st="4" end="4"/>
+                                            </p:txEl>
+                                          </p:spTgt>
+                                        </p:tgtEl>
+                                        <p:attrNameLst>
+                                          <p:attrName>style.visibility</p:attrName>
+                                        </p:attrNameLst>
+                                      </p:cBhvr>
+                                      <p:to>
+                                        <p:strVal val="visible"/>
+                                      </p:to>
+                                    </p:set>
+                                    <p:animEffect transition="in" filter="fade">
+                                      <p:cBhvr>
+                                        <p:cTn id="12" dur="500"/>
+                                        <p:tgtEl>
+                                          <p:spTgt spid="6">
+                                            <p:txEl>
+                                              <p:pRg st="4" end="4"/>
+                                            </p:txEl>
+                                          </p:spTgt>
+                                        </p:tgtEl>
+                                      </p:cBhvr>
+                                    </p:animEffect>
+                                  </p:childTnLst>
+                                </p:cTn>
+                              </p:par>
+                            </p:childTnLst>
+                          </p:cTn>
+                        </p:par>
+                      </p:childTnLst>
+                    </p:cTn>
+                  </p:par>
+                </p:childTnLst>
+              </p:cTn>
+              <p:prevCondLst>
+                <p:cond evt="onPrev" delay="0">
+                  <p:tgtEl>
+                    <p:sldTgt/>
+                  </p:tgtEl>
+                </p:cond>
+              </p:prevCondLst>
+              <p:nextCondLst>
+                <p:cond evt="onNext" delay="0">
+                  <p:tgtEl>
+                    <p:sldTgt/>
+                  </p:tgtEl>
+                </p:cond>
+              </p:nextCondLst>
+            </p:seq>
+          </p:childTnLst>
+        </p:cTn>
+      </p:par>
+    </p:tnLst>
+  </p:timing>
+</p:sld>
+</file>
+
+<file path=ppt/slides/slide3.xml><?xml version="1.0" encoding="utf-8"?>
+<p:sld xmlns:a="http://schemas.openxmlformats.org/drawingml/2006/main" xmlns:r="http://schemas.openxmlformats.org/officeDocument/2006/relationships" xmlns:p="http://schemas.openxmlformats.org/presentationml/2006/main">
+  <p:cSld>
+    <p:spTree>
+      <p:nvGrpSpPr>
+        <p:cNvPr id="1" name=""/>
+        <p:cNvGrpSpPr/>
+        <p:nvPr/>
+      </p:nvGrpSpPr>
+      <p:grpSpPr>
+        <a:xfrm>
+          <a:off x="0" y="0"/>
+          <a:ext cx="0" cy="0"/>
+          <a:chOff x="0" y="0"/>
+          <a:chExt cx="0" cy="0"/>
+        </a:xfrm>
+      </p:grpSpPr>
+      <p:sp>
+        <p:nvSpPr>
+          <p:cNvPr id="5" name="Title 4">
+            <a:extLst>
+              <a:ext uri="{FF2B5EF4-FFF2-40B4-BE49-F238E27FC236}">
+                <a16:creationId xmlns:a16="http://schemas.microsoft.com/office/drawing/2014/main" id="{64213D2F-A106-3319-AA98-37F0C11F906C}"/>
+              </a:ext>
+            </a:extLst>
+          </p:cNvPr>
+          <p:cNvSpPr>
+            <a:spLocks noGrp="1"/>
+          </p:cNvSpPr>
+          <p:nvPr>
+            <p:ph type="title"/>
+          </p:nvPr>
+        </p:nvSpPr>
+        <p:spPr/>
+        <p:txBody>
+          <a:bodyPr/>
+          <a:lstStyle/>
+          <a:p>
+            <a:r>
+              <a:rPr lang="en-US" dirty="0"/>
+              <a:t>Optimizers’ review</a:t>
+            </a:r>
+          </a:p>
+        </p:txBody>
+      </p:sp>
+      <p:sp>
+        <p:nvSpPr>
+          <p:cNvPr id="6" name="Content Placeholder 5">
+            <a:extLst>
+              <a:ext uri="{FF2B5EF4-FFF2-40B4-BE49-F238E27FC236}">
+                <a16:creationId xmlns:a16="http://schemas.microsoft.com/office/drawing/2014/main" id="{3C4EB284-4A7B-E6BB-BEC1-67954B65026D}"/>
+              </a:ext>
+            </a:extLst>
+          </p:cNvPr>
+          <p:cNvSpPr>
+            <a:spLocks noGrp="1"/>
+          </p:cNvSpPr>
+          <p:nvPr>
+            <p:ph idx="1"/>
+          </p:nvPr>
+        </p:nvSpPr>
+        <p:spPr>
+          <a:xfrm>
+            <a:off x="838200" y="1825625"/>
+            <a:ext cx="10515600" cy="4667250"/>
+          </a:xfrm>
+        </p:spPr>
+        <p:txBody>
+          <a:bodyPr>
+            <a:normAutofit/>
+          </a:bodyPr>
+          <a:lstStyle/>
+          <a:p>
+            <a:pPr algn="just"/>
+            <a:r>
+              <a:rPr lang="en-US" dirty="0"/>
+              <a:t>Descending through a Crowded Valley - Benchmarking Deep Learning Optimizers. Robin M. Schmidt, Frank Schneider, Philipp Hennig:</a:t>
+            </a:r>
+          </a:p>
+          <a:p>
+            <a:pPr lvl="1" algn="just"/>
+            <a:r>
+              <a:rPr lang="en-US" dirty="0"/>
+              <a:t>“Analyzing more than 50,000 individual runs [on different Deep Learning problems], we contribute the following three points: (</a:t>
+            </a:r>
+            <a:r>
+              <a:rPr lang="en-US" dirty="0" err="1"/>
+              <a:t>i</a:t>
+            </a:r>
+            <a:r>
+              <a:rPr lang="en-US" dirty="0"/>
+              <a:t>) </a:t>
+            </a:r>
+            <a:r>
+              <a:rPr lang="en-US" b="1" dirty="0"/>
+              <a:t>Optimizer performance varies greatly across tasks. </a:t>
+            </a:r>
+            <a:r>
+              <a:rPr lang="en-US" dirty="0"/>
+              <a:t>(ii) </a:t>
+            </a:r>
+            <a:r>
+              <a:rPr lang="en-US" b="1" dirty="0"/>
+              <a:t>We observe that evaluating multiple optimizers with default parameters works approximately as well as tuning the hyperparameters of a single, fixed optimizer. </a:t>
+            </a:r>
+            <a:r>
+              <a:rPr lang="en-US" dirty="0"/>
+              <a:t>(iii) While</a:t>
+            </a:r>
+            <a:r>
+              <a:rPr lang="en-US" b="1" dirty="0"/>
+              <a:t> we cannot discern an optimization method clearly dominating across all tested tasks, </a:t>
+            </a:r>
+            <a:r>
+              <a:rPr lang="en-US" dirty="0"/>
+              <a:t>we identify a significantly reduced subset of specific optimizers and parameter choices that generally lead to competitive results in our experiments: </a:t>
+            </a:r>
+            <a:r>
+              <a:rPr lang="en-US" b="1" dirty="0"/>
+              <a:t>Adam remains a strong contender, with newer methods </a:t>
+            </a:r>
+            <a:r>
+              <a:rPr lang="en-US" dirty="0"/>
+              <a:t>[more complicated and less documented]</a:t>
+            </a:r>
+            <a:r>
+              <a:rPr lang="en-US" b="1" dirty="0"/>
+              <a:t> failing to significantly and consistently outperform </a:t>
+            </a:r>
+            <a:r>
+              <a:rPr lang="en-US" dirty="0"/>
+              <a:t>it.”</a:t>
+            </a:r>
+          </a:p>
+        </p:txBody>
+      </p:sp>
+    </p:spTree>
+    <p:extLst>
+      <p:ext uri="{BB962C8B-B14F-4D97-AF65-F5344CB8AC3E}">
+        <p14:creationId xmlns:p14="http://schemas.microsoft.com/office/powerpoint/2010/main" val="548585943"/>
+      </p:ext>
+    </p:extLst>
+  </p:cSld>
+  <p:clrMapOvr>
+    <a:masterClrMapping/>
+  </p:clrMapOvr>
+  <p:timing>
+    <p:tnLst>
+      <p:par>
+        <p:cTn id="1" dur="indefinite" restart="never" nodeType="tmRoot">
+          <p:childTnLst>
+            <p:seq concurrent="1" nextAc="seek">
+              <p:cTn id="2" dur="indefinite" nodeType="mainSeq">
+                <p:childTnLst>
+                  <p:par>
+                    <p:cTn id="3" fill="hold">
+                      <p:stCondLst>
+                        <p:cond delay="indefinite"/>
+                      </p:stCondLst>
+                      <p:childTnLst>
+                        <p:par>
+                          <p:cTn id="4" fill="hold">
+                            <p:stCondLst>
+                              <p:cond delay="0"/>
+                            </p:stCondLst>
+                            <p:childTnLst>
+                              <p:par>
+                                <p:cTn id="5" presetID="10" presetClass="entr" presetSubtype="0" fill="hold" nodeType="clickEffect">
+                                  <p:stCondLst>
+                                    <p:cond delay="0"/>
+                                  </p:stCondLst>
+                                  <p:childTnLst>
+                                    <p:set>
+                                      <p:cBhvr>
+                                        <p:cTn id="6" dur="1" fill="hold">
+                                          <p:stCondLst>
+                                            <p:cond delay="0"/>
+                                          </p:stCondLst>
+                                        </p:cTn>
+                                        <p:tgtEl>
+                                          <p:spTgt spid="6">
+                                            <p:txEl>
+                                              <p:pRg st="1" end="1"/>
+                                            </p:txEl>
+                                          </p:spTgt>
+                                        </p:tgtEl>
+                                        <p:attrNameLst>
+                                          <p:attrName>style.visibility</p:attrName>
+                                        </p:attrNameLst>
+                                      </p:cBhvr>
+                                      <p:to>
+                                        <p:strVal val="visible"/>
+                                      </p:to>
+                                    </p:set>
+                                    <p:animEffect transition="in" filter="fade">
+                                      <p:cBhvr>
+                                        <p:cTn id="7" dur="500"/>
+                                        <p:tgtEl>
+                                          <p:spTgt spid="6">
+                                            <p:txEl>
+                                              <p:pRg st="1" end="1"/>
+                                            </p:txEl>
+                                          </p:spTgt>
+                                        </p:tgtEl>
+                                      </p:cBhvr>
+                                    </p:animEffect>
+                                  </p:childTnLst>
+                                </p:cTn>
+                              </p:par>
+                            </p:childTnLst>
+                          </p:cTn>
+                        </p:par>
+                      </p:childTnLst>
+                    </p:cTn>
+                  </p:par>
+                </p:childTnLst>
+              </p:cTn>
+              <p:prevCondLst>
+                <p:cond evt="onPrev" delay="0">
+                  <p:tgtEl>
+                    <p:sldTgt/>
+                  </p:tgtEl>
+                </p:cond>
+              </p:prevCondLst>
+              <p:nextCondLst>
+                <p:cond evt="onNext" delay="0">
+                  <p:tgtEl>
+                    <p:sldTgt/>
+                  </p:tgtEl>
+                </p:cond>
+              </p:nextCondLst>
+            </p:seq>
+          </p:childTnLst>
+        </p:cTn>
+      </p:par>
+    </p:tnLst>
+  </p:timing>
 </p:sld>
 </file>
 

</xml_diff>

<commit_message>
Better notes on slide Dropout
Signed-off-by: JasonMendoza2008 <lhotteromain@gmail.com>
</commit_message>
<xml_diff>
--- a/Slides_3.pptx
+++ b/Slides_3.pptx
@@ -1005,7 +1005,14 @@
           <a:p>
             <a:r>
               <a:rPr lang="en-US" dirty="0"/>
-              <a:t>The choice of neurons to be deactivated is random. All neurons are assigned a probability p which determines their activation. A new hyperparameter!!</a:t>
+              <a:t>The choice of neurons to be deactivated is random. All neurons are assigned a probability p which determines their activation. A new hyperparameter!! When p = 0.1, each neuron has a 1 in 10 chance of being deactivated. At each epoch, we apply this random deactivation. That is, at each pass (forward propagation) the model will learn with a different configuration of neurons, with the neurons randomly turning on and off. </a:t>
+            </a:r>
+            <a:br>
+              <a:rPr lang="en-US" dirty="0"/>
+            </a:br>
+            <a:r>
+              <a:rPr lang="en-US" dirty="0"/>
+              <a:t>This procedure effectively generates slightly different models with different neuron configurations at each iteration.</a:t>
             </a:r>
             <a:br>
               <a:rPr lang="en-US" dirty="0"/>
@@ -1015,37 +1022,44 @@
             </a:br>
             <a:r>
               <a:rPr lang="en-US" dirty="0"/>
-              <a:t>When p = 0.1, each neuron has a 1 in 10 chance of being deactivated.</a:t>
-            </a:r>
-            <a:br>
+              <a:t>Caution: Dropout is only active during model training. During tests, each neuron remains active.</a:t>
+            </a:r>
+          </a:p>
+          <a:p>
+            <a:r>
               <a:rPr lang="en-US" dirty="0"/>
-            </a:br>
-            <a:br>
-              <a:rPr lang="en-US" dirty="0"/>
-            </a:br>
-            <a:r>
-              <a:rPr lang="en-US" dirty="0"/>
-              <a:t>At each epoch, we apply this random deactivation. That is, at each pass (forward propagation) the model will learn with a different configuration of neurons, with the neurons randomly turning on and off.</a:t>
-            </a:r>
-            <a:br>
-              <a:rPr lang="en-US" dirty="0"/>
-            </a:br>
-            <a:br>
-              <a:rPr lang="en-US" dirty="0"/>
-            </a:br>
-            <a:r>
-              <a:rPr lang="en-US" dirty="0"/>
-              <a:t>This procedure effectively generates slightly different models with different neuron configurations at each iteration.</a:t>
-            </a:r>
-            <a:br>
-              <a:rPr lang="en-US" dirty="0"/>
-            </a:br>
-            <a:br>
-              <a:rPr lang="en-US" dirty="0"/>
-            </a:br>
-            <a:r>
-              <a:rPr lang="en-US" dirty="0"/>
-              <a:t>Caution: Dropout is only active during model training. During tests, each neuron remains active and its weight is multiplied by the probability p.</a:t>
+              <a:t>Caution2: </a:t>
+            </a:r>
+            <a:r>
+              <a:rPr lang="en-US" b="0" i="0" dirty="0">
+                <a:solidFill>
+                  <a:srgbClr val="232629"/>
+                </a:solidFill>
+                <a:effectLst/>
+                <a:latin typeface="-apple-system"/>
+              </a:rPr>
+              <a:t>Consider the neurons at the output layer. During training, each neuron usually get activations only from n neurons from the hidden layer due to dropout. Now, imagine we finished the training and remove dropout. Now activations of the output neurons will be computed based on more neurons ! This is likely to put the output neurons in unusual regime, so they will produce too large absolute values, being overexcited. To avoid this, t</a:t>
+            </a:r>
+            <a:r>
+              <a:rPr lang="en-US" dirty="0">
+                <a:effectLst/>
+                <a:latin typeface="ui-monospace"/>
+              </a:rPr>
+              <a:t>he outputs are scaled by a </a:t>
+            </a:r>
+            <a:r>
+              <a:rPr lang="en-US">
+                <a:effectLst/>
+                <a:latin typeface="ui-monospace"/>
+              </a:rPr>
+              <a:t>factor of </a:t>
+            </a:r>
+            <a:r>
+              <a:rPr lang="en-US" dirty="0">
+                <a:effectLst/>
+                <a:latin typeface="ui-monospace"/>
+              </a:rPr>
+              <a:t>1/(1-p) during training.</a:t>
             </a:r>
             <a:endParaRPr lang="fr-FR" dirty="0"/>
           </a:p>

</xml_diff>

<commit_message>
Added losses in Slides
</commit_message>
<xml_diff>
--- a/Slides_3.pptx
+++ b/Slides_3.pptx
@@ -5,7 +5,7 @@
     <p:sldMasterId id="2147483648" r:id="rId1"/>
   </p:sldMasterIdLst>
   <p:notesMasterIdLst>
-    <p:notesMasterId r:id="rId17"/>
+    <p:notesMasterId r:id="rId23"/>
   </p:notesMasterIdLst>
   <p:sldIdLst>
     <p:sldId id="332" r:id="rId2"/>
@@ -23,6 +23,12 @@
     <p:sldId id="342" r:id="rId14"/>
     <p:sldId id="343" r:id="rId15"/>
     <p:sldId id="344" r:id="rId16"/>
+    <p:sldId id="347" r:id="rId17"/>
+    <p:sldId id="349" r:id="rId18"/>
+    <p:sldId id="350" r:id="rId19"/>
+    <p:sldId id="351" r:id="rId20"/>
+    <p:sldId id="352" r:id="rId21"/>
+    <p:sldId id="353" r:id="rId22"/>
   </p:sldIdLst>
   <p:sldSz cx="12192000" cy="6858000"/>
   <p:notesSz cx="6858000" cy="9144000"/>
@@ -208,6 +214,230 @@
     </inkml:brush>
   </inkml:definitions>
   <inkml:trace contextRef="#ctx0" brushRef="#br0">0 0,'11755'0,"-11733"0</inkml:trace>
+</inkml:ink>
+</file>
+
+<file path=ppt/ink/ink12.xml><?xml version="1.0" encoding="utf-8"?>
+<inkml:ink xmlns:inkml="http://www.w3.org/2003/InkML">
+  <inkml:definitions>
+    <inkml:context xml:id="ctx0">
+      <inkml:inkSource xml:id="inkSrc0">
+        <inkml:traceFormat>
+          <inkml:channel name="X" type="integer" min="-2.14748E9" max="2.14748E9" units="cm"/>
+          <inkml:channel name="Y" type="integer" min="-2.14748E9" max="2.14748E9" units="cm"/>
+          <inkml:channel name="F" type="integer" max="32767" units="dev"/>
+        </inkml:traceFormat>
+        <inkml:channelProperties>
+          <inkml:channelProperty channel="X" name="resolution" value="1000" units="1/cm"/>
+          <inkml:channelProperty channel="Y" name="resolution" value="1000" units="1/cm"/>
+          <inkml:channelProperty channel="F" name="resolution" value="0" units="1/dev"/>
+        </inkml:channelProperties>
+      </inkml:inkSource>
+      <inkml:timestamp xml:id="ts0" timeString="2023-01-19T17:54:15.348"/>
+    </inkml:context>
+    <inkml:brush xml:id="br0">
+      <inkml:brushProperty name="width" value="0.2" units="cm"/>
+      <inkml:brushProperty name="height" value="0.2" units="cm"/>
+      <inkml:brushProperty name="color" value="#E71224"/>
+    </inkml:brush>
+  </inkml:definitions>
+  <inkml:trace contextRef="#ctx0" brushRef="#br0">1 0 24575,'0'2'2,"0"0"0,1 0 0,-1 0 0,0-1 0,1 1 0,-1 0-1,1-1 1,0 1 0,-1 0 0,1-1 0,0 1 0,0-1 0,0 1 0,0-1-1,0 1 1,1-1 0,-1 0 0,2 2 0,31 18-49,-16-11-106,11 6-160,0-1-1,48 17 0,-65-27 277,62 19-917,1-3 0,77 12 1,-34-9 8,267 44-3867,-2-14 1863,-196-30 1201,162 15 135,-96-22 1527,681 30-141,327-42 227,-715-7 0,480-19 0,-209 2 0,-119-3 0,-165 3 0,-266 11 0,233-4 0,191-14 0,-306 7 0,231-13 0,-72 3 0,-308 21 0,262-16 0,452-20 0,-593 23 489,8 0 17,-197 12 1519,-67 2-839,-94 6-1090,-3 2 39,0-1-1,0 0 1,0 0 0,0-1-1,-1 1 1,1-1 0,0 0 0,0 0-1,-1 0 1,1 0 0,-1-1-1,1 0 1,-1 1 0,1-1-1,3-3 1,-4-4 809,-6 2-153</inkml:trace>
+</inkml:ink>
+</file>
+
+<file path=ppt/ink/ink13.xml><?xml version="1.0" encoding="utf-8"?>
+<inkml:ink xmlns:inkml="http://www.w3.org/2003/InkML">
+  <inkml:definitions>
+    <inkml:context xml:id="ctx0">
+      <inkml:inkSource xml:id="inkSrc0">
+        <inkml:traceFormat>
+          <inkml:channel name="X" type="integer" min="-2.14748E9" max="2.14748E9" units="cm"/>
+          <inkml:channel name="Y" type="integer" min="-2.14748E9" max="2.14748E9" units="cm"/>
+          <inkml:channel name="F" type="integer" max="32767" units="dev"/>
+        </inkml:traceFormat>
+        <inkml:channelProperties>
+          <inkml:channelProperty channel="X" name="resolution" value="1000" units="1/cm"/>
+          <inkml:channelProperty channel="Y" name="resolution" value="1000" units="1/cm"/>
+          <inkml:channelProperty channel="F" name="resolution" value="0" units="1/dev"/>
+        </inkml:channelProperties>
+      </inkml:inkSource>
+      <inkml:timestamp xml:id="ts0" timeString="2023-01-19T17:54:16.280"/>
+    </inkml:context>
+    <inkml:brush xml:id="br0">
+      <inkml:brushProperty name="width" value="0.2" units="cm"/>
+      <inkml:brushProperty name="height" value="0.2" units="cm"/>
+      <inkml:brushProperty name="color" value="#E71224"/>
+    </inkml:brush>
+  </inkml:definitions>
+  <inkml:trace contextRef="#ctx0" brushRef="#br0">1 1 24575,'-1'96'0,"3"107"0,4-124 0,24 114 0,74 146-2241,-97-320 2221,174 432-2785,-41-181 2544,-70-165 206,4-3 0,116 122 1,-163-194-228,2-1 0,1-2 0,1-1 0,1-2 0,1-1 0,57 31 0,-21-20 477,174 76-2615,-156-81 2208,0-4 0,1-3-1,2-5 1,0-3 0,145 3 0,31 1-880,-55-2-103,628-10-1373,-478-8 2003,777-33 565,-839 14 0,164-13 0,487-44 0,256-22 0,392-20 0,79 27 0,-1250 75 0,92-5 0,-112-1 0,916-64 0,-1114 71 0,832-75 0,-625 53 0,-31 4 0,-181 15 0,225-27 0,-105 6 0,230-35 0,-411 53 45,491-104 734,-587 113 153,-1-1 0,0-3 1,-2-1-1,59-35 0,-98 51-721,0-1-1,-1 1 1,1-1-1,-1 0 1,0 0-1,7-10 1,0-3 1022</inkml:trace>
+</inkml:ink>
+</file>
+
+<file path=ppt/ink/ink14.xml><?xml version="1.0" encoding="utf-8"?>
+<inkml:ink xmlns:inkml="http://www.w3.org/2003/InkML">
+  <inkml:definitions>
+    <inkml:context xml:id="ctx0">
+      <inkml:inkSource xml:id="inkSrc0">
+        <inkml:traceFormat>
+          <inkml:channel name="X" type="integer" min="-2.14748E9" max="2.14748E9" units="cm"/>
+          <inkml:channel name="Y" type="integer" min="-2.14748E9" max="2.14748E9" units="cm"/>
+          <inkml:channel name="F" type="integer" max="32767" units="dev"/>
+        </inkml:traceFormat>
+        <inkml:channelProperties>
+          <inkml:channelProperty channel="X" name="resolution" value="1000" units="1/cm"/>
+          <inkml:channelProperty channel="Y" name="resolution" value="1000" units="1/cm"/>
+          <inkml:channelProperty channel="F" name="resolution" value="0" units="1/dev"/>
+        </inkml:channelProperties>
+      </inkml:inkSource>
+      <inkml:timestamp xml:id="ts0" timeString="2023-01-19T17:54:16.777"/>
+    </inkml:context>
+    <inkml:brush xml:id="br0">
+      <inkml:brushProperty name="width" value="0.2" units="cm"/>
+      <inkml:brushProperty name="height" value="0.2" units="cm"/>
+      <inkml:brushProperty name="color" value="#E71224"/>
+    </inkml:brush>
+  </inkml:definitions>
+  <inkml:trace contextRef="#ctx0" brushRef="#br0">1 1 24575,'3'1'0,"-1"-1"0,1 1 0,0 0 0,-1 0 0,1 1 0,0-1 0,-1 0 0,0 1 0,1 0 0,-1-1 0,3 4 0,8 5 0,135 88 0,-117-77-480,0 2 0,52 52 0,-11-9-54,20 18-125,15 13 253,15 17 406,-28-23 0,36 42-1433,-54-51 169,-43-49 653,239 258-652,-164-182 1051,-7-7 249,-43-36-904,105 92-1,-75-80 505,28 25 213,-31-33-248,36 27 45,157 66 860,-208-131-634,1-4 0,1-2 0,91 18-1,-118-35 5,1-1-1,63 2 1,93-9 739,-186-1-528,33-1 2173</inkml:trace>
+</inkml:ink>
+</file>
+
+<file path=ppt/ink/ink15.xml><?xml version="1.0" encoding="utf-8"?>
+<inkml:ink xmlns:inkml="http://www.w3.org/2003/InkML">
+  <inkml:definitions>
+    <inkml:context xml:id="ctx0">
+      <inkml:inkSource xml:id="inkSrc0">
+        <inkml:traceFormat>
+          <inkml:channel name="X" type="integer" min="-2.14748E9" max="2.14748E9" units="cm"/>
+          <inkml:channel name="Y" type="integer" min="-2.14748E9" max="2.14748E9" units="cm"/>
+          <inkml:channel name="F" type="integer" max="32767" units="dev"/>
+        </inkml:traceFormat>
+        <inkml:channelProperties>
+          <inkml:channelProperty channel="X" name="resolution" value="1000" units="1/cm"/>
+          <inkml:channelProperty channel="Y" name="resolution" value="1000" units="1/cm"/>
+          <inkml:channelProperty channel="F" name="resolution" value="0" units="1/dev"/>
+        </inkml:channelProperties>
+      </inkml:inkSource>
+      <inkml:timestamp xml:id="ts0" timeString="2023-01-19T17:57:02.523"/>
+    </inkml:context>
+    <inkml:brush xml:id="br0">
+      <inkml:brushProperty name="width" value="0.2" units="cm"/>
+      <inkml:brushProperty name="height" value="0.2" units="cm"/>
+      <inkml:brushProperty name="color" value="#E71224"/>
+    </inkml:brush>
+  </inkml:definitions>
+  <inkml:trace contextRef="#ctx0" brushRef="#br0">1 1959 24575,'1'-1'0,"1"1"0,-1 0 0,1-1 0,0 1 0,-1-1 0,1 1 0,-1-1 0,1 0 0,-1 0 0,0 1 0,1-1 0,-1 0 0,0 0 0,1 0 0,-1-1 0,0 1 0,0 0 0,0 0 0,0-1 0,0 1 0,0 0 0,-1-1 0,1 1 0,0-1 0,0-1 0,3-7 0,-1 0 0,4-19 0,-4 16 0,3-14 0,2 0 0,1 0 0,14-30 0,16-35 0,-30 65 0,2 1 0,1 0 0,30-46 0,-35 60 0,0 0 0,11-25 0,-12 22 0,16-26 0,-2 8 0,19-25 0,-5 9 0,-24 34 0,0 0 0,0 1 0,14-13 0,-15 16 0,1-1 0,-2 0 0,1-1 0,-2 1 0,7-16 0,20-31 0,-12 25 0,-2-1 0,22-51 0,17-33 0,-53 106 0,2 0 0,0 1 0,0 0 0,19-19 0,-15 16 0,21-28 0,-19 22 0,1 1 0,26-27 0,-21 25 0,18-27 0,-25 34 0,1-1 0,0 1 0,24-19 0,21-22 0,-16 5 0,-20 22 0,2 1 0,0 1 0,32-25 0,-31 32 93,96-78-1551</inkml:trace>
+</inkml:ink>
+</file>
+
+<file path=ppt/ink/ink16.xml><?xml version="1.0" encoding="utf-8"?>
+<inkml:ink xmlns:inkml="http://www.w3.org/2003/InkML">
+  <inkml:definitions>
+    <inkml:context xml:id="ctx0">
+      <inkml:inkSource xml:id="inkSrc0">
+        <inkml:traceFormat>
+          <inkml:channel name="X" type="integer" min="-2.14748E9" max="2.14748E9" units="cm"/>
+          <inkml:channel name="Y" type="integer" min="-2.14748E9" max="2.14748E9" units="cm"/>
+          <inkml:channel name="F" type="integer" max="32767" units="dev"/>
+        </inkml:traceFormat>
+        <inkml:channelProperties>
+          <inkml:channelProperty channel="X" name="resolution" value="1000" units="1/cm"/>
+          <inkml:channelProperty channel="Y" name="resolution" value="1000" units="1/cm"/>
+          <inkml:channelProperty channel="F" name="resolution" value="0" units="1/dev"/>
+        </inkml:channelProperties>
+      </inkml:inkSource>
+      <inkml:timestamp xml:id="ts0" timeString="2023-01-19T17:57:03.985"/>
+    </inkml:context>
+    <inkml:brush xml:id="br0">
+      <inkml:brushProperty name="width" value="0.2" units="cm"/>
+      <inkml:brushProperty name="height" value="0.2" units="cm"/>
+      <inkml:brushProperty name="color" value="#E71224"/>
+    </inkml:brush>
+  </inkml:definitions>
+  <inkml:trace contextRef="#ctx0" brushRef="#br0">1 1 24575,'4'2'0,"1"0"0,0 1 0,-1-1 0,1 1 0,-1 0 0,0 0 0,0 1 0,0 0 0,-1-1 0,5 6 0,6 11 0,0 1 0,-2 1 0,0 0 0,11 29 0,26 77 0,-41-108 0,-1 0 0,0 0 0,-2 0 0,5 36 0,-5-11 0,-2 53 0,-3-87 0,1-1 0,0 1 0,1 0 0,0 0 0,1-1 0,0 1 0,0-1 0,1 0 0,1 0 0,-1 0 0,2-1 0,-1 1 0,13 13 0,0 0 0,-13-16 0,1 0 0,-1-1 0,11 9 0,-13-12 0,0-1 0,0 0 0,1-1 0,-1 1 0,0-1 0,1 1 0,-1-1 0,1 0 0,-1 0 0,1 0 0,6 0 0,-3-1 0,-1 0 0,0 0 0,0-1 0,0 0 0,0 0 0,0-1 0,-1 1 0,1-1 0,0 0 0,7-4 0,6-5 0,28-20 0,2-1 0,-22 16 0,-13 8 0,1-1 0,0 2 0,25-9 0,0 2 0,49-25 0,-61 26 0,90-47 0,-105 53 9,1-1 0,14-11-1,-10 6-1399</inkml:trace>
+</inkml:ink>
+</file>
+
+<file path=ppt/ink/ink17.xml><?xml version="1.0" encoding="utf-8"?>
+<inkml:ink xmlns:inkml="http://www.w3.org/2003/InkML">
+  <inkml:definitions>
+    <inkml:context xml:id="ctx0">
+      <inkml:inkSource xml:id="inkSrc0">
+        <inkml:traceFormat>
+          <inkml:channel name="X" type="integer" min="-2.14748E9" max="2.14748E9" units="cm"/>
+          <inkml:channel name="Y" type="integer" min="-2.14748E9" max="2.14748E9" units="cm"/>
+          <inkml:channel name="F" type="integer" max="32767" units="dev"/>
+        </inkml:traceFormat>
+        <inkml:channelProperties>
+          <inkml:channelProperty channel="X" name="resolution" value="1000" units="1/cm"/>
+          <inkml:channelProperty channel="Y" name="resolution" value="1000" units="1/cm"/>
+          <inkml:channelProperty channel="F" name="resolution" value="0" units="1/dev"/>
+        </inkml:channelProperties>
+      </inkml:inkSource>
+      <inkml:timestamp xml:id="ts0" timeString="2023-01-19T17:57:06.448"/>
+    </inkml:context>
+    <inkml:brush xml:id="br0">
+      <inkml:brushProperty name="width" value="0.2" units="cm"/>
+      <inkml:brushProperty name="height" value="0.2" units="cm"/>
+      <inkml:brushProperty name="color" value="#E71224"/>
+    </inkml:brush>
+  </inkml:definitions>
+  <inkml:trace contextRef="#ctx0" brushRef="#br0">0 1 24575,'0'2'0,"1"0"0,-1 0 0,1 1 0,0-1 0,-1 0 0,1 0 0,0 0 0,0 0 0,0 0 0,1 0 0,-1 0 0,0 0 0,2 1 0,25 25 0,-20-20 0,35 34 0,77 69 0,-109-102 0,-1 0 0,0 1 0,-1 0 0,0 1 0,0 0 0,-1 0 0,-1 1 0,0 0 0,8 19 0,-8-13 0,-2-1 0,0 1 0,0 0 0,-2 1 0,0-1 0,0 31 0,-2-33 0,1 0 0,1-1 0,0 1 0,7 15 0,-5-13 0,0 0 0,3 32 0,2 33 0,2 41 0,-12 301 0,-1-194 0,0-197 0,-10 49 0,3-22 0,8-56-114,-1 0 1,0 0-1,1 0 0,-2 1 0,1-1 1,0 0-1,-1-1 0,0 1 0,0 0 1,-1 0-1,-2 3 0</inkml:trace>
+</inkml:ink>
+</file>
+
+<file path=ppt/ink/ink18.xml><?xml version="1.0" encoding="utf-8"?>
+<inkml:ink xmlns:inkml="http://www.w3.org/2003/InkML">
+  <inkml:definitions>
+    <inkml:context xml:id="ctx0">
+      <inkml:inkSource xml:id="inkSrc0">
+        <inkml:traceFormat>
+          <inkml:channel name="X" type="integer" min="-2.14748E9" max="2.14748E9" units="cm"/>
+          <inkml:channel name="Y" type="integer" min="-2.14748E9" max="2.14748E9" units="cm"/>
+          <inkml:channel name="F" type="integer" max="32767" units="dev"/>
+        </inkml:traceFormat>
+        <inkml:channelProperties>
+          <inkml:channelProperty channel="X" name="resolution" value="1000" units="1/cm"/>
+          <inkml:channelProperty channel="Y" name="resolution" value="1000" units="1/cm"/>
+          <inkml:channelProperty channel="F" name="resolution" value="0" units="1/dev"/>
+        </inkml:channelProperties>
+      </inkml:inkSource>
+      <inkml:timestamp xml:id="ts0" timeString="2023-01-19T17:57:07.493"/>
+    </inkml:context>
+    <inkml:brush xml:id="br0">
+      <inkml:brushProperty name="width" value="0.2" units="cm"/>
+      <inkml:brushProperty name="height" value="0.2" units="cm"/>
+      <inkml:brushProperty name="color" value="#E71224"/>
+    </inkml:brush>
+  </inkml:definitions>
+  <inkml:trace contextRef="#ctx0" brushRef="#br0">1 1554 24575,'0'-5'0,"1"0"0,0 1 0,0-1 0,0 0 0,1 0 0,0 1 0,0-1 0,0 1 0,0 0 0,4-5 0,31-42 0,-29 41 0,26-33-976,72-69 1,101-102 975,-192 200 0,0 0 0,1 0 0,1 2 0,19-12 0,13-10 0,10-9-705,122-66 0,-123 78 705,63-30 0,98-41 0,-141 63 0,34-3-946,-62 24 663,85-40-1326,-37 22 1415,-16 6 183,125-44-85,-108 39 96,117-25 0,-95 29 0,21-2-11,9-2 65,-102 23 162,-31 8-217,1 0 0,19-8 0,149-66 2905,-162 68-7755</inkml:trace>
+</inkml:ink>
+</file>
+
+<file path=ppt/ink/ink19.xml><?xml version="1.0" encoding="utf-8"?>
+<inkml:ink xmlns:inkml="http://www.w3.org/2003/InkML">
+  <inkml:definitions>
+    <inkml:context xml:id="ctx0">
+      <inkml:inkSource xml:id="inkSrc0">
+        <inkml:traceFormat>
+          <inkml:channel name="X" type="integer" min="-2.14748E9" max="2.14748E9" units="cm"/>
+          <inkml:channel name="Y" type="integer" min="-2.14748E9" max="2.14748E9" units="cm"/>
+          <inkml:channel name="F" type="integer" max="32767" units="dev"/>
+        </inkml:traceFormat>
+        <inkml:channelProperties>
+          <inkml:channelProperty channel="X" name="resolution" value="1000" units="1/cm"/>
+          <inkml:channelProperty channel="Y" name="resolution" value="1000" units="1/cm"/>
+          <inkml:channelProperty channel="F" name="resolution" value="0" units="1/dev"/>
+        </inkml:channelProperties>
+      </inkml:inkSource>
+      <inkml:timestamp xml:id="ts0" timeString="2023-01-19T17:57:09.351"/>
+    </inkml:context>
+    <inkml:brush xml:id="br0">
+      <inkml:brushProperty name="width" value="0.2" units="cm"/>
+      <inkml:brushProperty name="height" value="0.2" units="cm"/>
+      <inkml:brushProperty name="color" value="#E71224"/>
+    </inkml:brush>
+  </inkml:definitions>
+  <inkml:trace contextRef="#ctx0" brushRef="#br0">0 0 24575,'36'12'0,"10"-6"0,1-2 0,0-3 0,48-3 0,-12 0 0,423 2 0,-492 1 0,0 1 0,0 0 0,0 1 0,-1 1 0,17 6 0,23 5 0,-50-14 0,-1-1 0,1 1 0,0 0 0,-1-1 0,1 1 0,-1 1 0,1-1 0,-1 0 0,1 1 0,-1-1 0,0 1 0,0-1 0,1 1 0,-1 0 0,0 0 0,-1 0 0,1 0 0,0 1 0,-1-1 0,1 0 0,-1 1 0,0-1 0,0 1 0,2 5 0,-2-3 0,-1 0 0,1 0 0,-1 0 0,0 0 0,-1 0 0,1 1 0,-1-1 0,0 0 0,0 0 0,-1 0 0,0 0 0,-3 7 0,-130 285 0,55-153 0,24-52 0,39-67 0,1 1 0,1 1 0,-12 31 0,-12 25-1365</inkml:trace>
 </inkml:ink>
 </file>
 
@@ -1092,6 +1322,675 @@
     <p:extLst>
       <p:ext uri="{BB962C8B-B14F-4D97-AF65-F5344CB8AC3E}">
         <p14:creationId xmlns:p14="http://schemas.microsoft.com/office/powerpoint/2010/main" val="3595983183"/>
+      </p:ext>
+    </p:extLst>
+  </p:cSld>
+  <p:clrMapOvr>
+    <a:masterClrMapping/>
+  </p:clrMapOvr>
+</p:notes>
+</file>
+
+<file path=ppt/notesSlides/notesSlide12.xml><?xml version="1.0" encoding="utf-8"?>
+<p:notes xmlns:a="http://schemas.openxmlformats.org/drawingml/2006/main" xmlns:r="http://schemas.openxmlformats.org/officeDocument/2006/relationships" xmlns:p="http://schemas.openxmlformats.org/presentationml/2006/main">
+  <p:cSld>
+    <p:spTree>
+      <p:nvGrpSpPr>
+        <p:cNvPr id="1" name=""/>
+        <p:cNvGrpSpPr/>
+        <p:nvPr/>
+      </p:nvGrpSpPr>
+      <p:grpSpPr>
+        <a:xfrm>
+          <a:off x="0" y="0"/>
+          <a:ext cx="0" cy="0"/>
+          <a:chOff x="0" y="0"/>
+          <a:chExt cx="0" cy="0"/>
+        </a:xfrm>
+      </p:grpSpPr>
+      <p:sp>
+        <p:nvSpPr>
+          <p:cNvPr id="2" name="Slide Image Placeholder 1"/>
+          <p:cNvSpPr>
+            <a:spLocks noGrp="1" noRot="1" noChangeAspect="1"/>
+          </p:cNvSpPr>
+          <p:nvPr>
+            <p:ph type="sldImg"/>
+          </p:nvPr>
+        </p:nvSpPr>
+        <p:spPr/>
+      </p:sp>
+      <p:sp>
+        <p:nvSpPr>
+          <p:cNvPr id="3" name="Notes Placeholder 2"/>
+          <p:cNvSpPr>
+            <a:spLocks noGrp="1"/>
+          </p:cNvSpPr>
+          <p:nvPr>
+            <p:ph type="body" idx="1"/>
+          </p:nvPr>
+        </p:nvSpPr>
+        <p:spPr/>
+        <p:txBody>
+          <a:bodyPr/>
+          <a:lstStyle/>
+          <a:p>
+            <a:endParaRPr lang="fr-FR" dirty="0"/>
+          </a:p>
+        </p:txBody>
+      </p:sp>
+      <p:sp>
+        <p:nvSpPr>
+          <p:cNvPr id="4" name="Slide Number Placeholder 3"/>
+          <p:cNvSpPr>
+            <a:spLocks noGrp="1"/>
+          </p:cNvSpPr>
+          <p:nvPr>
+            <p:ph type="sldNum" sz="quarter" idx="5"/>
+          </p:nvPr>
+        </p:nvSpPr>
+        <p:spPr/>
+        <p:txBody>
+          <a:bodyPr/>
+          <a:lstStyle/>
+          <a:p>
+            <a:fld id="{B2732108-1823-42F2-979D-D6CF9D74D210}" type="slidenum">
+              <a:rPr lang="en-US" smtClean="0"/>
+              <a:t>16</a:t>
+            </a:fld>
+            <a:endParaRPr lang="en-US"/>
+          </a:p>
+        </p:txBody>
+      </p:sp>
+    </p:spTree>
+    <p:extLst>
+      <p:ext uri="{BB962C8B-B14F-4D97-AF65-F5344CB8AC3E}">
+        <p14:creationId xmlns:p14="http://schemas.microsoft.com/office/powerpoint/2010/main" val="1915823295"/>
+      </p:ext>
+    </p:extLst>
+  </p:cSld>
+  <p:clrMapOvr>
+    <a:masterClrMapping/>
+  </p:clrMapOvr>
+</p:notes>
+</file>
+
+<file path=ppt/notesSlides/notesSlide13.xml><?xml version="1.0" encoding="utf-8"?>
+<p:notes xmlns:a="http://schemas.openxmlformats.org/drawingml/2006/main" xmlns:r="http://schemas.openxmlformats.org/officeDocument/2006/relationships" xmlns:p="http://schemas.openxmlformats.org/presentationml/2006/main">
+  <p:cSld>
+    <p:spTree>
+      <p:nvGrpSpPr>
+        <p:cNvPr id="1" name=""/>
+        <p:cNvGrpSpPr/>
+        <p:nvPr/>
+      </p:nvGrpSpPr>
+      <p:grpSpPr>
+        <a:xfrm>
+          <a:off x="0" y="0"/>
+          <a:ext cx="0" cy="0"/>
+          <a:chOff x="0" y="0"/>
+          <a:chExt cx="0" cy="0"/>
+        </a:xfrm>
+      </p:grpSpPr>
+      <p:sp>
+        <p:nvSpPr>
+          <p:cNvPr id="2" name="Slide Image Placeholder 1"/>
+          <p:cNvSpPr>
+            <a:spLocks noGrp="1" noRot="1" noChangeAspect="1"/>
+          </p:cNvSpPr>
+          <p:nvPr>
+            <p:ph type="sldImg"/>
+          </p:nvPr>
+        </p:nvSpPr>
+        <p:spPr/>
+      </p:sp>
+      <p:sp>
+        <p:nvSpPr>
+          <p:cNvPr id="3" name="Notes Placeholder 2"/>
+          <p:cNvSpPr>
+            <a:spLocks noGrp="1"/>
+          </p:cNvSpPr>
+          <p:nvPr>
+            <p:ph type="body" idx="1"/>
+          </p:nvPr>
+        </p:nvSpPr>
+        <p:spPr/>
+        <p:txBody>
+          <a:bodyPr/>
+          <a:lstStyle/>
+          <a:p>
+            <a:r>
+              <a:rPr lang="fr-FR" dirty="0"/>
+              <a:t>Donner un exemple (dog cat horse </a:t>
+            </a:r>
+            <a:r>
+              <a:rPr lang="fr-FR" dirty="0" err="1"/>
+              <a:t>human</a:t>
+            </a:r>
+            <a:r>
+              <a:rPr lang="fr-FR" dirty="0"/>
+              <a:t>) et calculer la </a:t>
+            </a:r>
+            <a:r>
+              <a:rPr lang="fr-FR" dirty="0" err="1"/>
+              <a:t>loss</a:t>
+            </a:r>
+            <a:endParaRPr lang="fr-FR" dirty="0"/>
+          </a:p>
+        </p:txBody>
+      </p:sp>
+      <p:sp>
+        <p:nvSpPr>
+          <p:cNvPr id="4" name="Slide Number Placeholder 3"/>
+          <p:cNvSpPr>
+            <a:spLocks noGrp="1"/>
+          </p:cNvSpPr>
+          <p:nvPr>
+            <p:ph type="sldNum" sz="quarter" idx="5"/>
+          </p:nvPr>
+        </p:nvSpPr>
+        <p:spPr/>
+        <p:txBody>
+          <a:bodyPr/>
+          <a:lstStyle/>
+          <a:p>
+            <a:fld id="{B2732108-1823-42F2-979D-D6CF9D74D210}" type="slidenum">
+              <a:rPr lang="en-US" smtClean="0"/>
+              <a:t>17</a:t>
+            </a:fld>
+            <a:endParaRPr lang="en-US"/>
+          </a:p>
+        </p:txBody>
+      </p:sp>
+    </p:spTree>
+    <p:extLst>
+      <p:ext uri="{BB962C8B-B14F-4D97-AF65-F5344CB8AC3E}">
+        <p14:creationId xmlns:p14="http://schemas.microsoft.com/office/powerpoint/2010/main" val="1383870905"/>
+      </p:ext>
+    </p:extLst>
+  </p:cSld>
+  <p:clrMapOvr>
+    <a:masterClrMapping/>
+  </p:clrMapOvr>
+</p:notes>
+</file>
+
+<file path=ppt/notesSlides/notesSlide14.xml><?xml version="1.0" encoding="utf-8"?>
+<p:notes xmlns:a="http://schemas.openxmlformats.org/drawingml/2006/main" xmlns:r="http://schemas.openxmlformats.org/officeDocument/2006/relationships" xmlns:p="http://schemas.openxmlformats.org/presentationml/2006/main">
+  <p:cSld>
+    <p:spTree>
+      <p:nvGrpSpPr>
+        <p:cNvPr id="1" name=""/>
+        <p:cNvGrpSpPr/>
+        <p:nvPr/>
+      </p:nvGrpSpPr>
+      <p:grpSpPr>
+        <a:xfrm>
+          <a:off x="0" y="0"/>
+          <a:ext cx="0" cy="0"/>
+          <a:chOff x="0" y="0"/>
+          <a:chExt cx="0" cy="0"/>
+        </a:xfrm>
+      </p:grpSpPr>
+      <p:sp>
+        <p:nvSpPr>
+          <p:cNvPr id="2" name="Slide Image Placeholder 1"/>
+          <p:cNvSpPr>
+            <a:spLocks noGrp="1" noRot="1" noChangeAspect="1"/>
+          </p:cNvSpPr>
+          <p:nvPr>
+            <p:ph type="sldImg"/>
+          </p:nvPr>
+        </p:nvSpPr>
+        <p:spPr/>
+      </p:sp>
+      <p:sp>
+        <p:nvSpPr>
+          <p:cNvPr id="3" name="Notes Placeholder 2"/>
+          <p:cNvSpPr>
+            <a:spLocks noGrp="1"/>
+          </p:cNvSpPr>
+          <p:nvPr>
+            <p:ph type="body" idx="1"/>
+          </p:nvPr>
+        </p:nvSpPr>
+        <p:spPr/>
+        <p:txBody>
+          <a:bodyPr/>
+          <a:lstStyle/>
+          <a:p>
+            <a:r>
+              <a:rPr lang="fr-FR" dirty="0"/>
+              <a:t>Pourquoi y a que x_{n, y_{n}} ? Parce que tous les autres le P*(i) vaut 0 !!!</a:t>
+            </a:r>
+          </a:p>
+          <a:p>
+            <a:endParaRPr lang="fr-FR" dirty="0"/>
+          </a:p>
+          <a:p>
+            <a:r>
+              <a:rPr lang="fr-FR" dirty="0"/>
+              <a:t>Si on fait </a:t>
+            </a:r>
+            <a:r>
+              <a:rPr lang="fr-FR" dirty="0" err="1"/>
+              <a:t>mean</a:t>
+            </a:r>
+            <a:r>
+              <a:rPr lang="fr-FR" dirty="0"/>
+              <a:t>, on divise pas par N mais par les poids attention !!!!!! En pratique de toute façon, avec PyTorch, on s’en fiche … mais c’est important de savoir comment ça marche quand même.</a:t>
+            </a:r>
+          </a:p>
+        </p:txBody>
+      </p:sp>
+      <p:sp>
+        <p:nvSpPr>
+          <p:cNvPr id="4" name="Slide Number Placeholder 3"/>
+          <p:cNvSpPr>
+            <a:spLocks noGrp="1"/>
+          </p:cNvSpPr>
+          <p:nvPr>
+            <p:ph type="sldNum" sz="quarter" idx="5"/>
+          </p:nvPr>
+        </p:nvSpPr>
+        <p:spPr/>
+        <p:txBody>
+          <a:bodyPr/>
+          <a:lstStyle/>
+          <a:p>
+            <a:fld id="{B2732108-1823-42F2-979D-D6CF9D74D210}" type="slidenum">
+              <a:rPr lang="en-US" smtClean="0"/>
+              <a:t>18</a:t>
+            </a:fld>
+            <a:endParaRPr lang="en-US"/>
+          </a:p>
+        </p:txBody>
+      </p:sp>
+    </p:spTree>
+    <p:extLst>
+      <p:ext uri="{BB962C8B-B14F-4D97-AF65-F5344CB8AC3E}">
+        <p14:creationId xmlns:p14="http://schemas.microsoft.com/office/powerpoint/2010/main" val="1748699146"/>
+      </p:ext>
+    </p:extLst>
+  </p:cSld>
+  <p:clrMapOvr>
+    <a:masterClrMapping/>
+  </p:clrMapOvr>
+</p:notes>
+</file>
+
+<file path=ppt/notesSlides/notesSlide15.xml><?xml version="1.0" encoding="utf-8"?>
+<p:notes xmlns:a="http://schemas.openxmlformats.org/drawingml/2006/main" xmlns:r="http://schemas.openxmlformats.org/officeDocument/2006/relationships" xmlns:p="http://schemas.openxmlformats.org/presentationml/2006/main">
+  <p:cSld>
+    <p:spTree>
+      <p:nvGrpSpPr>
+        <p:cNvPr id="1" name=""/>
+        <p:cNvGrpSpPr/>
+        <p:nvPr/>
+      </p:nvGrpSpPr>
+      <p:grpSpPr>
+        <a:xfrm>
+          <a:off x="0" y="0"/>
+          <a:ext cx="0" cy="0"/>
+          <a:chOff x="0" y="0"/>
+          <a:chExt cx="0" cy="0"/>
+        </a:xfrm>
+      </p:grpSpPr>
+      <p:sp>
+        <p:nvSpPr>
+          <p:cNvPr id="2" name="Slide Image Placeholder 1"/>
+          <p:cNvSpPr>
+            <a:spLocks noGrp="1" noRot="1" noChangeAspect="1"/>
+          </p:cNvSpPr>
+          <p:nvPr>
+            <p:ph type="sldImg"/>
+          </p:nvPr>
+        </p:nvSpPr>
+        <p:spPr/>
+      </p:sp>
+      <p:sp>
+        <p:nvSpPr>
+          <p:cNvPr id="3" name="Notes Placeholder 2"/>
+          <p:cNvSpPr>
+            <a:spLocks noGrp="1"/>
+          </p:cNvSpPr>
+          <p:nvPr>
+            <p:ph type="body" idx="1"/>
+          </p:nvPr>
+        </p:nvSpPr>
+        <p:spPr/>
+        <p:txBody>
+          <a:bodyPr/>
+          <a:lstStyle/>
+          <a:p>
+            <a:endParaRPr lang="fr-FR" dirty="0"/>
+          </a:p>
+        </p:txBody>
+      </p:sp>
+      <p:sp>
+        <p:nvSpPr>
+          <p:cNvPr id="4" name="Slide Number Placeholder 3"/>
+          <p:cNvSpPr>
+            <a:spLocks noGrp="1"/>
+          </p:cNvSpPr>
+          <p:nvPr>
+            <p:ph type="sldNum" sz="quarter" idx="5"/>
+          </p:nvPr>
+        </p:nvSpPr>
+        <p:spPr/>
+        <p:txBody>
+          <a:bodyPr/>
+          <a:lstStyle/>
+          <a:p>
+            <a:fld id="{B2732108-1823-42F2-979D-D6CF9D74D210}" type="slidenum">
+              <a:rPr lang="en-US" smtClean="0"/>
+              <a:t>19</a:t>
+            </a:fld>
+            <a:endParaRPr lang="en-US"/>
+          </a:p>
+        </p:txBody>
+      </p:sp>
+    </p:spTree>
+    <p:extLst>
+      <p:ext uri="{BB962C8B-B14F-4D97-AF65-F5344CB8AC3E}">
+        <p14:creationId xmlns:p14="http://schemas.microsoft.com/office/powerpoint/2010/main" val="2058295248"/>
+      </p:ext>
+    </p:extLst>
+  </p:cSld>
+  <p:clrMapOvr>
+    <a:masterClrMapping/>
+  </p:clrMapOvr>
+</p:notes>
+</file>
+
+<file path=ppt/notesSlides/notesSlide16.xml><?xml version="1.0" encoding="utf-8"?>
+<p:notes xmlns:a="http://schemas.openxmlformats.org/drawingml/2006/main" xmlns:r="http://schemas.openxmlformats.org/officeDocument/2006/relationships" xmlns:p="http://schemas.openxmlformats.org/presentationml/2006/main">
+  <p:cSld>
+    <p:spTree>
+      <p:nvGrpSpPr>
+        <p:cNvPr id="1" name=""/>
+        <p:cNvGrpSpPr/>
+        <p:nvPr/>
+      </p:nvGrpSpPr>
+      <p:grpSpPr>
+        <a:xfrm>
+          <a:off x="0" y="0"/>
+          <a:ext cx="0" cy="0"/>
+          <a:chOff x="0" y="0"/>
+          <a:chExt cx="0" cy="0"/>
+        </a:xfrm>
+      </p:grpSpPr>
+      <p:sp>
+        <p:nvSpPr>
+          <p:cNvPr id="2" name="Slide Image Placeholder 1"/>
+          <p:cNvSpPr>
+            <a:spLocks noGrp="1" noRot="1" noChangeAspect="1"/>
+          </p:cNvSpPr>
+          <p:nvPr>
+            <p:ph type="sldImg"/>
+          </p:nvPr>
+        </p:nvSpPr>
+        <p:spPr/>
+      </p:sp>
+      <p:sp>
+        <p:nvSpPr>
+          <p:cNvPr id="3" name="Notes Placeholder 2"/>
+          <p:cNvSpPr>
+            <a:spLocks noGrp="1"/>
+          </p:cNvSpPr>
+          <p:nvPr>
+            <p:ph type="body" idx="1"/>
+          </p:nvPr>
+        </p:nvSpPr>
+        <p:spPr/>
+        <p:txBody>
+          <a:bodyPr/>
+          <a:lstStyle/>
+          <a:p>
+            <a:r>
+              <a:rPr lang="fr-FR" dirty="0" err="1"/>
+              <a:t>Why</a:t>
+            </a:r>
+            <a:r>
+              <a:rPr lang="fr-FR" dirty="0"/>
+              <a:t> log : cf. formula</a:t>
+            </a:r>
+          </a:p>
+          <a:p>
+            <a:r>
+              <a:rPr lang="fr-FR" dirty="0" err="1"/>
+              <a:t>Why</a:t>
+            </a:r>
+            <a:r>
+              <a:rPr lang="fr-FR" dirty="0"/>
+              <a:t> </a:t>
+            </a:r>
+            <a:r>
+              <a:rPr lang="fr-FR" dirty="0" err="1"/>
+              <a:t>SoftMax</a:t>
+            </a:r>
+            <a:r>
+              <a:rPr lang="fr-FR" dirty="0"/>
+              <a:t>: </a:t>
+            </a:r>
+            <a:r>
+              <a:rPr lang="fr-FR" dirty="0" err="1"/>
+              <a:t>we</a:t>
+            </a:r>
+            <a:r>
+              <a:rPr lang="fr-FR" dirty="0"/>
+              <a:t> </a:t>
+            </a:r>
+            <a:r>
+              <a:rPr lang="fr-FR" dirty="0" err="1"/>
+              <a:t>want</a:t>
+            </a:r>
+            <a:r>
+              <a:rPr lang="fr-FR" dirty="0"/>
+              <a:t> values </a:t>
+            </a:r>
+            <a:r>
+              <a:rPr lang="fr-FR" dirty="0" err="1"/>
+              <a:t>between</a:t>
+            </a:r>
+            <a:r>
+              <a:rPr lang="fr-FR" dirty="0"/>
+              <a:t> 0 and 1!!! Cf. </a:t>
+            </a:r>
+            <a:r>
+              <a:rPr lang="fr-FR" dirty="0" err="1"/>
+              <a:t>next</a:t>
+            </a:r>
+            <a:r>
+              <a:rPr lang="fr-FR" dirty="0"/>
+              <a:t> slide.</a:t>
+            </a:r>
+          </a:p>
+        </p:txBody>
+      </p:sp>
+      <p:sp>
+        <p:nvSpPr>
+          <p:cNvPr id="4" name="Slide Number Placeholder 3"/>
+          <p:cNvSpPr>
+            <a:spLocks noGrp="1"/>
+          </p:cNvSpPr>
+          <p:nvPr>
+            <p:ph type="sldNum" sz="quarter" idx="5"/>
+          </p:nvPr>
+        </p:nvSpPr>
+        <p:spPr/>
+        <p:txBody>
+          <a:bodyPr/>
+          <a:lstStyle/>
+          <a:p>
+            <a:fld id="{B2732108-1823-42F2-979D-D6CF9D74D210}" type="slidenum">
+              <a:rPr lang="en-US" smtClean="0"/>
+              <a:t>20</a:t>
+            </a:fld>
+            <a:endParaRPr lang="en-US"/>
+          </a:p>
+        </p:txBody>
+      </p:sp>
+    </p:spTree>
+    <p:extLst>
+      <p:ext uri="{BB962C8B-B14F-4D97-AF65-F5344CB8AC3E}">
+        <p14:creationId xmlns:p14="http://schemas.microsoft.com/office/powerpoint/2010/main" val="1472243448"/>
+      </p:ext>
+    </p:extLst>
+  </p:cSld>
+  <p:clrMapOvr>
+    <a:masterClrMapping/>
+  </p:clrMapOvr>
+</p:notes>
+</file>
+
+<file path=ppt/notesSlides/notesSlide17.xml><?xml version="1.0" encoding="utf-8"?>
+<p:notes xmlns:a="http://schemas.openxmlformats.org/drawingml/2006/main" xmlns:r="http://schemas.openxmlformats.org/officeDocument/2006/relationships" xmlns:p="http://schemas.openxmlformats.org/presentationml/2006/main">
+  <p:cSld>
+    <p:spTree>
+      <p:nvGrpSpPr>
+        <p:cNvPr id="1" name=""/>
+        <p:cNvGrpSpPr/>
+        <p:nvPr/>
+      </p:nvGrpSpPr>
+      <p:grpSpPr>
+        <a:xfrm>
+          <a:off x="0" y="0"/>
+          <a:ext cx="0" cy="0"/>
+          <a:chOff x="0" y="0"/>
+          <a:chExt cx="0" cy="0"/>
+        </a:xfrm>
+      </p:grpSpPr>
+      <p:sp>
+        <p:nvSpPr>
+          <p:cNvPr id="2" name="Slide Image Placeholder 1"/>
+          <p:cNvSpPr>
+            <a:spLocks noGrp="1" noRot="1" noChangeAspect="1"/>
+          </p:cNvSpPr>
+          <p:nvPr>
+            <p:ph type="sldImg"/>
+          </p:nvPr>
+        </p:nvSpPr>
+        <p:spPr/>
+      </p:sp>
+      <p:sp>
+        <p:nvSpPr>
+          <p:cNvPr id="3" name="Notes Placeholder 2"/>
+          <p:cNvSpPr>
+            <a:spLocks noGrp="1"/>
+          </p:cNvSpPr>
+          <p:nvPr>
+            <p:ph type="body" idx="1"/>
+          </p:nvPr>
+        </p:nvSpPr>
+        <p:spPr/>
+        <p:txBody>
+          <a:bodyPr/>
+          <a:lstStyle/>
+          <a:p>
+            <a:r>
+              <a:rPr lang="fr-FR" dirty="0" err="1"/>
+              <a:t>We</a:t>
+            </a:r>
+            <a:r>
+              <a:rPr lang="fr-FR" dirty="0"/>
+              <a:t> </a:t>
+            </a:r>
+            <a:r>
+              <a:rPr lang="fr-FR" dirty="0" err="1"/>
+              <a:t>want</a:t>
+            </a:r>
+            <a:r>
+              <a:rPr lang="fr-FR" dirty="0"/>
+              <a:t> </a:t>
+            </a:r>
+            <a:r>
+              <a:rPr lang="fr-FR" dirty="0" err="1"/>
+              <a:t>probabilities</a:t>
+            </a:r>
+            <a:r>
+              <a:rPr lang="fr-FR" dirty="0"/>
+              <a:t>! And </a:t>
+            </a:r>
+            <a:r>
+              <a:rPr lang="fr-FR" dirty="0" err="1"/>
+              <a:t>we</a:t>
+            </a:r>
+            <a:r>
+              <a:rPr lang="fr-FR" dirty="0"/>
+              <a:t> </a:t>
+            </a:r>
+            <a:r>
+              <a:rPr lang="fr-FR" dirty="0" err="1"/>
+              <a:t>don’t</a:t>
+            </a:r>
+            <a:r>
+              <a:rPr lang="fr-FR" dirty="0"/>
+              <a:t> </a:t>
+            </a:r>
+            <a:r>
+              <a:rPr lang="fr-FR" dirty="0" err="1"/>
+              <a:t>want</a:t>
+            </a:r>
+            <a:r>
+              <a:rPr lang="fr-FR" dirty="0"/>
+              <a:t> </a:t>
+            </a:r>
+            <a:r>
+              <a:rPr lang="fr-FR" dirty="0" err="1"/>
+              <a:t>negative</a:t>
+            </a:r>
+            <a:r>
+              <a:rPr lang="fr-FR" dirty="0"/>
+              <a:t> values in a </a:t>
+            </a:r>
+            <a:r>
+              <a:rPr lang="fr-FR" dirty="0" err="1"/>
+              <a:t>logarithm</a:t>
+            </a:r>
+            <a:r>
+              <a:rPr lang="fr-FR" dirty="0"/>
+              <a:t> …</a:t>
+            </a:r>
+          </a:p>
+          <a:p>
+            <a:endParaRPr lang="fr-FR" dirty="0"/>
+          </a:p>
+          <a:p>
+            <a:r>
+              <a:rPr lang="fr-FR" dirty="0"/>
+              <a:t>Image source: https://www.youtube.com/watch?v=Pwgpl9mKars</a:t>
+            </a:r>
+          </a:p>
+        </p:txBody>
+      </p:sp>
+      <p:sp>
+        <p:nvSpPr>
+          <p:cNvPr id="4" name="Slide Number Placeholder 3"/>
+          <p:cNvSpPr>
+            <a:spLocks noGrp="1"/>
+          </p:cNvSpPr>
+          <p:nvPr>
+            <p:ph type="sldNum" sz="quarter" idx="5"/>
+          </p:nvPr>
+        </p:nvSpPr>
+        <p:spPr/>
+        <p:txBody>
+          <a:bodyPr/>
+          <a:lstStyle/>
+          <a:p>
+            <a:fld id="{B2732108-1823-42F2-979D-D6CF9D74D210}" type="slidenum">
+              <a:rPr lang="en-US" smtClean="0"/>
+              <a:t>21</a:t>
+            </a:fld>
+            <a:endParaRPr lang="en-US"/>
+          </a:p>
+        </p:txBody>
+      </p:sp>
+    </p:spTree>
+    <p:extLst>
+      <p:ext uri="{BB962C8B-B14F-4D97-AF65-F5344CB8AC3E}">
+        <p14:creationId xmlns:p14="http://schemas.microsoft.com/office/powerpoint/2010/main" val="1484181234"/>
       </p:ext>
     </p:extLst>
   </p:cSld>
@@ -6736,6 +7635,1812 @@
 </p:sld>
 </file>
 
+<file path=ppt/slides/slide16.xml><?xml version="1.0" encoding="utf-8"?>
+<p:sld xmlns:a="http://schemas.openxmlformats.org/drawingml/2006/main" xmlns:r="http://schemas.openxmlformats.org/officeDocument/2006/relationships" xmlns:p="http://schemas.openxmlformats.org/presentationml/2006/main">
+  <p:cSld>
+    <p:spTree>
+      <p:nvGrpSpPr>
+        <p:cNvPr id="1" name=""/>
+        <p:cNvGrpSpPr/>
+        <p:nvPr/>
+      </p:nvGrpSpPr>
+      <p:grpSpPr>
+        <a:xfrm>
+          <a:off x="0" y="0"/>
+          <a:ext cx="0" cy="0"/>
+          <a:chOff x="0" y="0"/>
+          <a:chExt cx="0" cy="0"/>
+        </a:xfrm>
+      </p:grpSpPr>
+      <p:sp>
+        <p:nvSpPr>
+          <p:cNvPr id="5" name="Title 4">
+            <a:extLst>
+              <a:ext uri="{FF2B5EF4-FFF2-40B4-BE49-F238E27FC236}">
+                <a16:creationId xmlns:a16="http://schemas.microsoft.com/office/drawing/2014/main" id="{64213D2F-A106-3319-AA98-37F0C11F906C}"/>
+              </a:ext>
+            </a:extLst>
+          </p:cNvPr>
+          <p:cNvSpPr>
+            <a:spLocks noGrp="1"/>
+          </p:cNvSpPr>
+          <p:nvPr>
+            <p:ph type="title"/>
+          </p:nvPr>
+        </p:nvSpPr>
+        <p:spPr/>
+        <p:txBody>
+          <a:bodyPr/>
+          <a:lstStyle/>
+          <a:p>
+            <a:r>
+              <a:rPr lang="en-US" dirty="0"/>
+              <a:t>Losses</a:t>
+            </a:r>
+          </a:p>
+        </p:txBody>
+      </p:sp>
+      <p:pic>
+        <p:nvPicPr>
+          <p:cNvPr id="2" name="Picture 2" descr="equation ">
+            <a:extLst>
+              <a:ext uri="{FF2B5EF4-FFF2-40B4-BE49-F238E27FC236}">
+                <a16:creationId xmlns:a16="http://schemas.microsoft.com/office/drawing/2014/main" id="{D68EB52A-CEDB-A34D-1BD3-95211602051B}"/>
+              </a:ext>
+            </a:extLst>
+          </p:cNvPr>
+          <p:cNvPicPr>
+            <a:picLocks noChangeAspect="1" noChangeArrowheads="1"/>
+          </p:cNvPicPr>
+          <p:nvPr/>
+        </p:nvPicPr>
+        <p:blipFill>
+          <a:blip r:embed="rId3">
+            <a:extLst>
+              <a:ext uri="{28A0092B-C50C-407E-A947-70E740481C1C}">
+                <a14:useLocalDpi xmlns:a14="http://schemas.microsoft.com/office/drawing/2010/main" val="0"/>
+              </a:ext>
+            </a:extLst>
+          </a:blip>
+          <a:srcRect/>
+          <a:stretch>
+            <a:fillRect/>
+          </a:stretch>
+        </p:blipFill>
+        <p:spPr bwMode="auto">
+          <a:xfrm>
+            <a:off x="4781550" y="1690688"/>
+            <a:ext cx="2628900" cy="381000"/>
+          </a:xfrm>
+          <a:prstGeom prst="rect">
+            <a:avLst/>
+          </a:prstGeom>
+          <a:noFill/>
+          <a:extLst>
+            <a:ext uri="{909E8E84-426E-40DD-AFC4-6F175D3DCCD1}">
+              <a14:hiddenFill xmlns:a14="http://schemas.microsoft.com/office/drawing/2010/main">
+                <a:solidFill>
+                  <a:srgbClr val="FFFFFF"/>
+                </a:solidFill>
+              </a14:hiddenFill>
+            </a:ext>
+          </a:extLst>
+        </p:spPr>
+      </p:pic>
+      <p:sp>
+        <p:nvSpPr>
+          <p:cNvPr id="7" name="TextBox 6">
+            <a:extLst>
+              <a:ext uri="{FF2B5EF4-FFF2-40B4-BE49-F238E27FC236}">
+                <a16:creationId xmlns:a16="http://schemas.microsoft.com/office/drawing/2014/main" id="{B820A7B5-540A-E866-E1F3-453C80A5D422}"/>
+              </a:ext>
+            </a:extLst>
+          </p:cNvPr>
+          <p:cNvSpPr txBox="1"/>
+          <p:nvPr/>
+        </p:nvSpPr>
+        <p:spPr>
+          <a:xfrm>
+            <a:off x="5229225" y="2092762"/>
+            <a:ext cx="1733550" cy="369332"/>
+          </a:xfrm>
+          <a:prstGeom prst="rect">
+            <a:avLst/>
+          </a:prstGeom>
+          <a:noFill/>
+        </p:spPr>
+        <p:txBody>
+          <a:bodyPr wrap="square">
+            <a:spAutoFit/>
+          </a:bodyPr>
+          <a:lstStyle/>
+          <a:p>
+            <a:r>
+              <a:rPr lang="fr-FR" dirty="0">
+                <a:solidFill>
+                  <a:schemeClr val="bg1"/>
+                </a:solidFill>
+                <a:highlight>
+                  <a:srgbClr val="000000"/>
+                </a:highlight>
+              </a:rPr>
+              <a:t>torch.nn.L1Loss</a:t>
+            </a:r>
+          </a:p>
+        </p:txBody>
+      </p:sp>
+      <p:pic>
+        <p:nvPicPr>
+          <p:cNvPr id="1029" name="Picture 5" descr="equation">
+            <a:extLst>
+              <a:ext uri="{FF2B5EF4-FFF2-40B4-BE49-F238E27FC236}">
+                <a16:creationId xmlns:a16="http://schemas.microsoft.com/office/drawing/2014/main" id="{F44832C7-4007-01E9-3556-01CF36003AE2}"/>
+              </a:ext>
+            </a:extLst>
+          </p:cNvPr>
+          <p:cNvPicPr>
+            <a:picLocks noChangeAspect="1" noChangeArrowheads="1"/>
+          </p:cNvPicPr>
+          <p:nvPr/>
+        </p:nvPicPr>
+        <p:blipFill>
+          <a:blip r:embed="rId4">
+            <a:extLst>
+              <a:ext uri="{28A0092B-C50C-407E-A947-70E740481C1C}">
+                <a14:useLocalDpi xmlns:a14="http://schemas.microsoft.com/office/drawing/2010/main" val="0"/>
+              </a:ext>
+            </a:extLst>
+          </a:blip>
+          <a:srcRect/>
+          <a:stretch>
+            <a:fillRect/>
+          </a:stretch>
+        </p:blipFill>
+        <p:spPr bwMode="auto">
+          <a:xfrm>
+            <a:off x="4810125" y="3025140"/>
+            <a:ext cx="2571750" cy="457200"/>
+          </a:xfrm>
+          <a:prstGeom prst="rect">
+            <a:avLst/>
+          </a:prstGeom>
+          <a:noFill/>
+          <a:extLst>
+            <a:ext uri="{909E8E84-426E-40DD-AFC4-6F175D3DCCD1}">
+              <a14:hiddenFill xmlns:a14="http://schemas.microsoft.com/office/drawing/2010/main">
+                <a:solidFill>
+                  <a:srgbClr val="FFFFFF"/>
+                </a:solidFill>
+              </a14:hiddenFill>
+            </a:ext>
+          </a:extLst>
+        </p:spPr>
+      </p:pic>
+      <p:sp>
+        <p:nvSpPr>
+          <p:cNvPr id="9" name="TextBox 8">
+            <a:extLst>
+              <a:ext uri="{FF2B5EF4-FFF2-40B4-BE49-F238E27FC236}">
+                <a16:creationId xmlns:a16="http://schemas.microsoft.com/office/drawing/2014/main" id="{4BE71FDB-4B68-BE54-C264-9F201199579E}"/>
+              </a:ext>
+            </a:extLst>
+          </p:cNvPr>
+          <p:cNvSpPr txBox="1"/>
+          <p:nvPr/>
+        </p:nvSpPr>
+        <p:spPr>
+          <a:xfrm>
+            <a:off x="3048000" y="3482340"/>
+            <a:ext cx="6096000" cy="369332"/>
+          </a:xfrm>
+          <a:prstGeom prst="rect">
+            <a:avLst/>
+          </a:prstGeom>
+          <a:noFill/>
+        </p:spPr>
+        <p:txBody>
+          <a:bodyPr wrap="square">
+            <a:spAutoFit/>
+          </a:bodyPr>
+          <a:lstStyle/>
+          <a:p>
+            <a:pPr algn="ctr"/>
+            <a:r>
+              <a:rPr lang="fr-FR" dirty="0" err="1">
+                <a:solidFill>
+                  <a:schemeClr val="bg1"/>
+                </a:solidFill>
+                <a:highlight>
+                  <a:srgbClr val="000000"/>
+                </a:highlight>
+              </a:rPr>
+              <a:t>torch.nn.MSELoss</a:t>
+            </a:r>
+            <a:endParaRPr lang="fr-FR" dirty="0">
+              <a:solidFill>
+                <a:schemeClr val="bg1"/>
+              </a:solidFill>
+              <a:highlight>
+                <a:srgbClr val="000000"/>
+              </a:highlight>
+            </a:endParaRPr>
+          </a:p>
+        </p:txBody>
+      </p:sp>
+      <p:sp>
+        <p:nvSpPr>
+          <p:cNvPr id="10" name="TextBox 9">
+            <a:extLst>
+              <a:ext uri="{FF2B5EF4-FFF2-40B4-BE49-F238E27FC236}">
+                <a16:creationId xmlns:a16="http://schemas.microsoft.com/office/drawing/2014/main" id="{4BD0586E-1D11-D41F-03F6-4DA9B2D886BE}"/>
+              </a:ext>
+            </a:extLst>
+          </p:cNvPr>
+          <p:cNvSpPr txBox="1"/>
+          <p:nvPr/>
+        </p:nvSpPr>
+        <p:spPr>
+          <a:xfrm>
+            <a:off x="2170021" y="4705647"/>
+            <a:ext cx="7851958" cy="461665"/>
+          </a:xfrm>
+          <a:prstGeom prst="rect">
+            <a:avLst/>
+          </a:prstGeom>
+          <a:noFill/>
+        </p:spPr>
+        <p:txBody>
+          <a:bodyPr wrap="none" rtlCol="0">
+            <a:spAutoFit/>
+          </a:bodyPr>
+          <a:lstStyle/>
+          <a:p>
+            <a:pPr algn="ctr"/>
+            <a:r>
+              <a:rPr lang="en-US" sz="2400" dirty="0"/>
+              <a:t>In the case of categorical output, what should be considered?</a:t>
+            </a:r>
+            <a:endParaRPr lang="fr-FR" sz="2400" dirty="0"/>
+          </a:p>
+        </p:txBody>
+      </p:sp>
+    </p:spTree>
+    <p:extLst>
+      <p:ext uri="{BB962C8B-B14F-4D97-AF65-F5344CB8AC3E}">
+        <p14:creationId xmlns:p14="http://schemas.microsoft.com/office/powerpoint/2010/main" val="2404773346"/>
+      </p:ext>
+    </p:extLst>
+  </p:cSld>
+  <p:clrMapOvr>
+    <a:masterClrMapping/>
+  </p:clrMapOvr>
+  <mc:AlternateContent xmlns:mc="http://schemas.openxmlformats.org/markup-compatibility/2006">
+    <mc:Choice xmlns:p14="http://schemas.microsoft.com/office/powerpoint/2010/main" Requires="p14">
+      <p:transition spd="med" p14:dur="700">
+        <p:fade/>
+      </p:transition>
+    </mc:Choice>
+    <mc:Fallback>
+      <p:transition spd="med">
+        <p:fade/>
+      </p:transition>
+    </mc:Fallback>
+  </mc:AlternateContent>
+  <p:timing>
+    <p:tnLst>
+      <p:par>
+        <p:cTn id="1" dur="indefinite" restart="never" nodeType="tmRoot">
+          <p:childTnLst>
+            <p:seq concurrent="1" nextAc="seek">
+              <p:cTn id="2" dur="indefinite" nodeType="mainSeq">
+                <p:childTnLst>
+                  <p:par>
+                    <p:cTn id="3" fill="hold">
+                      <p:stCondLst>
+                        <p:cond delay="indefinite"/>
+                      </p:stCondLst>
+                      <p:childTnLst>
+                        <p:par>
+                          <p:cTn id="4" fill="hold">
+                            <p:stCondLst>
+                              <p:cond delay="0"/>
+                            </p:stCondLst>
+                            <p:childTnLst>
+                              <p:par>
+                                <p:cTn id="5" presetID="10" presetClass="entr" presetSubtype="0" fill="hold" nodeType="clickEffect">
+                                  <p:stCondLst>
+                                    <p:cond delay="0"/>
+                                  </p:stCondLst>
+                                  <p:childTnLst>
+                                    <p:set>
+                                      <p:cBhvr>
+                                        <p:cTn id="6" dur="1" fill="hold">
+                                          <p:stCondLst>
+                                            <p:cond delay="0"/>
+                                          </p:stCondLst>
+                                        </p:cTn>
+                                        <p:tgtEl>
+                                          <p:spTgt spid="1029"/>
+                                        </p:tgtEl>
+                                        <p:attrNameLst>
+                                          <p:attrName>style.visibility</p:attrName>
+                                        </p:attrNameLst>
+                                      </p:cBhvr>
+                                      <p:to>
+                                        <p:strVal val="visible"/>
+                                      </p:to>
+                                    </p:set>
+                                    <p:animEffect transition="in" filter="fade">
+                                      <p:cBhvr>
+                                        <p:cTn id="7" dur="500"/>
+                                        <p:tgtEl>
+                                          <p:spTgt spid="1029"/>
+                                        </p:tgtEl>
+                                      </p:cBhvr>
+                                    </p:animEffect>
+                                  </p:childTnLst>
+                                </p:cTn>
+                              </p:par>
+                              <p:par>
+                                <p:cTn id="8" presetID="10" presetClass="entr" presetSubtype="0" fill="hold" grpId="0" nodeType="withEffect">
+                                  <p:stCondLst>
+                                    <p:cond delay="0"/>
+                                  </p:stCondLst>
+                                  <p:childTnLst>
+                                    <p:set>
+                                      <p:cBhvr>
+                                        <p:cTn id="9" dur="1" fill="hold">
+                                          <p:stCondLst>
+                                            <p:cond delay="0"/>
+                                          </p:stCondLst>
+                                        </p:cTn>
+                                        <p:tgtEl>
+                                          <p:spTgt spid="9"/>
+                                        </p:tgtEl>
+                                        <p:attrNameLst>
+                                          <p:attrName>style.visibility</p:attrName>
+                                        </p:attrNameLst>
+                                      </p:cBhvr>
+                                      <p:to>
+                                        <p:strVal val="visible"/>
+                                      </p:to>
+                                    </p:set>
+                                    <p:animEffect transition="in" filter="fade">
+                                      <p:cBhvr>
+                                        <p:cTn id="10" dur="500"/>
+                                        <p:tgtEl>
+                                          <p:spTgt spid="9"/>
+                                        </p:tgtEl>
+                                      </p:cBhvr>
+                                    </p:animEffect>
+                                  </p:childTnLst>
+                                </p:cTn>
+                              </p:par>
+                            </p:childTnLst>
+                          </p:cTn>
+                        </p:par>
+                      </p:childTnLst>
+                    </p:cTn>
+                  </p:par>
+                  <p:par>
+                    <p:cTn id="11" fill="hold">
+                      <p:stCondLst>
+                        <p:cond delay="indefinite"/>
+                      </p:stCondLst>
+                      <p:childTnLst>
+                        <p:par>
+                          <p:cTn id="12" fill="hold">
+                            <p:stCondLst>
+                              <p:cond delay="0"/>
+                            </p:stCondLst>
+                            <p:childTnLst>
+                              <p:par>
+                                <p:cTn id="13" presetID="10" presetClass="entr" presetSubtype="0" fill="hold" grpId="0" nodeType="clickEffect">
+                                  <p:stCondLst>
+                                    <p:cond delay="0"/>
+                                  </p:stCondLst>
+                                  <p:childTnLst>
+                                    <p:set>
+                                      <p:cBhvr>
+                                        <p:cTn id="14" dur="1" fill="hold">
+                                          <p:stCondLst>
+                                            <p:cond delay="0"/>
+                                          </p:stCondLst>
+                                        </p:cTn>
+                                        <p:tgtEl>
+                                          <p:spTgt spid="10"/>
+                                        </p:tgtEl>
+                                        <p:attrNameLst>
+                                          <p:attrName>style.visibility</p:attrName>
+                                        </p:attrNameLst>
+                                      </p:cBhvr>
+                                      <p:to>
+                                        <p:strVal val="visible"/>
+                                      </p:to>
+                                    </p:set>
+                                    <p:animEffect transition="in" filter="fade">
+                                      <p:cBhvr>
+                                        <p:cTn id="15" dur="500"/>
+                                        <p:tgtEl>
+                                          <p:spTgt spid="10"/>
+                                        </p:tgtEl>
+                                      </p:cBhvr>
+                                    </p:animEffect>
+                                  </p:childTnLst>
+                                </p:cTn>
+                              </p:par>
+                            </p:childTnLst>
+                          </p:cTn>
+                        </p:par>
+                      </p:childTnLst>
+                    </p:cTn>
+                  </p:par>
+                </p:childTnLst>
+              </p:cTn>
+              <p:prevCondLst>
+                <p:cond evt="onPrev" delay="0">
+                  <p:tgtEl>
+                    <p:sldTgt/>
+                  </p:tgtEl>
+                </p:cond>
+              </p:prevCondLst>
+              <p:nextCondLst>
+                <p:cond evt="onNext" delay="0">
+                  <p:tgtEl>
+                    <p:sldTgt/>
+                  </p:tgtEl>
+                </p:cond>
+              </p:nextCondLst>
+            </p:seq>
+          </p:childTnLst>
+        </p:cTn>
+      </p:par>
+    </p:tnLst>
+    <p:bldLst>
+      <p:bldP spid="9" grpId="0"/>
+      <p:bldP spid="10" grpId="0"/>
+    </p:bldLst>
+  </p:timing>
+</p:sld>
+</file>
+
+<file path=ppt/slides/slide17.xml><?xml version="1.0" encoding="utf-8"?>
+<p:sld xmlns:a="http://schemas.openxmlformats.org/drawingml/2006/main" xmlns:r="http://schemas.openxmlformats.org/officeDocument/2006/relationships" xmlns:p="http://schemas.openxmlformats.org/presentationml/2006/main">
+  <p:cSld>
+    <p:spTree>
+      <p:nvGrpSpPr>
+        <p:cNvPr id="1" name=""/>
+        <p:cNvGrpSpPr/>
+        <p:nvPr/>
+      </p:nvGrpSpPr>
+      <p:grpSpPr>
+        <a:xfrm>
+          <a:off x="0" y="0"/>
+          <a:ext cx="0" cy="0"/>
+          <a:chOff x="0" y="0"/>
+          <a:chExt cx="0" cy="0"/>
+        </a:xfrm>
+      </p:grpSpPr>
+      <p:sp>
+        <p:nvSpPr>
+          <p:cNvPr id="5" name="Title 4">
+            <a:extLst>
+              <a:ext uri="{FF2B5EF4-FFF2-40B4-BE49-F238E27FC236}">
+                <a16:creationId xmlns:a16="http://schemas.microsoft.com/office/drawing/2014/main" id="{64213D2F-A106-3319-AA98-37F0C11F906C}"/>
+              </a:ext>
+            </a:extLst>
+          </p:cNvPr>
+          <p:cNvSpPr>
+            <a:spLocks noGrp="1"/>
+          </p:cNvSpPr>
+          <p:nvPr>
+            <p:ph type="title"/>
+          </p:nvPr>
+        </p:nvSpPr>
+        <p:spPr/>
+        <p:txBody>
+          <a:bodyPr/>
+          <a:lstStyle/>
+          <a:p>
+            <a:r>
+              <a:rPr lang="en-US" dirty="0"/>
+              <a:t>Losses</a:t>
+            </a:r>
+          </a:p>
+        </p:txBody>
+      </p:sp>
+      <p:pic>
+        <p:nvPicPr>
+          <p:cNvPr id="4" name="Picture 3">
+            <a:extLst>
+              <a:ext uri="{FF2B5EF4-FFF2-40B4-BE49-F238E27FC236}">
+                <a16:creationId xmlns:a16="http://schemas.microsoft.com/office/drawing/2014/main" id="{0E375790-08E1-063C-5C75-3082B3BB17C5}"/>
+              </a:ext>
+            </a:extLst>
+          </p:cNvPr>
+          <p:cNvPicPr>
+            <a:picLocks noChangeAspect="1"/>
+          </p:cNvPicPr>
+          <p:nvPr/>
+        </p:nvPicPr>
+        <p:blipFill>
+          <a:blip r:embed="rId3"/>
+          <a:stretch>
+            <a:fillRect/>
+          </a:stretch>
+        </p:blipFill>
+        <p:spPr>
+          <a:xfrm>
+            <a:off x="2712309" y="1690688"/>
+            <a:ext cx="6767382" cy="2712863"/>
+          </a:xfrm>
+          <a:prstGeom prst="rect">
+            <a:avLst/>
+          </a:prstGeom>
+        </p:spPr>
+      </p:pic>
+      <p:sp>
+        <p:nvSpPr>
+          <p:cNvPr id="6" name="TextBox 5">
+            <a:extLst>
+              <a:ext uri="{FF2B5EF4-FFF2-40B4-BE49-F238E27FC236}">
+                <a16:creationId xmlns:a16="http://schemas.microsoft.com/office/drawing/2014/main" id="{7536C4E8-E674-EE2E-F4C4-F6C8FCE59DF2}"/>
+              </a:ext>
+            </a:extLst>
+          </p:cNvPr>
+          <p:cNvSpPr txBox="1"/>
+          <p:nvPr/>
+        </p:nvSpPr>
+        <p:spPr>
+          <a:xfrm>
+            <a:off x="2680866" y="4528785"/>
+            <a:ext cx="6988965" cy="1200329"/>
+          </a:xfrm>
+          <a:prstGeom prst="rect">
+            <a:avLst/>
+          </a:prstGeom>
+          <a:noFill/>
+        </p:spPr>
+        <p:txBody>
+          <a:bodyPr wrap="none" rtlCol="0">
+            <a:spAutoFit/>
+          </a:bodyPr>
+          <a:lstStyle/>
+          <a:p>
+            <a:r>
+              <a:rPr lang="en-GB" sz="2400" dirty="0"/>
+              <a:t>- </a:t>
+            </a:r>
+            <a:r>
+              <a:rPr lang="en-GB" sz="2400" b="1" dirty="0"/>
+              <a:t>i:</a:t>
+            </a:r>
+            <a:r>
+              <a:rPr lang="en-GB" sz="2400" dirty="0"/>
+              <a:t> input</a:t>
+            </a:r>
+          </a:p>
+          <a:p>
+            <a:r>
+              <a:rPr lang="en-GB" sz="2400" dirty="0"/>
+              <a:t>- </a:t>
+            </a:r>
+            <a:r>
+              <a:rPr lang="en-GB" sz="2400" b="1" dirty="0"/>
+              <a:t>P*:</a:t>
+            </a:r>
+            <a:r>
+              <a:rPr lang="en-GB" sz="2400" dirty="0"/>
+              <a:t> true probability (P*(</a:t>
+            </a:r>
+            <a:r>
+              <a:rPr lang="en-GB" sz="2400" dirty="0" err="1"/>
+              <a:t>i</a:t>
+            </a:r>
+            <a:r>
+              <a:rPr lang="en-GB" sz="2400" dirty="0"/>
+              <a:t>) is either going to be 0 or 1)</a:t>
+            </a:r>
+          </a:p>
+          <a:p>
+            <a:r>
+              <a:rPr lang="en-GB" sz="2400" dirty="0"/>
+              <a:t>- </a:t>
+            </a:r>
+            <a:r>
+              <a:rPr lang="en-GB" sz="2400" b="1" dirty="0"/>
+              <a:t>P:</a:t>
+            </a:r>
+            <a:r>
+              <a:rPr lang="en-GB" sz="2400" dirty="0"/>
+              <a:t> predicted probability</a:t>
+            </a:r>
+          </a:p>
+        </p:txBody>
+      </p:sp>
+    </p:spTree>
+    <p:extLst>
+      <p:ext uri="{BB962C8B-B14F-4D97-AF65-F5344CB8AC3E}">
+        <p14:creationId xmlns:p14="http://schemas.microsoft.com/office/powerpoint/2010/main" val="1672771701"/>
+      </p:ext>
+    </p:extLst>
+  </p:cSld>
+  <p:clrMapOvr>
+    <a:masterClrMapping/>
+  </p:clrMapOvr>
+  <mc:AlternateContent xmlns:mc="http://schemas.openxmlformats.org/markup-compatibility/2006">
+    <mc:Choice xmlns:p14="http://schemas.microsoft.com/office/powerpoint/2010/main" Requires="p14">
+      <p:transition spd="med" p14:dur="700">
+        <p:fade/>
+      </p:transition>
+    </mc:Choice>
+    <mc:Fallback>
+      <p:transition spd="med">
+        <p:fade/>
+      </p:transition>
+    </mc:Fallback>
+  </mc:AlternateContent>
+</p:sld>
+</file>
+
+<file path=ppt/slides/slide18.xml><?xml version="1.0" encoding="utf-8"?>
+<p:sld xmlns:a="http://schemas.openxmlformats.org/drawingml/2006/main" xmlns:r="http://schemas.openxmlformats.org/officeDocument/2006/relationships" xmlns:p="http://schemas.openxmlformats.org/presentationml/2006/main">
+  <p:cSld>
+    <p:spTree>
+      <p:nvGrpSpPr>
+        <p:cNvPr id="1" name=""/>
+        <p:cNvGrpSpPr/>
+        <p:nvPr/>
+      </p:nvGrpSpPr>
+      <p:grpSpPr>
+        <a:xfrm>
+          <a:off x="0" y="0"/>
+          <a:ext cx="0" cy="0"/>
+          <a:chOff x="0" y="0"/>
+          <a:chExt cx="0" cy="0"/>
+        </a:xfrm>
+      </p:grpSpPr>
+      <p:sp>
+        <p:nvSpPr>
+          <p:cNvPr id="5" name="Title 4">
+            <a:extLst>
+              <a:ext uri="{FF2B5EF4-FFF2-40B4-BE49-F238E27FC236}">
+                <a16:creationId xmlns:a16="http://schemas.microsoft.com/office/drawing/2014/main" id="{64213D2F-A106-3319-AA98-37F0C11F906C}"/>
+              </a:ext>
+            </a:extLst>
+          </p:cNvPr>
+          <p:cNvSpPr>
+            <a:spLocks noGrp="1"/>
+          </p:cNvSpPr>
+          <p:nvPr>
+            <p:ph type="title"/>
+          </p:nvPr>
+        </p:nvSpPr>
+        <p:spPr/>
+        <p:txBody>
+          <a:bodyPr/>
+          <a:lstStyle/>
+          <a:p>
+            <a:r>
+              <a:rPr lang="en-US" dirty="0"/>
+              <a:t>Losses</a:t>
+            </a:r>
+          </a:p>
+        </p:txBody>
+      </p:sp>
+      <p:sp>
+        <p:nvSpPr>
+          <p:cNvPr id="7" name="TextBox 6">
+            <a:extLst>
+              <a:ext uri="{FF2B5EF4-FFF2-40B4-BE49-F238E27FC236}">
+                <a16:creationId xmlns:a16="http://schemas.microsoft.com/office/drawing/2014/main" id="{B820A7B5-540A-E866-E1F3-453C80A5D422}"/>
+              </a:ext>
+            </a:extLst>
+          </p:cNvPr>
+          <p:cNvSpPr txBox="1"/>
+          <p:nvPr/>
+        </p:nvSpPr>
+        <p:spPr>
+          <a:xfrm>
+            <a:off x="5201601" y="5936558"/>
+            <a:ext cx="1788795" cy="369332"/>
+          </a:xfrm>
+          <a:prstGeom prst="rect">
+            <a:avLst/>
+          </a:prstGeom>
+          <a:noFill/>
+        </p:spPr>
+        <p:txBody>
+          <a:bodyPr wrap="square">
+            <a:spAutoFit/>
+          </a:bodyPr>
+          <a:lstStyle/>
+          <a:p>
+            <a:r>
+              <a:rPr lang="fr-FR" dirty="0" err="1">
+                <a:solidFill>
+                  <a:schemeClr val="bg1"/>
+                </a:solidFill>
+                <a:highlight>
+                  <a:srgbClr val="000000"/>
+                </a:highlight>
+              </a:rPr>
+              <a:t>torch.nn.NLLLoss</a:t>
+            </a:r>
+            <a:endParaRPr lang="fr-FR" dirty="0">
+              <a:solidFill>
+                <a:schemeClr val="bg1"/>
+              </a:solidFill>
+              <a:highlight>
+                <a:srgbClr val="000000"/>
+              </a:highlight>
+            </a:endParaRPr>
+          </a:p>
+        </p:txBody>
+      </p:sp>
+      <p:pic>
+        <p:nvPicPr>
+          <p:cNvPr id="8" name="Picture 7">
+            <a:extLst>
+              <a:ext uri="{FF2B5EF4-FFF2-40B4-BE49-F238E27FC236}">
+                <a16:creationId xmlns:a16="http://schemas.microsoft.com/office/drawing/2014/main" id="{07AE5D7C-10EA-D99B-20C6-B8507F587AE8}"/>
+              </a:ext>
+            </a:extLst>
+          </p:cNvPr>
+          <p:cNvPicPr>
+            <a:picLocks noChangeAspect="1"/>
+          </p:cNvPicPr>
+          <p:nvPr/>
+        </p:nvPicPr>
+        <p:blipFill>
+          <a:blip r:embed="rId3"/>
+          <a:stretch>
+            <a:fillRect/>
+          </a:stretch>
+        </p:blipFill>
+        <p:spPr>
+          <a:xfrm>
+            <a:off x="5029145" y="1502182"/>
+            <a:ext cx="2133710" cy="590580"/>
+          </a:xfrm>
+          <a:prstGeom prst="rect">
+            <a:avLst/>
+          </a:prstGeom>
+        </p:spPr>
+      </p:pic>
+      <mc:AlternateContent xmlns:mc="http://schemas.openxmlformats.org/markup-compatibility/2006">
+        <mc:Choice xmlns:a14="http://schemas.microsoft.com/office/drawing/2010/main" Requires="a14">
+          <p:sp>
+            <p:nvSpPr>
+              <p:cNvPr id="11" name="TextBox 10">
+                <a:extLst>
+                  <a:ext uri="{FF2B5EF4-FFF2-40B4-BE49-F238E27FC236}">
+                    <a16:creationId xmlns:a16="http://schemas.microsoft.com/office/drawing/2014/main" id="{FCC075F3-CCA7-BE86-8213-73C16D81926C}"/>
+                  </a:ext>
+                </a:extLst>
+              </p:cNvPr>
+              <p:cNvSpPr txBox="1"/>
+              <p:nvPr/>
+            </p:nvSpPr>
+            <p:spPr>
+              <a:xfrm>
+                <a:off x="2397281" y="2092762"/>
+                <a:ext cx="8395696" cy="1527726"/>
+              </a:xfrm>
+              <a:prstGeom prst="rect">
+                <a:avLst/>
+              </a:prstGeom>
+              <a:noFill/>
+            </p:spPr>
+            <p:txBody>
+              <a:bodyPr wrap="none" rtlCol="0">
+                <a:spAutoFit/>
+              </a:bodyPr>
+              <a:lstStyle/>
+              <a:p>
+                <a:r>
+                  <a:rPr lang="fr-FR" b="0" dirty="0"/>
+                  <a:t>- </a:t>
+                </a:r>
+                <a14:m>
+                  <m:oMath xmlns:m="http://schemas.openxmlformats.org/officeDocument/2006/math">
+                    <m:r>
+                      <a:rPr lang="fr-FR" b="0" i="1" smtClean="0">
+                        <a:latin typeface="Cambria Math" panose="02040503050406030204" pitchFamily="18" charset="0"/>
+                      </a:rPr>
+                      <m:t>𝑛</m:t>
+                    </m:r>
+                    <m:r>
+                      <a:rPr lang="fr-FR" b="0" i="1" smtClean="0">
+                        <a:latin typeface="Cambria Math" panose="02040503050406030204" pitchFamily="18" charset="0"/>
+                      </a:rPr>
+                      <m:t>∈</m:t>
+                    </m:r>
+                    <m:r>
+                      <a:rPr lang="fr-FR" b="0" i="1" smtClean="0">
+                        <a:latin typeface="Cambria Math" panose="02040503050406030204" pitchFamily="18" charset="0"/>
+                        <a:ea typeface="Cambria Math" panose="02040503050406030204" pitchFamily="18" charset="0"/>
+                      </a:rPr>
+                      <m:t>ℕ</m:t>
+                    </m:r>
+                  </m:oMath>
+                </a14:m>
+                <a:r>
+                  <a:rPr lang="fr-FR" dirty="0"/>
+                  <a:t> the </a:t>
+                </a:r>
+                <a14:m>
+                  <m:oMath xmlns:m="http://schemas.openxmlformats.org/officeDocument/2006/math">
+                    <m:r>
+                      <a:rPr lang="fr-FR" b="0" i="1" smtClean="0">
+                        <a:latin typeface="Cambria Math" panose="02040503050406030204" pitchFamily="18" charset="0"/>
+                      </a:rPr>
+                      <m:t>𝑛</m:t>
+                    </m:r>
+                    <m:r>
+                      <m:rPr>
+                        <m:sty m:val="p"/>
+                      </m:rPr>
+                      <a:rPr lang="fr-FR" b="0" i="0" baseline="30000" smtClean="0">
+                        <a:latin typeface="Cambria Math" panose="02040503050406030204" pitchFamily="18" charset="0"/>
+                      </a:rPr>
+                      <m:t>nth</m:t>
+                    </m:r>
+                  </m:oMath>
+                </a14:m>
+                <a:r>
+                  <a:rPr lang="fr-FR" dirty="0"/>
+                  <a:t> </a:t>
+                </a:r>
+                <a:r>
+                  <a:rPr lang="fr-FR" dirty="0" err="1"/>
+                  <a:t>element</a:t>
+                </a:r>
+                <a:r>
+                  <a:rPr lang="fr-FR" dirty="0"/>
+                  <a:t> of the </a:t>
+                </a:r>
+                <a:r>
+                  <a:rPr lang="fr-FR" dirty="0" err="1"/>
+                  <a:t>current</a:t>
+                </a:r>
+                <a:r>
+                  <a:rPr lang="fr-FR" dirty="0"/>
+                  <a:t> batch</a:t>
+                </a:r>
+              </a:p>
+              <a:p>
+                <a:r>
+                  <a:rPr lang="fr-FR" b="0" dirty="0"/>
+                  <a:t>- </a:t>
+                </a:r>
+                <a14:m>
+                  <m:oMath xmlns:m="http://schemas.openxmlformats.org/officeDocument/2006/math">
+                    <m:sSub>
+                      <m:sSubPr>
+                        <m:ctrlPr>
+                          <a:rPr lang="fr-FR" b="0" i="1" smtClean="0">
+                            <a:latin typeface="Cambria Math" panose="02040503050406030204" pitchFamily="18" charset="0"/>
+                          </a:rPr>
+                        </m:ctrlPr>
+                      </m:sSubPr>
+                      <m:e>
+                        <m:r>
+                          <a:rPr lang="fr-FR" b="0" i="1" smtClean="0">
+                            <a:latin typeface="Cambria Math" panose="02040503050406030204" pitchFamily="18" charset="0"/>
+                          </a:rPr>
+                          <m:t>𝑤</m:t>
+                        </m:r>
+                      </m:e>
+                      <m:sub>
+                        <m:sSub>
+                          <m:sSubPr>
+                            <m:ctrlPr>
+                              <a:rPr lang="fr-FR" b="0" i="1" smtClean="0">
+                                <a:latin typeface="Cambria Math" panose="02040503050406030204" pitchFamily="18" charset="0"/>
+                              </a:rPr>
+                            </m:ctrlPr>
+                          </m:sSubPr>
+                          <m:e>
+                            <m:r>
+                              <a:rPr lang="fr-FR" b="0" i="1" smtClean="0">
+                                <a:latin typeface="Cambria Math" panose="02040503050406030204" pitchFamily="18" charset="0"/>
+                              </a:rPr>
+                              <m:t>𝑦</m:t>
+                            </m:r>
+                          </m:e>
+                          <m:sub>
+                            <m:r>
+                              <a:rPr lang="fr-FR" b="0" i="1" smtClean="0">
+                                <a:latin typeface="Cambria Math" panose="02040503050406030204" pitchFamily="18" charset="0"/>
+                              </a:rPr>
+                              <m:t>𝑛</m:t>
+                            </m:r>
+                          </m:sub>
+                        </m:sSub>
+                      </m:sub>
+                    </m:sSub>
+                  </m:oMath>
+                </a14:m>
+                <a:r>
+                  <a:rPr lang="fr-FR" dirty="0"/>
+                  <a:t> a </a:t>
+                </a:r>
+                <a:r>
+                  <a:rPr lang="fr-FR" dirty="0" err="1"/>
+                  <a:t>weight</a:t>
+                </a:r>
+                <a:r>
+                  <a:rPr lang="fr-FR" dirty="0"/>
+                  <a:t> in case </a:t>
+                </a:r>
+                <a:r>
+                  <a:rPr lang="fr-FR" dirty="0" err="1"/>
+                  <a:t>some</a:t>
+                </a:r>
+                <a:r>
+                  <a:rPr lang="fr-FR" dirty="0"/>
+                  <a:t> classes have more importance </a:t>
+                </a:r>
+                <a:r>
+                  <a:rPr lang="fr-FR" dirty="0" err="1"/>
+                  <a:t>than</a:t>
+                </a:r>
+                <a:r>
+                  <a:rPr lang="fr-FR" dirty="0"/>
+                  <a:t> </a:t>
+                </a:r>
+                <a:r>
+                  <a:rPr lang="fr-FR" dirty="0" err="1"/>
+                  <a:t>other</a:t>
+                </a:r>
+                <a:r>
+                  <a:rPr lang="fr-FR" dirty="0"/>
+                  <a:t>. P</a:t>
+                </a:r>
+                <a:r>
+                  <a:rPr lang="en-US" dirty="0" err="1"/>
+                  <a:t>articularly</a:t>
+                </a:r>
+                <a:r>
+                  <a:rPr lang="en-US" dirty="0"/>
+                  <a:t> </a:t>
+                </a:r>
+              </a:p>
+              <a:p>
+                <a:r>
+                  <a:rPr lang="en-US" dirty="0"/>
+                  <a:t>useful when you have an unbalanced training set (… later lectures ...)</a:t>
+                </a:r>
+              </a:p>
+              <a:p>
+                <a:r>
+                  <a:rPr lang="fr-FR" b="0" dirty="0"/>
+                  <a:t>- </a:t>
+                </a:r>
+                <a14:m>
+                  <m:oMath xmlns:m="http://schemas.openxmlformats.org/officeDocument/2006/math">
+                    <m:sSub>
+                      <m:sSubPr>
+                        <m:ctrlPr>
+                          <a:rPr lang="fr-FR" b="0" i="1" smtClean="0">
+                            <a:latin typeface="Cambria Math" panose="02040503050406030204" pitchFamily="18" charset="0"/>
+                          </a:rPr>
+                        </m:ctrlPr>
+                      </m:sSubPr>
+                      <m:e>
+                        <m:r>
+                          <a:rPr lang="fr-FR" b="0" i="1" smtClean="0">
+                            <a:latin typeface="Cambria Math" panose="02040503050406030204" pitchFamily="18" charset="0"/>
+                          </a:rPr>
+                          <m:t>𝑥</m:t>
+                        </m:r>
+                      </m:e>
+                      <m:sub>
+                        <m:r>
+                          <a:rPr lang="fr-FR" b="0" i="1" smtClean="0">
+                            <a:latin typeface="Cambria Math" panose="02040503050406030204" pitchFamily="18" charset="0"/>
+                          </a:rPr>
+                          <m:t>𝑛</m:t>
+                        </m:r>
+                        <m:r>
+                          <a:rPr lang="fr-FR" b="0" i="1" smtClean="0">
+                            <a:latin typeface="Cambria Math" panose="02040503050406030204" pitchFamily="18" charset="0"/>
+                          </a:rPr>
+                          <m:t>, </m:t>
+                        </m:r>
+                        <m:sSub>
+                          <m:sSubPr>
+                            <m:ctrlPr>
+                              <a:rPr lang="fr-FR" b="0" i="1" smtClean="0">
+                                <a:latin typeface="Cambria Math" panose="02040503050406030204" pitchFamily="18" charset="0"/>
+                              </a:rPr>
+                            </m:ctrlPr>
+                          </m:sSubPr>
+                          <m:e>
+                            <m:r>
+                              <a:rPr lang="fr-FR" b="0" i="1" smtClean="0">
+                                <a:latin typeface="Cambria Math" panose="02040503050406030204" pitchFamily="18" charset="0"/>
+                              </a:rPr>
+                              <m:t>𝑦</m:t>
+                            </m:r>
+                          </m:e>
+                          <m:sub>
+                            <m:r>
+                              <a:rPr lang="fr-FR" b="0" i="1" smtClean="0">
+                                <a:latin typeface="Cambria Math" panose="02040503050406030204" pitchFamily="18" charset="0"/>
+                              </a:rPr>
+                              <m:t>𝑛</m:t>
+                            </m:r>
+                          </m:sub>
+                        </m:sSub>
+                      </m:sub>
+                    </m:sSub>
+                  </m:oMath>
+                </a14:m>
+                <a:r>
+                  <a:rPr lang="fr-FR" dirty="0"/>
+                  <a:t> the log-</a:t>
+                </a:r>
+                <a:r>
+                  <a:rPr lang="fr-FR" dirty="0" err="1"/>
+                  <a:t>probabilities</a:t>
+                </a:r>
+                <a:r>
+                  <a:rPr lang="fr-FR" dirty="0"/>
+                  <a:t> of the </a:t>
+                </a:r>
+                <a:r>
+                  <a:rPr lang="fr-FR" dirty="0" err="1"/>
+                  <a:t>predicted</a:t>
+                </a:r>
+                <a:r>
+                  <a:rPr lang="fr-FR" dirty="0"/>
+                  <a:t> value of the class y. </a:t>
+                </a:r>
+                <a:r>
+                  <a:rPr lang="fr-FR" b="1" dirty="0"/>
+                  <a:t>No log </a:t>
+                </a:r>
+                <a:r>
+                  <a:rPr lang="fr-FR" b="1" dirty="0" err="1"/>
+                  <a:t>because</a:t>
+                </a:r>
+                <a:r>
+                  <a:rPr lang="fr-FR" b="1" dirty="0"/>
+                  <a:t> if </a:t>
+                </a:r>
+                <a:r>
+                  <a:rPr lang="fr-FR" b="1" dirty="0" err="1"/>
+                  <a:t>we</a:t>
+                </a:r>
+                <a:r>
+                  <a:rPr lang="fr-FR" b="1" dirty="0"/>
+                  <a:t> </a:t>
+                </a:r>
+              </a:p>
+              <a:p>
+                <a:r>
+                  <a:rPr lang="fr-FR" b="1" dirty="0"/>
+                  <a:t>use </a:t>
+                </a:r>
+                <a:r>
+                  <a:rPr lang="fr-FR" b="1" dirty="0" err="1"/>
+                  <a:t>NLLLoss</a:t>
+                </a:r>
+                <a:r>
+                  <a:rPr lang="fr-FR" b="1" dirty="0"/>
+                  <a:t>, </a:t>
+                </a:r>
+                <a:r>
+                  <a:rPr lang="fr-FR" b="1" dirty="0" err="1"/>
+                  <a:t>there</a:t>
+                </a:r>
+                <a:r>
+                  <a:rPr lang="fr-FR" b="1" dirty="0"/>
+                  <a:t> has to </a:t>
+                </a:r>
+                <a:r>
+                  <a:rPr lang="fr-FR" b="1" dirty="0" err="1"/>
+                  <a:t>be</a:t>
+                </a:r>
+                <a:r>
+                  <a:rPr lang="fr-FR" b="1" dirty="0"/>
+                  <a:t> </a:t>
+                </a:r>
+                <a:r>
+                  <a:rPr lang="en-US" b="1" i="1" dirty="0" err="1">
+                    <a:solidFill>
+                      <a:srgbClr val="262626"/>
+                    </a:solidFill>
+                    <a:effectLst/>
+                    <a:latin typeface="FreightSans"/>
+                  </a:rPr>
+                  <a:t>LogSoftmax</a:t>
+                </a:r>
+                <a:r>
+                  <a:rPr lang="en-US" b="1" i="0" dirty="0">
+                    <a:solidFill>
+                      <a:srgbClr val="262626"/>
+                    </a:solidFill>
+                    <a:effectLst/>
+                    <a:latin typeface="FreightSans"/>
+                  </a:rPr>
+                  <a:t> layer in the last layer of your network.</a:t>
+                </a:r>
+                <a:endParaRPr lang="fr-FR" b="1" dirty="0"/>
+              </a:p>
+            </p:txBody>
+          </p:sp>
+        </mc:Choice>
+        <mc:Fallback>
+          <p:sp>
+            <p:nvSpPr>
+              <p:cNvPr id="11" name="TextBox 10">
+                <a:extLst>
+                  <a:ext uri="{FF2B5EF4-FFF2-40B4-BE49-F238E27FC236}">
+                    <a16:creationId xmlns:a16="http://schemas.microsoft.com/office/drawing/2014/main" id="{FCC075F3-CCA7-BE86-8213-73C16D81926C}"/>
+                  </a:ext>
+                </a:extLst>
+              </p:cNvPr>
+              <p:cNvSpPr txBox="1">
+                <a:spLocks noRot="1" noChangeAspect="1" noMove="1" noResize="1" noEditPoints="1" noAdjustHandles="1" noChangeArrowheads="1" noChangeShapeType="1" noTextEdit="1"/>
+              </p:cNvSpPr>
+              <p:nvPr/>
+            </p:nvSpPr>
+            <p:spPr>
+              <a:xfrm>
+                <a:off x="2397281" y="2092762"/>
+                <a:ext cx="8395696" cy="1527726"/>
+              </a:xfrm>
+              <a:prstGeom prst="rect">
+                <a:avLst/>
+              </a:prstGeom>
+              <a:blipFill>
+                <a:blip r:embed="rId4"/>
+                <a:stretch>
+                  <a:fillRect l="-581" t="-1992" b="-5179"/>
+                </a:stretch>
+              </a:blipFill>
+            </p:spPr>
+            <p:txBody>
+              <a:bodyPr/>
+              <a:lstStyle/>
+              <a:p>
+                <a:r>
+                  <a:rPr lang="fr-FR">
+                    <a:noFill/>
+                  </a:rPr>
+                  <a:t> </a:t>
+                </a:r>
+              </a:p>
+            </p:txBody>
+          </p:sp>
+        </mc:Fallback>
+      </mc:AlternateContent>
+      <p:pic>
+        <p:nvPicPr>
+          <p:cNvPr id="13" name="Picture 12">
+            <a:extLst>
+              <a:ext uri="{FF2B5EF4-FFF2-40B4-BE49-F238E27FC236}">
+                <a16:creationId xmlns:a16="http://schemas.microsoft.com/office/drawing/2014/main" id="{8F04CC6F-6170-26EA-BD8C-E8D2A833C12E}"/>
+              </a:ext>
+            </a:extLst>
+          </p:cNvPr>
+          <p:cNvPicPr>
+            <a:picLocks noChangeAspect="1"/>
+          </p:cNvPicPr>
+          <p:nvPr/>
+        </p:nvPicPr>
+        <p:blipFill>
+          <a:blip r:embed="rId5"/>
+          <a:stretch>
+            <a:fillRect/>
+          </a:stretch>
+        </p:blipFill>
+        <p:spPr>
+          <a:xfrm>
+            <a:off x="2266752" y="4441546"/>
+            <a:ext cx="7658494" cy="1251014"/>
+          </a:xfrm>
+          <a:prstGeom prst="rect">
+            <a:avLst/>
+          </a:prstGeom>
+        </p:spPr>
+      </p:pic>
+      <p:sp>
+        <p:nvSpPr>
+          <p:cNvPr id="16" name="TextBox 15">
+            <a:extLst>
+              <a:ext uri="{FF2B5EF4-FFF2-40B4-BE49-F238E27FC236}">
+                <a16:creationId xmlns:a16="http://schemas.microsoft.com/office/drawing/2014/main" id="{2876B192-0B3E-1E7E-585C-9C406DEC9D3A}"/>
+              </a:ext>
+            </a:extLst>
+          </p:cNvPr>
+          <p:cNvSpPr txBox="1"/>
+          <p:nvPr/>
+        </p:nvSpPr>
+        <p:spPr>
+          <a:xfrm>
+            <a:off x="2397281" y="4196722"/>
+            <a:ext cx="6096000" cy="369332"/>
+          </a:xfrm>
+          <a:prstGeom prst="rect">
+            <a:avLst/>
+          </a:prstGeom>
+          <a:noFill/>
+        </p:spPr>
+        <p:txBody>
+          <a:bodyPr wrap="square">
+            <a:spAutoFit/>
+          </a:bodyPr>
+          <a:lstStyle/>
+          <a:p>
+            <a:r>
+              <a:rPr lang="fr-FR" dirty="0"/>
+              <a:t>And </a:t>
+            </a:r>
+            <a:r>
+              <a:rPr lang="fr-FR" dirty="0" err="1"/>
+              <a:t>then</a:t>
+            </a:r>
+            <a:r>
+              <a:rPr lang="fr-FR" dirty="0"/>
+              <a:t> </a:t>
+            </a:r>
+            <a:r>
+              <a:rPr lang="fr-FR" dirty="0" err="1"/>
+              <a:t>we</a:t>
+            </a:r>
+            <a:r>
+              <a:rPr lang="fr-FR" dirty="0"/>
+              <a:t> </a:t>
+            </a:r>
+            <a:r>
+              <a:rPr lang="fr-FR" dirty="0" err="1"/>
+              <a:t>sum</a:t>
+            </a:r>
+            <a:r>
+              <a:rPr lang="fr-FR" dirty="0"/>
+              <a:t> / </a:t>
+            </a:r>
+            <a:r>
+              <a:rPr lang="fr-FR" dirty="0" err="1"/>
+              <a:t>mean</a:t>
+            </a:r>
+            <a:r>
+              <a:rPr lang="fr-FR" dirty="0"/>
+              <a:t> </a:t>
+            </a:r>
+            <a:r>
+              <a:rPr lang="fr-FR" dirty="0" err="1"/>
+              <a:t>across</a:t>
+            </a:r>
+            <a:r>
+              <a:rPr lang="fr-FR" dirty="0"/>
+              <a:t> the batch :</a:t>
+            </a:r>
+          </a:p>
+        </p:txBody>
+      </p:sp>
+    </p:spTree>
+    <p:extLst>
+      <p:ext uri="{BB962C8B-B14F-4D97-AF65-F5344CB8AC3E}">
+        <p14:creationId xmlns:p14="http://schemas.microsoft.com/office/powerpoint/2010/main" val="1448940982"/>
+      </p:ext>
+    </p:extLst>
+  </p:cSld>
+  <p:clrMapOvr>
+    <a:masterClrMapping/>
+  </p:clrMapOvr>
+  <mc:AlternateContent xmlns:mc="http://schemas.openxmlformats.org/markup-compatibility/2006">
+    <mc:Choice xmlns:p14="http://schemas.microsoft.com/office/powerpoint/2010/main" Requires="p14">
+      <p:transition spd="med" p14:dur="700">
+        <p:fade/>
+      </p:transition>
+    </mc:Choice>
+    <mc:Fallback>
+      <p:transition spd="med">
+        <p:fade/>
+      </p:transition>
+    </mc:Fallback>
+  </mc:AlternateContent>
+  <p:timing>
+    <p:tnLst>
+      <p:par>
+        <p:cTn id="1" dur="indefinite" restart="never" nodeType="tmRoot">
+          <p:childTnLst>
+            <p:seq concurrent="1" nextAc="seek">
+              <p:cTn id="2" dur="indefinite" nodeType="mainSeq">
+                <p:childTnLst>
+                  <p:par>
+                    <p:cTn id="3" fill="hold">
+                      <p:stCondLst>
+                        <p:cond delay="indefinite"/>
+                      </p:stCondLst>
+                      <p:childTnLst>
+                        <p:par>
+                          <p:cTn id="4" fill="hold">
+                            <p:stCondLst>
+                              <p:cond delay="0"/>
+                            </p:stCondLst>
+                            <p:childTnLst>
+                              <p:par>
+                                <p:cTn id="5" presetID="10" presetClass="entr" presetSubtype="0" fill="hold" nodeType="clickEffect">
+                                  <p:stCondLst>
+                                    <p:cond delay="0"/>
+                                  </p:stCondLst>
+                                  <p:childTnLst>
+                                    <p:set>
+                                      <p:cBhvr>
+                                        <p:cTn id="6" dur="1" fill="hold">
+                                          <p:stCondLst>
+                                            <p:cond delay="0"/>
+                                          </p:stCondLst>
+                                        </p:cTn>
+                                        <p:tgtEl>
+                                          <p:spTgt spid="13"/>
+                                        </p:tgtEl>
+                                        <p:attrNameLst>
+                                          <p:attrName>style.visibility</p:attrName>
+                                        </p:attrNameLst>
+                                      </p:cBhvr>
+                                      <p:to>
+                                        <p:strVal val="visible"/>
+                                      </p:to>
+                                    </p:set>
+                                    <p:animEffect transition="in" filter="fade">
+                                      <p:cBhvr>
+                                        <p:cTn id="7" dur="500"/>
+                                        <p:tgtEl>
+                                          <p:spTgt spid="13"/>
+                                        </p:tgtEl>
+                                      </p:cBhvr>
+                                    </p:animEffect>
+                                  </p:childTnLst>
+                                </p:cTn>
+                              </p:par>
+                              <p:par>
+                                <p:cTn id="8" presetID="10" presetClass="entr" presetSubtype="0" fill="hold" grpId="0" nodeType="withEffect">
+                                  <p:stCondLst>
+                                    <p:cond delay="0"/>
+                                  </p:stCondLst>
+                                  <p:childTnLst>
+                                    <p:set>
+                                      <p:cBhvr>
+                                        <p:cTn id="9" dur="1" fill="hold">
+                                          <p:stCondLst>
+                                            <p:cond delay="0"/>
+                                          </p:stCondLst>
+                                        </p:cTn>
+                                        <p:tgtEl>
+                                          <p:spTgt spid="16"/>
+                                        </p:tgtEl>
+                                        <p:attrNameLst>
+                                          <p:attrName>style.visibility</p:attrName>
+                                        </p:attrNameLst>
+                                      </p:cBhvr>
+                                      <p:to>
+                                        <p:strVal val="visible"/>
+                                      </p:to>
+                                    </p:set>
+                                    <p:animEffect transition="in" filter="fade">
+                                      <p:cBhvr>
+                                        <p:cTn id="10" dur="500"/>
+                                        <p:tgtEl>
+                                          <p:spTgt spid="16"/>
+                                        </p:tgtEl>
+                                      </p:cBhvr>
+                                    </p:animEffect>
+                                  </p:childTnLst>
+                                </p:cTn>
+                              </p:par>
+                            </p:childTnLst>
+                          </p:cTn>
+                        </p:par>
+                      </p:childTnLst>
+                    </p:cTn>
+                  </p:par>
+                </p:childTnLst>
+              </p:cTn>
+              <p:prevCondLst>
+                <p:cond evt="onPrev" delay="0">
+                  <p:tgtEl>
+                    <p:sldTgt/>
+                  </p:tgtEl>
+                </p:cond>
+              </p:prevCondLst>
+              <p:nextCondLst>
+                <p:cond evt="onNext" delay="0">
+                  <p:tgtEl>
+                    <p:sldTgt/>
+                  </p:tgtEl>
+                </p:cond>
+              </p:nextCondLst>
+            </p:seq>
+          </p:childTnLst>
+        </p:cTn>
+      </p:par>
+    </p:tnLst>
+    <p:bldLst>
+      <p:bldP spid="16" grpId="0"/>
+    </p:bldLst>
+  </p:timing>
+</p:sld>
+</file>
+
+<file path=ppt/slides/slide19.xml><?xml version="1.0" encoding="utf-8"?>
+<p:sld xmlns:a="http://schemas.openxmlformats.org/drawingml/2006/main" xmlns:r="http://schemas.openxmlformats.org/officeDocument/2006/relationships" xmlns:p="http://schemas.openxmlformats.org/presentationml/2006/main">
+  <p:cSld>
+    <p:spTree>
+      <p:nvGrpSpPr>
+        <p:cNvPr id="1" name=""/>
+        <p:cNvGrpSpPr/>
+        <p:nvPr/>
+      </p:nvGrpSpPr>
+      <p:grpSpPr>
+        <a:xfrm>
+          <a:off x="0" y="0"/>
+          <a:ext cx="0" cy="0"/>
+          <a:chOff x="0" y="0"/>
+          <a:chExt cx="0" cy="0"/>
+        </a:xfrm>
+      </p:grpSpPr>
+      <p:sp>
+        <p:nvSpPr>
+          <p:cNvPr id="5" name="Title 4">
+            <a:extLst>
+              <a:ext uri="{FF2B5EF4-FFF2-40B4-BE49-F238E27FC236}">
+                <a16:creationId xmlns:a16="http://schemas.microsoft.com/office/drawing/2014/main" id="{64213D2F-A106-3319-AA98-37F0C11F906C}"/>
+              </a:ext>
+            </a:extLst>
+          </p:cNvPr>
+          <p:cNvSpPr>
+            <a:spLocks noGrp="1"/>
+          </p:cNvSpPr>
+          <p:nvPr>
+            <p:ph type="title"/>
+          </p:nvPr>
+        </p:nvSpPr>
+        <p:spPr/>
+        <p:txBody>
+          <a:bodyPr/>
+          <a:lstStyle/>
+          <a:p>
+            <a:r>
+              <a:rPr lang="en-US" dirty="0"/>
+              <a:t>Losses</a:t>
+            </a:r>
+          </a:p>
+        </p:txBody>
+      </p:sp>
+      <p:pic>
+        <p:nvPicPr>
+          <p:cNvPr id="10" name="Picture 9">
+            <a:extLst>
+              <a:ext uri="{FF2B5EF4-FFF2-40B4-BE49-F238E27FC236}">
+                <a16:creationId xmlns:a16="http://schemas.microsoft.com/office/drawing/2014/main" id="{4D8B3B35-A43F-882F-9435-D08CAF68EC93}"/>
+              </a:ext>
+            </a:extLst>
+          </p:cNvPr>
+          <p:cNvPicPr>
+            <a:picLocks noChangeAspect="1"/>
+          </p:cNvPicPr>
+          <p:nvPr/>
+        </p:nvPicPr>
+        <p:blipFill>
+          <a:blip r:embed="rId3"/>
+          <a:stretch>
+            <a:fillRect/>
+          </a:stretch>
+        </p:blipFill>
+        <p:spPr>
+          <a:xfrm>
+            <a:off x="1814286" y="1412219"/>
+            <a:ext cx="8563428" cy="4599620"/>
+          </a:xfrm>
+          <a:prstGeom prst="rect">
+            <a:avLst/>
+          </a:prstGeom>
+        </p:spPr>
+      </p:pic>
+      <p:grpSp>
+        <p:nvGrpSpPr>
+          <p:cNvPr id="17" name="Group 16">
+            <a:extLst>
+              <a:ext uri="{FF2B5EF4-FFF2-40B4-BE49-F238E27FC236}">
+                <a16:creationId xmlns:a16="http://schemas.microsoft.com/office/drawing/2014/main" id="{A258755D-EC78-C535-0C77-D0C7A2FBB2CB}"/>
+              </a:ext>
+            </a:extLst>
+          </p:cNvPr>
+          <p:cNvGrpSpPr/>
+          <p:nvPr/>
+        </p:nvGrpSpPr>
+        <p:grpSpPr>
+          <a:xfrm>
+            <a:off x="3729971" y="4934514"/>
+            <a:ext cx="6753960" cy="1299960"/>
+            <a:chOff x="3729971" y="4934514"/>
+            <a:chExt cx="6753960" cy="1299960"/>
+          </a:xfrm>
+        </p:grpSpPr>
+        <mc:AlternateContent xmlns:mc="http://schemas.openxmlformats.org/markup-compatibility/2006">
+          <mc:Choice xmlns:p14="http://schemas.microsoft.com/office/powerpoint/2010/main" Requires="p14">
+            <p:contentPart p14:bwMode="auto" r:id="rId4">
+              <p14:nvContentPartPr>
+                <p14:cNvPr id="12" name="Ink 11">
+                  <a:extLst>
+                    <a:ext uri="{FF2B5EF4-FFF2-40B4-BE49-F238E27FC236}">
+                      <a16:creationId xmlns:a16="http://schemas.microsoft.com/office/drawing/2014/main" id="{3D9EB2D4-6E99-84E3-6C56-1FD3D18004D0}"/>
+                    </a:ext>
+                  </a:extLst>
+                </p14:cNvPr>
+                <p14:cNvContentPartPr/>
+                <p14:nvPr/>
+              </p14:nvContentPartPr>
+              <p14:xfrm>
+                <a:off x="3773171" y="5108754"/>
+                <a:ext cx="4952880" cy="175320"/>
+              </p14:xfrm>
+            </p:contentPart>
+          </mc:Choice>
+          <mc:Fallback>
+            <p:pic>
+              <p:nvPicPr>
+                <p:cNvPr id="12" name="Ink 11">
+                  <a:extLst>
+                    <a:ext uri="{FF2B5EF4-FFF2-40B4-BE49-F238E27FC236}">
+                      <a16:creationId xmlns:a16="http://schemas.microsoft.com/office/drawing/2014/main" id="{3D9EB2D4-6E99-84E3-6C56-1FD3D18004D0}"/>
+                    </a:ext>
+                  </a:extLst>
+                </p:cNvPr>
+                <p:cNvPicPr/>
+                <p:nvPr/>
+              </p:nvPicPr>
+              <p:blipFill>
+                <a:blip r:embed="rId5"/>
+                <a:stretch>
+                  <a:fillRect/>
+                </a:stretch>
+              </p:blipFill>
+              <p:spPr>
+                <a:xfrm>
+                  <a:off x="3737531" y="5072754"/>
+                  <a:ext cx="5024520" cy="246960"/>
+                </a:xfrm>
+                <a:prstGeom prst="rect">
+                  <a:avLst/>
+                </a:prstGeom>
+              </p:spPr>
+            </p:pic>
+          </mc:Fallback>
+        </mc:AlternateContent>
+        <mc:AlternateContent xmlns:mc="http://schemas.openxmlformats.org/markup-compatibility/2006">
+          <mc:Choice xmlns:p14="http://schemas.microsoft.com/office/powerpoint/2010/main" Requires="p14">
+            <p:contentPart p14:bwMode="auto" r:id="rId6">
+              <p14:nvContentPartPr>
+                <p14:cNvPr id="14" name="Ink 13">
+                  <a:extLst>
+                    <a:ext uri="{FF2B5EF4-FFF2-40B4-BE49-F238E27FC236}">
+                      <a16:creationId xmlns:a16="http://schemas.microsoft.com/office/drawing/2014/main" id="{14C82ECF-3047-2B1F-1480-5147411DF743}"/>
+                    </a:ext>
+                  </a:extLst>
+                </p14:cNvPr>
+                <p14:cNvContentPartPr/>
+                <p14:nvPr/>
+              </p14:nvContentPartPr>
+              <p14:xfrm>
+                <a:off x="3729971" y="5297394"/>
+                <a:ext cx="6632640" cy="937080"/>
+              </p14:xfrm>
+            </p:contentPart>
+          </mc:Choice>
+          <mc:Fallback>
+            <p:pic>
+              <p:nvPicPr>
+                <p:cNvPr id="14" name="Ink 13">
+                  <a:extLst>
+                    <a:ext uri="{FF2B5EF4-FFF2-40B4-BE49-F238E27FC236}">
+                      <a16:creationId xmlns:a16="http://schemas.microsoft.com/office/drawing/2014/main" id="{14C82ECF-3047-2B1F-1480-5147411DF743}"/>
+                    </a:ext>
+                  </a:extLst>
+                </p:cNvPr>
+                <p:cNvPicPr/>
+                <p:nvPr/>
+              </p:nvPicPr>
+              <p:blipFill>
+                <a:blip r:embed="rId7"/>
+                <a:stretch>
+                  <a:fillRect/>
+                </a:stretch>
+              </p:blipFill>
+              <p:spPr>
+                <a:xfrm>
+                  <a:off x="3693971" y="5261754"/>
+                  <a:ext cx="6704280" cy="1008720"/>
+                </a:xfrm>
+                <a:prstGeom prst="rect">
+                  <a:avLst/>
+                </a:prstGeom>
+              </p:spPr>
+            </p:pic>
+          </mc:Fallback>
+        </mc:AlternateContent>
+        <mc:AlternateContent xmlns:mc="http://schemas.openxmlformats.org/markup-compatibility/2006">
+          <mc:Choice xmlns:p14="http://schemas.microsoft.com/office/powerpoint/2010/main" Requires="p14">
+            <p:contentPart p14:bwMode="auto" r:id="rId8">
+              <p14:nvContentPartPr>
+                <p14:cNvPr id="15" name="Ink 14">
+                  <a:extLst>
+                    <a:ext uri="{FF2B5EF4-FFF2-40B4-BE49-F238E27FC236}">
+                      <a16:creationId xmlns:a16="http://schemas.microsoft.com/office/drawing/2014/main" id="{45E1D33A-F1EA-408F-F94A-5F2DC908DFF4}"/>
+                    </a:ext>
+                  </a:extLst>
+                </p14:cNvPr>
+                <p14:cNvContentPartPr/>
+                <p14:nvPr/>
+              </p14:nvContentPartPr>
+              <p14:xfrm>
+                <a:off x="9296291" y="4934514"/>
+                <a:ext cx="1187640" cy="842760"/>
+              </p14:xfrm>
+            </p:contentPart>
+          </mc:Choice>
+          <mc:Fallback>
+            <p:pic>
+              <p:nvPicPr>
+                <p:cNvPr id="15" name="Ink 14">
+                  <a:extLst>
+                    <a:ext uri="{FF2B5EF4-FFF2-40B4-BE49-F238E27FC236}">
+                      <a16:creationId xmlns:a16="http://schemas.microsoft.com/office/drawing/2014/main" id="{45E1D33A-F1EA-408F-F94A-5F2DC908DFF4}"/>
+                    </a:ext>
+                  </a:extLst>
+                </p:cNvPr>
+                <p:cNvPicPr/>
+                <p:nvPr/>
+              </p:nvPicPr>
+              <p:blipFill>
+                <a:blip r:embed="rId9"/>
+                <a:stretch>
+                  <a:fillRect/>
+                </a:stretch>
+              </p:blipFill>
+              <p:spPr>
+                <a:xfrm>
+                  <a:off x="9260651" y="4898874"/>
+                  <a:ext cx="1259280" cy="914400"/>
+                </a:xfrm>
+                <a:prstGeom prst="rect">
+                  <a:avLst/>
+                </a:prstGeom>
+              </p:spPr>
+            </p:pic>
+          </mc:Fallback>
+        </mc:AlternateContent>
+      </p:grpSp>
+    </p:spTree>
+    <p:extLst>
+      <p:ext uri="{BB962C8B-B14F-4D97-AF65-F5344CB8AC3E}">
+        <p14:creationId xmlns:p14="http://schemas.microsoft.com/office/powerpoint/2010/main" val="932030023"/>
+      </p:ext>
+    </p:extLst>
+  </p:cSld>
+  <p:clrMapOvr>
+    <a:masterClrMapping/>
+  </p:clrMapOvr>
+  <mc:AlternateContent xmlns:mc="http://schemas.openxmlformats.org/markup-compatibility/2006">
+    <mc:Choice xmlns:p14="http://schemas.microsoft.com/office/powerpoint/2010/main" Requires="p14">
+      <p:transition spd="med" p14:dur="700">
+        <p:fade/>
+      </p:transition>
+    </mc:Choice>
+    <mc:Fallback>
+      <p:transition spd="med">
+        <p:fade/>
+      </p:transition>
+    </mc:Fallback>
+  </mc:AlternateContent>
+  <p:timing>
+    <p:tnLst>
+      <p:par>
+        <p:cTn id="1" dur="indefinite" restart="never" nodeType="tmRoot">
+          <p:childTnLst>
+            <p:seq concurrent="1" nextAc="seek">
+              <p:cTn id="2" dur="indefinite" nodeType="mainSeq">
+                <p:childTnLst>
+                  <p:par>
+                    <p:cTn id="3" fill="hold">
+                      <p:stCondLst>
+                        <p:cond delay="indefinite"/>
+                      </p:stCondLst>
+                      <p:childTnLst>
+                        <p:par>
+                          <p:cTn id="4" fill="hold">
+                            <p:stCondLst>
+                              <p:cond delay="0"/>
+                            </p:stCondLst>
+                            <p:childTnLst>
+                              <p:par>
+                                <p:cTn id="5" presetID="63" presetClass="entr" presetSubtype="0" fill="hold" nodeType="clickEffect">
+                                  <p:stCondLst>
+                                    <p:cond delay="0"/>
+                                  </p:stCondLst>
+                                  <p:childTnLst>
+                                    <p:set>
+                                      <p:cBhvr>
+                                        <p:cTn id="6" dur="1" fill="hold">
+                                          <p:stCondLst>
+                                            <p:cond delay="0"/>
+                                          </p:stCondLst>
+                                        </p:cTn>
+                                        <p:tgtEl>
+                                          <p:spTgt spid="17"/>
+                                        </p:tgtEl>
+                                        <p:attrNameLst>
+                                          <p:attrName>style.visibility</p:attrName>
+                                        </p:attrNameLst>
+                                      </p:cBhvr>
+                                      <p:to>
+                                        <p:strVal val="visible"/>
+                                      </p:to>
+                                    </p:set>
+                                    <p:anim calcmode="lin" valueType="num">
+                                      <p:cBhvr>
+                                        <p:cTn id="7" dur="1000" fill="hold"/>
+                                        <p:tgtEl>
+                                          <p:spTgt spid="17"/>
+                                        </p:tgtEl>
+                                        <p:attrNameLst>
+                                          <p:attrName>drawProgress</p:attrName>
+                                        </p:attrNameLst>
+                                      </p:cBhvr>
+                                      <p:tavLst>
+                                        <p:tav tm="0">
+                                          <p:val>
+                                            <p:fltVal val="0"/>
+                                          </p:val>
+                                        </p:tav>
+                                        <p:tav tm="100000">
+                                          <p:val>
+                                            <p:fltVal val="1"/>
+                                          </p:val>
+                                        </p:tav>
+                                      </p:tavLst>
+                                    </p:anim>
+                                  </p:childTnLst>
+                                </p:cTn>
+                              </p:par>
+                            </p:childTnLst>
+                          </p:cTn>
+                        </p:par>
+                      </p:childTnLst>
+                    </p:cTn>
+                  </p:par>
+                </p:childTnLst>
+              </p:cTn>
+              <p:prevCondLst>
+                <p:cond evt="onPrev" delay="0">
+                  <p:tgtEl>
+                    <p:sldTgt/>
+                  </p:tgtEl>
+                </p:cond>
+              </p:prevCondLst>
+              <p:nextCondLst>
+                <p:cond evt="onNext" delay="0">
+                  <p:tgtEl>
+                    <p:sldTgt/>
+                  </p:tgtEl>
+                </p:cond>
+              </p:nextCondLst>
+            </p:seq>
+          </p:childTnLst>
+        </p:cTn>
+      </p:par>
+    </p:tnLst>
+  </p:timing>
+</p:sld>
+</file>
+
 <file path=ppt/slides/slide2.xml><?xml version="1.0" encoding="utf-8"?>
 <p:sld xmlns:a="http://schemas.openxmlformats.org/drawingml/2006/main" xmlns:r="http://schemas.openxmlformats.org/officeDocument/2006/relationships" xmlns:p="http://schemas.openxmlformats.org/presentationml/2006/main">
   <p:cSld>
@@ -7049,6 +9754,1288 @@
       </p:par>
     </p:tnLst>
   </p:timing>
+</p:sld>
+</file>
+
+<file path=ppt/slides/slide20.xml><?xml version="1.0" encoding="utf-8"?>
+<p:sld xmlns:a="http://schemas.openxmlformats.org/drawingml/2006/main" xmlns:r="http://schemas.openxmlformats.org/officeDocument/2006/relationships" xmlns:p="http://schemas.openxmlformats.org/presentationml/2006/main">
+  <p:cSld>
+    <p:spTree>
+      <p:nvGrpSpPr>
+        <p:cNvPr id="1" name=""/>
+        <p:cNvGrpSpPr/>
+        <p:nvPr/>
+      </p:nvGrpSpPr>
+      <p:grpSpPr>
+        <a:xfrm>
+          <a:off x="0" y="0"/>
+          <a:ext cx="0" cy="0"/>
+          <a:chOff x="0" y="0"/>
+          <a:chExt cx="0" cy="0"/>
+        </a:xfrm>
+      </p:grpSpPr>
+      <p:sp>
+        <p:nvSpPr>
+          <p:cNvPr id="5" name="Title 4">
+            <a:extLst>
+              <a:ext uri="{FF2B5EF4-FFF2-40B4-BE49-F238E27FC236}">
+                <a16:creationId xmlns:a16="http://schemas.microsoft.com/office/drawing/2014/main" id="{64213D2F-A106-3319-AA98-37F0C11F906C}"/>
+              </a:ext>
+            </a:extLst>
+          </p:cNvPr>
+          <p:cNvSpPr>
+            <a:spLocks noGrp="1"/>
+          </p:cNvSpPr>
+          <p:nvPr>
+            <p:ph type="title"/>
+          </p:nvPr>
+        </p:nvSpPr>
+        <p:spPr/>
+        <p:txBody>
+          <a:bodyPr/>
+          <a:lstStyle/>
+          <a:p>
+            <a:r>
+              <a:rPr lang="en-US" dirty="0"/>
+              <a:t>Losses</a:t>
+            </a:r>
+          </a:p>
+        </p:txBody>
+      </p:sp>
+      <p:sp>
+        <p:nvSpPr>
+          <p:cNvPr id="7" name="TextBox 6">
+            <a:extLst>
+              <a:ext uri="{FF2B5EF4-FFF2-40B4-BE49-F238E27FC236}">
+                <a16:creationId xmlns:a16="http://schemas.microsoft.com/office/drawing/2014/main" id="{B820A7B5-540A-E866-E1F3-453C80A5D422}"/>
+              </a:ext>
+            </a:extLst>
+          </p:cNvPr>
+          <p:cNvSpPr txBox="1"/>
+          <p:nvPr/>
+        </p:nvSpPr>
+        <p:spPr>
+          <a:xfrm>
+            <a:off x="4860392" y="5937384"/>
+            <a:ext cx="2991713" cy="369332"/>
+          </a:xfrm>
+          <a:prstGeom prst="rect">
+            <a:avLst/>
+          </a:prstGeom>
+          <a:noFill/>
+        </p:spPr>
+        <p:txBody>
+          <a:bodyPr wrap="square">
+            <a:spAutoFit/>
+          </a:bodyPr>
+          <a:lstStyle/>
+          <a:p>
+            <a:pPr algn="ctr"/>
+            <a:r>
+              <a:rPr lang="fr-FR" dirty="0" err="1">
+                <a:solidFill>
+                  <a:schemeClr val="bg1"/>
+                </a:solidFill>
+                <a:highlight>
+                  <a:srgbClr val="000000"/>
+                </a:highlight>
+              </a:rPr>
+              <a:t>torch.nn</a:t>
+            </a:r>
+            <a:r>
+              <a:rPr lang="fr-FR" dirty="0">
+                <a:solidFill>
+                  <a:schemeClr val="bg1"/>
+                </a:solidFill>
+                <a:highlight>
+                  <a:srgbClr val="000000"/>
+                </a:highlight>
+              </a:rPr>
+              <a:t>. </a:t>
+            </a:r>
+            <a:r>
+              <a:rPr lang="fr-FR" dirty="0" err="1">
+                <a:solidFill>
+                  <a:schemeClr val="bg1"/>
+                </a:solidFill>
+                <a:highlight>
+                  <a:srgbClr val="000000"/>
+                </a:highlight>
+              </a:rPr>
+              <a:t>CrossEntropyLoss</a:t>
+            </a:r>
+            <a:endParaRPr lang="fr-FR" dirty="0">
+              <a:solidFill>
+                <a:schemeClr val="bg1"/>
+              </a:solidFill>
+              <a:highlight>
+                <a:srgbClr val="000000"/>
+              </a:highlight>
+            </a:endParaRPr>
+          </a:p>
+        </p:txBody>
+      </p:sp>
+      <mc:AlternateContent xmlns:mc="http://schemas.openxmlformats.org/markup-compatibility/2006">
+        <mc:Choice xmlns:a14="http://schemas.microsoft.com/office/drawing/2010/main" Requires="a14">
+          <p:sp>
+            <p:nvSpPr>
+              <p:cNvPr id="11" name="TextBox 10">
+                <a:extLst>
+                  <a:ext uri="{FF2B5EF4-FFF2-40B4-BE49-F238E27FC236}">
+                    <a16:creationId xmlns:a16="http://schemas.microsoft.com/office/drawing/2014/main" id="{FCC075F3-CCA7-BE86-8213-73C16D81926C}"/>
+                  </a:ext>
+                </a:extLst>
+              </p:cNvPr>
+              <p:cNvSpPr txBox="1"/>
+              <p:nvPr/>
+            </p:nvSpPr>
+            <p:spPr>
+              <a:xfrm>
+                <a:off x="2397281" y="2176055"/>
+                <a:ext cx="7917937" cy="1250727"/>
+              </a:xfrm>
+              <a:prstGeom prst="rect">
+                <a:avLst/>
+              </a:prstGeom>
+              <a:noFill/>
+            </p:spPr>
+            <p:txBody>
+              <a:bodyPr wrap="none" rtlCol="0">
+                <a:spAutoFit/>
+              </a:bodyPr>
+              <a:lstStyle/>
+              <a:p>
+                <a:r>
+                  <a:rPr lang="fr-FR" b="0" dirty="0"/>
+                  <a:t>- </a:t>
+                </a:r>
+                <a14:m>
+                  <m:oMath xmlns:m="http://schemas.openxmlformats.org/officeDocument/2006/math">
+                    <m:r>
+                      <a:rPr lang="fr-FR" b="0" i="1" smtClean="0">
+                        <a:latin typeface="Cambria Math" panose="02040503050406030204" pitchFamily="18" charset="0"/>
+                      </a:rPr>
+                      <m:t>𝑛</m:t>
+                    </m:r>
+                    <m:r>
+                      <a:rPr lang="fr-FR" b="0" i="1" smtClean="0">
+                        <a:latin typeface="Cambria Math" panose="02040503050406030204" pitchFamily="18" charset="0"/>
+                      </a:rPr>
+                      <m:t>∈</m:t>
+                    </m:r>
+                    <m:r>
+                      <a:rPr lang="fr-FR" b="0" i="1" smtClean="0">
+                        <a:latin typeface="Cambria Math" panose="02040503050406030204" pitchFamily="18" charset="0"/>
+                        <a:ea typeface="Cambria Math" panose="02040503050406030204" pitchFamily="18" charset="0"/>
+                      </a:rPr>
+                      <m:t>ℕ</m:t>
+                    </m:r>
+                  </m:oMath>
+                </a14:m>
+                <a:r>
+                  <a:rPr lang="fr-FR" dirty="0"/>
+                  <a:t> the </a:t>
+                </a:r>
+                <a14:m>
+                  <m:oMath xmlns:m="http://schemas.openxmlformats.org/officeDocument/2006/math">
+                    <m:r>
+                      <a:rPr lang="fr-FR" b="0" i="1" smtClean="0">
+                        <a:latin typeface="Cambria Math" panose="02040503050406030204" pitchFamily="18" charset="0"/>
+                      </a:rPr>
+                      <m:t>𝑛</m:t>
+                    </m:r>
+                    <m:r>
+                      <m:rPr>
+                        <m:sty m:val="p"/>
+                      </m:rPr>
+                      <a:rPr lang="fr-FR" b="0" i="0" baseline="30000" smtClean="0">
+                        <a:latin typeface="Cambria Math" panose="02040503050406030204" pitchFamily="18" charset="0"/>
+                      </a:rPr>
+                      <m:t>nth</m:t>
+                    </m:r>
+                  </m:oMath>
+                </a14:m>
+                <a:r>
+                  <a:rPr lang="fr-FR" dirty="0"/>
+                  <a:t> </a:t>
+                </a:r>
+                <a:r>
+                  <a:rPr lang="fr-FR" dirty="0" err="1"/>
+                  <a:t>element</a:t>
+                </a:r>
+                <a:r>
+                  <a:rPr lang="fr-FR" dirty="0"/>
+                  <a:t> of the </a:t>
+                </a:r>
+                <a:r>
+                  <a:rPr lang="fr-FR" dirty="0" err="1"/>
+                  <a:t>current</a:t>
+                </a:r>
+                <a:r>
+                  <a:rPr lang="fr-FR" dirty="0"/>
+                  <a:t> batch</a:t>
+                </a:r>
+              </a:p>
+              <a:p>
+                <a:r>
+                  <a:rPr lang="fr-FR" b="0" dirty="0"/>
+                  <a:t>- </a:t>
+                </a:r>
+                <a14:m>
+                  <m:oMath xmlns:m="http://schemas.openxmlformats.org/officeDocument/2006/math">
+                    <m:sSub>
+                      <m:sSubPr>
+                        <m:ctrlPr>
+                          <a:rPr lang="fr-FR" b="0" i="1" smtClean="0">
+                            <a:latin typeface="Cambria Math" panose="02040503050406030204" pitchFamily="18" charset="0"/>
+                          </a:rPr>
+                        </m:ctrlPr>
+                      </m:sSubPr>
+                      <m:e>
+                        <m:r>
+                          <a:rPr lang="fr-FR" b="0" i="1" smtClean="0">
+                            <a:latin typeface="Cambria Math" panose="02040503050406030204" pitchFamily="18" charset="0"/>
+                          </a:rPr>
+                          <m:t>𝑤</m:t>
+                        </m:r>
+                      </m:e>
+                      <m:sub>
+                        <m:sSub>
+                          <m:sSubPr>
+                            <m:ctrlPr>
+                              <a:rPr lang="fr-FR" b="0" i="1" smtClean="0">
+                                <a:latin typeface="Cambria Math" panose="02040503050406030204" pitchFamily="18" charset="0"/>
+                              </a:rPr>
+                            </m:ctrlPr>
+                          </m:sSubPr>
+                          <m:e>
+                            <m:r>
+                              <a:rPr lang="fr-FR" b="0" i="1" smtClean="0">
+                                <a:latin typeface="Cambria Math" panose="02040503050406030204" pitchFamily="18" charset="0"/>
+                              </a:rPr>
+                              <m:t>𝑦</m:t>
+                            </m:r>
+                          </m:e>
+                          <m:sub>
+                            <m:r>
+                              <a:rPr lang="fr-FR" b="0" i="1" smtClean="0">
+                                <a:latin typeface="Cambria Math" panose="02040503050406030204" pitchFamily="18" charset="0"/>
+                              </a:rPr>
+                              <m:t>𝑛</m:t>
+                            </m:r>
+                          </m:sub>
+                        </m:sSub>
+                      </m:sub>
+                    </m:sSub>
+                  </m:oMath>
+                </a14:m>
+                <a:r>
+                  <a:rPr lang="fr-FR" dirty="0"/>
+                  <a:t> a </a:t>
+                </a:r>
+                <a:r>
+                  <a:rPr lang="fr-FR" dirty="0" err="1"/>
+                  <a:t>weight</a:t>
+                </a:r>
+                <a:r>
+                  <a:rPr lang="fr-FR" dirty="0"/>
+                  <a:t> in case </a:t>
+                </a:r>
+                <a:r>
+                  <a:rPr lang="fr-FR" dirty="0" err="1"/>
+                  <a:t>some</a:t>
+                </a:r>
+                <a:r>
+                  <a:rPr lang="fr-FR" dirty="0"/>
+                  <a:t> classes have more importance </a:t>
+                </a:r>
+                <a:r>
+                  <a:rPr lang="fr-FR" dirty="0" err="1"/>
+                  <a:t>than</a:t>
+                </a:r>
+                <a:r>
+                  <a:rPr lang="fr-FR" dirty="0"/>
+                  <a:t> </a:t>
+                </a:r>
+                <a:r>
+                  <a:rPr lang="fr-FR" dirty="0" err="1"/>
+                  <a:t>other</a:t>
+                </a:r>
+                <a:r>
+                  <a:rPr lang="fr-FR" dirty="0"/>
+                  <a:t>. P</a:t>
+                </a:r>
+                <a:r>
+                  <a:rPr lang="en-US" dirty="0" err="1"/>
+                  <a:t>articularly</a:t>
+                </a:r>
+                <a:r>
+                  <a:rPr lang="en-US" dirty="0"/>
+                  <a:t> </a:t>
+                </a:r>
+              </a:p>
+              <a:p>
+                <a:r>
+                  <a:rPr lang="en-US" dirty="0"/>
+                  <a:t>useful when you have an unbalanced training set (… later lectures ...)</a:t>
+                </a:r>
+              </a:p>
+              <a:p>
+                <a:r>
+                  <a:rPr lang="fr-FR" b="0" dirty="0"/>
+                  <a:t>- </a:t>
+                </a:r>
+                <a14:m>
+                  <m:oMath xmlns:m="http://schemas.openxmlformats.org/officeDocument/2006/math">
+                    <m:sSub>
+                      <m:sSubPr>
+                        <m:ctrlPr>
+                          <a:rPr lang="fr-FR" b="0" i="1" smtClean="0">
+                            <a:latin typeface="Cambria Math" panose="02040503050406030204" pitchFamily="18" charset="0"/>
+                          </a:rPr>
+                        </m:ctrlPr>
+                      </m:sSubPr>
+                      <m:e>
+                        <m:r>
+                          <a:rPr lang="fr-FR" b="0" i="1" smtClean="0">
+                            <a:latin typeface="Cambria Math" panose="02040503050406030204" pitchFamily="18" charset="0"/>
+                          </a:rPr>
+                          <m:t>𝑥</m:t>
+                        </m:r>
+                      </m:e>
+                      <m:sub>
+                        <m:r>
+                          <a:rPr lang="fr-FR" b="0" i="1" smtClean="0">
+                            <a:latin typeface="Cambria Math" panose="02040503050406030204" pitchFamily="18" charset="0"/>
+                          </a:rPr>
+                          <m:t>𝑛</m:t>
+                        </m:r>
+                        <m:r>
+                          <a:rPr lang="fr-FR" b="0" i="1" smtClean="0">
+                            <a:latin typeface="Cambria Math" panose="02040503050406030204" pitchFamily="18" charset="0"/>
+                          </a:rPr>
+                          <m:t>, </m:t>
+                        </m:r>
+                        <m:sSub>
+                          <m:sSubPr>
+                            <m:ctrlPr>
+                              <a:rPr lang="fr-FR" b="0" i="1" smtClean="0">
+                                <a:latin typeface="Cambria Math" panose="02040503050406030204" pitchFamily="18" charset="0"/>
+                              </a:rPr>
+                            </m:ctrlPr>
+                          </m:sSubPr>
+                          <m:e>
+                            <m:r>
+                              <a:rPr lang="fr-FR" b="0" i="1" smtClean="0">
+                                <a:latin typeface="Cambria Math" panose="02040503050406030204" pitchFamily="18" charset="0"/>
+                              </a:rPr>
+                              <m:t>𝑦</m:t>
+                            </m:r>
+                          </m:e>
+                          <m:sub>
+                            <m:r>
+                              <a:rPr lang="fr-FR" b="0" i="1" smtClean="0">
+                                <a:latin typeface="Cambria Math" panose="02040503050406030204" pitchFamily="18" charset="0"/>
+                              </a:rPr>
+                              <m:t>𝑛</m:t>
+                            </m:r>
+                          </m:sub>
+                        </m:sSub>
+                      </m:sub>
+                    </m:sSub>
+                  </m:oMath>
+                </a14:m>
+                <a:r>
+                  <a:rPr lang="fr-FR" dirty="0"/>
+                  <a:t> the log-</a:t>
+                </a:r>
+                <a:r>
+                  <a:rPr lang="fr-FR" dirty="0" err="1"/>
+                  <a:t>probabilities</a:t>
+                </a:r>
+                <a:r>
+                  <a:rPr lang="fr-FR" dirty="0"/>
+                  <a:t> of the </a:t>
+                </a:r>
+                <a:r>
+                  <a:rPr lang="fr-FR" dirty="0" err="1"/>
+                  <a:t>predicted</a:t>
+                </a:r>
+                <a:r>
+                  <a:rPr lang="fr-FR" dirty="0"/>
+                  <a:t> value of the class y.</a:t>
+                </a:r>
+                <a:endParaRPr lang="fr-FR" b="1" dirty="0"/>
+              </a:p>
+            </p:txBody>
+          </p:sp>
+        </mc:Choice>
+        <mc:Fallback>
+          <p:sp>
+            <p:nvSpPr>
+              <p:cNvPr id="11" name="TextBox 10">
+                <a:extLst>
+                  <a:ext uri="{FF2B5EF4-FFF2-40B4-BE49-F238E27FC236}">
+                    <a16:creationId xmlns:a16="http://schemas.microsoft.com/office/drawing/2014/main" id="{FCC075F3-CCA7-BE86-8213-73C16D81926C}"/>
+                  </a:ext>
+                </a:extLst>
+              </p:cNvPr>
+              <p:cNvSpPr txBox="1">
+                <a:spLocks noRot="1" noChangeAspect="1" noMove="1" noResize="1" noEditPoints="1" noAdjustHandles="1" noChangeArrowheads="1" noChangeShapeType="1" noTextEdit="1"/>
+              </p:cNvSpPr>
+              <p:nvPr/>
+            </p:nvSpPr>
+            <p:spPr>
+              <a:xfrm>
+                <a:off x="2397281" y="2176055"/>
+                <a:ext cx="7917937" cy="1250727"/>
+              </a:xfrm>
+              <a:prstGeom prst="rect">
+                <a:avLst/>
+              </a:prstGeom>
+              <a:blipFill>
+                <a:blip r:embed="rId3"/>
+                <a:stretch>
+                  <a:fillRect l="-616" t="-2927" b="-5366"/>
+                </a:stretch>
+              </a:blipFill>
+            </p:spPr>
+            <p:txBody>
+              <a:bodyPr/>
+              <a:lstStyle/>
+              <a:p>
+                <a:r>
+                  <a:rPr lang="fr-FR">
+                    <a:noFill/>
+                  </a:rPr>
+                  <a:t> </a:t>
+                </a:r>
+              </a:p>
+            </p:txBody>
+          </p:sp>
+        </mc:Fallback>
+      </mc:AlternateContent>
+      <p:pic>
+        <p:nvPicPr>
+          <p:cNvPr id="13" name="Picture 12">
+            <a:extLst>
+              <a:ext uri="{FF2B5EF4-FFF2-40B4-BE49-F238E27FC236}">
+                <a16:creationId xmlns:a16="http://schemas.microsoft.com/office/drawing/2014/main" id="{8F04CC6F-6170-26EA-BD8C-E8D2A833C12E}"/>
+              </a:ext>
+            </a:extLst>
+          </p:cNvPr>
+          <p:cNvPicPr>
+            <a:picLocks noChangeAspect="1"/>
+          </p:cNvPicPr>
+          <p:nvPr/>
+        </p:nvPicPr>
+        <p:blipFill>
+          <a:blip r:embed="rId4"/>
+          <a:stretch>
+            <a:fillRect/>
+          </a:stretch>
+        </p:blipFill>
+        <p:spPr>
+          <a:xfrm>
+            <a:off x="2266752" y="4441546"/>
+            <a:ext cx="7658494" cy="1251014"/>
+          </a:xfrm>
+          <a:prstGeom prst="rect">
+            <a:avLst/>
+          </a:prstGeom>
+        </p:spPr>
+      </p:pic>
+      <p:sp>
+        <p:nvSpPr>
+          <p:cNvPr id="16" name="TextBox 15">
+            <a:extLst>
+              <a:ext uri="{FF2B5EF4-FFF2-40B4-BE49-F238E27FC236}">
+                <a16:creationId xmlns:a16="http://schemas.microsoft.com/office/drawing/2014/main" id="{2876B192-0B3E-1E7E-585C-9C406DEC9D3A}"/>
+              </a:ext>
+            </a:extLst>
+          </p:cNvPr>
+          <p:cNvSpPr txBox="1"/>
+          <p:nvPr/>
+        </p:nvSpPr>
+        <p:spPr>
+          <a:xfrm>
+            <a:off x="2397281" y="4196722"/>
+            <a:ext cx="6096000" cy="369332"/>
+          </a:xfrm>
+          <a:prstGeom prst="rect">
+            <a:avLst/>
+          </a:prstGeom>
+          <a:noFill/>
+        </p:spPr>
+        <p:txBody>
+          <a:bodyPr wrap="square">
+            <a:spAutoFit/>
+          </a:bodyPr>
+          <a:lstStyle/>
+          <a:p>
+            <a:r>
+              <a:rPr lang="fr-FR" dirty="0"/>
+              <a:t>And </a:t>
+            </a:r>
+            <a:r>
+              <a:rPr lang="fr-FR" dirty="0" err="1"/>
+              <a:t>then</a:t>
+            </a:r>
+            <a:r>
+              <a:rPr lang="fr-FR" dirty="0"/>
+              <a:t> </a:t>
+            </a:r>
+            <a:r>
+              <a:rPr lang="fr-FR" dirty="0" err="1"/>
+              <a:t>we</a:t>
+            </a:r>
+            <a:r>
+              <a:rPr lang="fr-FR" dirty="0"/>
+              <a:t> </a:t>
+            </a:r>
+            <a:r>
+              <a:rPr lang="fr-FR" dirty="0" err="1"/>
+              <a:t>sum</a:t>
+            </a:r>
+            <a:r>
+              <a:rPr lang="fr-FR" dirty="0"/>
+              <a:t> / </a:t>
+            </a:r>
+            <a:r>
+              <a:rPr lang="fr-FR" dirty="0" err="1"/>
+              <a:t>mean</a:t>
+            </a:r>
+            <a:r>
+              <a:rPr lang="fr-FR" dirty="0"/>
+              <a:t> </a:t>
+            </a:r>
+            <a:r>
+              <a:rPr lang="fr-FR" dirty="0" err="1"/>
+              <a:t>across</a:t>
+            </a:r>
+            <a:r>
+              <a:rPr lang="fr-FR" dirty="0"/>
+              <a:t> the batch :</a:t>
+            </a:r>
+          </a:p>
+        </p:txBody>
+      </p:sp>
+      <p:pic>
+        <p:nvPicPr>
+          <p:cNvPr id="3" name="Picture 2">
+            <a:extLst>
+              <a:ext uri="{FF2B5EF4-FFF2-40B4-BE49-F238E27FC236}">
+                <a16:creationId xmlns:a16="http://schemas.microsoft.com/office/drawing/2014/main" id="{091CC8AF-6BAA-E47D-FB9D-17827DE870DC}"/>
+              </a:ext>
+            </a:extLst>
+          </p:cNvPr>
+          <p:cNvPicPr>
+            <a:picLocks noChangeAspect="1"/>
+          </p:cNvPicPr>
+          <p:nvPr/>
+        </p:nvPicPr>
+        <p:blipFill>
+          <a:blip r:embed="rId5"/>
+          <a:stretch>
+            <a:fillRect/>
+          </a:stretch>
+        </p:blipFill>
+        <p:spPr>
+          <a:xfrm>
+            <a:off x="4587795" y="1294863"/>
+            <a:ext cx="3016405" cy="774740"/>
+          </a:xfrm>
+          <a:prstGeom prst="rect">
+            <a:avLst/>
+          </a:prstGeom>
+        </p:spPr>
+      </p:pic>
+      <p:grpSp>
+        <p:nvGrpSpPr>
+          <p:cNvPr id="9" name="Group 8">
+            <a:extLst>
+              <a:ext uri="{FF2B5EF4-FFF2-40B4-BE49-F238E27FC236}">
+                <a16:creationId xmlns:a16="http://schemas.microsoft.com/office/drawing/2014/main" id="{8791C780-B3E2-87E5-F773-14433222B314}"/>
+              </a:ext>
+            </a:extLst>
+          </p:cNvPr>
+          <p:cNvGrpSpPr/>
+          <p:nvPr/>
+        </p:nvGrpSpPr>
+        <p:grpSpPr>
+          <a:xfrm>
+            <a:off x="5707811" y="709515"/>
+            <a:ext cx="624600" cy="726480"/>
+            <a:chOff x="5707811" y="709515"/>
+            <a:chExt cx="624600" cy="726480"/>
+          </a:xfrm>
+        </p:grpSpPr>
+        <mc:AlternateContent xmlns:mc="http://schemas.openxmlformats.org/markup-compatibility/2006">
+          <mc:Choice xmlns:p14="http://schemas.microsoft.com/office/powerpoint/2010/main" Requires="p14">
+            <p:contentPart p14:bwMode="auto" r:id="rId6">
+              <p14:nvContentPartPr>
+                <p14:cNvPr id="4" name="Ink 3">
+                  <a:extLst>
+                    <a:ext uri="{FF2B5EF4-FFF2-40B4-BE49-F238E27FC236}">
+                      <a16:creationId xmlns:a16="http://schemas.microsoft.com/office/drawing/2014/main" id="{54CD1CA0-E5B2-5660-7896-115B4679439E}"/>
+                    </a:ext>
+                  </a:extLst>
+                </p14:cNvPr>
+                <p14:cNvContentPartPr/>
+                <p14:nvPr/>
+              </p14:nvContentPartPr>
+              <p14:xfrm>
+                <a:off x="5850371" y="709515"/>
+                <a:ext cx="482040" cy="705240"/>
+              </p14:xfrm>
+            </p:contentPart>
+          </mc:Choice>
+          <mc:Fallback>
+            <p:pic>
+              <p:nvPicPr>
+                <p:cNvPr id="4" name="Ink 3">
+                  <a:extLst>
+                    <a:ext uri="{FF2B5EF4-FFF2-40B4-BE49-F238E27FC236}">
+                      <a16:creationId xmlns:a16="http://schemas.microsoft.com/office/drawing/2014/main" id="{54CD1CA0-E5B2-5660-7896-115B4679439E}"/>
+                    </a:ext>
+                  </a:extLst>
+                </p:cNvPr>
+                <p:cNvPicPr/>
+                <p:nvPr/>
+              </p:nvPicPr>
+              <p:blipFill>
+                <a:blip r:embed="rId7"/>
+                <a:stretch>
+                  <a:fillRect/>
+                </a:stretch>
+              </p:blipFill>
+              <p:spPr>
+                <a:xfrm>
+                  <a:off x="5814731" y="673875"/>
+                  <a:ext cx="553680" cy="776880"/>
+                </a:xfrm>
+                <a:prstGeom prst="rect">
+                  <a:avLst/>
+                </a:prstGeom>
+              </p:spPr>
+            </p:pic>
+          </mc:Fallback>
+        </mc:AlternateContent>
+        <mc:AlternateContent xmlns:mc="http://schemas.openxmlformats.org/markup-compatibility/2006">
+          <mc:Choice xmlns:p14="http://schemas.microsoft.com/office/powerpoint/2010/main" Requires="p14">
+            <p:contentPart p14:bwMode="auto" r:id="rId8">
+              <p14:nvContentPartPr>
+                <p14:cNvPr id="6" name="Ink 5">
+                  <a:extLst>
+                    <a:ext uri="{FF2B5EF4-FFF2-40B4-BE49-F238E27FC236}">
+                      <a16:creationId xmlns:a16="http://schemas.microsoft.com/office/drawing/2014/main" id="{C54309C5-8C65-247A-1FCE-BDB123D92062}"/>
+                    </a:ext>
+                  </a:extLst>
+                </p14:cNvPr>
+                <p14:cNvContentPartPr/>
+                <p14:nvPr/>
+              </p14:nvContentPartPr>
+              <p14:xfrm>
+                <a:off x="5707811" y="1142595"/>
+                <a:ext cx="367560" cy="293400"/>
+              </p14:xfrm>
+            </p:contentPart>
+          </mc:Choice>
+          <mc:Fallback>
+            <p:pic>
+              <p:nvPicPr>
+                <p:cNvPr id="6" name="Ink 5">
+                  <a:extLst>
+                    <a:ext uri="{FF2B5EF4-FFF2-40B4-BE49-F238E27FC236}">
+                      <a16:creationId xmlns:a16="http://schemas.microsoft.com/office/drawing/2014/main" id="{C54309C5-8C65-247A-1FCE-BDB123D92062}"/>
+                    </a:ext>
+                  </a:extLst>
+                </p:cNvPr>
+                <p:cNvPicPr/>
+                <p:nvPr/>
+              </p:nvPicPr>
+              <p:blipFill>
+                <a:blip r:embed="rId9"/>
+                <a:stretch>
+                  <a:fillRect/>
+                </a:stretch>
+              </p:blipFill>
+              <p:spPr>
+                <a:xfrm>
+                  <a:off x="5672171" y="1106955"/>
+                  <a:ext cx="439200" cy="365040"/>
+                </a:xfrm>
+                <a:prstGeom prst="rect">
+                  <a:avLst/>
+                </a:prstGeom>
+              </p:spPr>
+            </p:pic>
+          </mc:Fallback>
+        </mc:AlternateContent>
+      </p:grpSp>
+      <p:grpSp>
+        <p:nvGrpSpPr>
+          <p:cNvPr id="17" name="Group 16">
+            <a:extLst>
+              <a:ext uri="{FF2B5EF4-FFF2-40B4-BE49-F238E27FC236}">
+                <a16:creationId xmlns:a16="http://schemas.microsoft.com/office/drawing/2014/main" id="{765BD0FD-CC5A-86D3-0007-2D413775D312}"/>
+              </a:ext>
+            </a:extLst>
+          </p:cNvPr>
+          <p:cNvGrpSpPr/>
+          <p:nvPr/>
+        </p:nvGrpSpPr>
+        <p:grpSpPr>
+          <a:xfrm>
+            <a:off x="7679531" y="978795"/>
+            <a:ext cx="1334160" cy="1050480"/>
+            <a:chOff x="7679531" y="978795"/>
+            <a:chExt cx="1334160" cy="1050480"/>
+          </a:xfrm>
+        </p:grpSpPr>
+        <mc:AlternateContent xmlns:mc="http://schemas.openxmlformats.org/markup-compatibility/2006">
+          <mc:Choice xmlns:p14="http://schemas.microsoft.com/office/powerpoint/2010/main" Requires="p14">
+            <p:contentPart p14:bwMode="auto" r:id="rId10">
+              <p14:nvContentPartPr>
+                <p14:cNvPr id="10" name="Ink 9">
+                  <a:extLst>
+                    <a:ext uri="{FF2B5EF4-FFF2-40B4-BE49-F238E27FC236}">
+                      <a16:creationId xmlns:a16="http://schemas.microsoft.com/office/drawing/2014/main" id="{291EBD70-0845-D8AE-E092-447695844F14}"/>
+                    </a:ext>
+                  </a:extLst>
+                </p14:cNvPr>
+                <p14:cNvContentPartPr/>
+                <p14:nvPr/>
+              </p14:nvContentPartPr>
+              <p14:xfrm>
+                <a:off x="7679531" y="1385595"/>
+                <a:ext cx="143640" cy="643680"/>
+              </p14:xfrm>
+            </p:contentPart>
+          </mc:Choice>
+          <mc:Fallback>
+            <p:pic>
+              <p:nvPicPr>
+                <p:cNvPr id="10" name="Ink 9">
+                  <a:extLst>
+                    <a:ext uri="{FF2B5EF4-FFF2-40B4-BE49-F238E27FC236}">
+                      <a16:creationId xmlns:a16="http://schemas.microsoft.com/office/drawing/2014/main" id="{291EBD70-0845-D8AE-E092-447695844F14}"/>
+                    </a:ext>
+                  </a:extLst>
+                </p:cNvPr>
+                <p:cNvPicPr/>
+                <p:nvPr/>
+              </p:nvPicPr>
+              <p:blipFill>
+                <a:blip r:embed="rId11"/>
+                <a:stretch>
+                  <a:fillRect/>
+                </a:stretch>
+              </p:blipFill>
+              <p:spPr>
+                <a:xfrm>
+                  <a:off x="7643531" y="1349955"/>
+                  <a:ext cx="215280" cy="715320"/>
+                </a:xfrm>
+                <a:prstGeom prst="rect">
+                  <a:avLst/>
+                </a:prstGeom>
+              </p:spPr>
+            </p:pic>
+          </mc:Fallback>
+        </mc:AlternateContent>
+        <mc:AlternateContent xmlns:mc="http://schemas.openxmlformats.org/markup-compatibility/2006">
+          <mc:Choice xmlns:p14="http://schemas.microsoft.com/office/powerpoint/2010/main" Requires="p14">
+            <p:contentPart p14:bwMode="auto" r:id="rId12">
+              <p14:nvContentPartPr>
+                <p14:cNvPr id="12" name="Ink 11">
+                  <a:extLst>
+                    <a:ext uri="{FF2B5EF4-FFF2-40B4-BE49-F238E27FC236}">
+                      <a16:creationId xmlns:a16="http://schemas.microsoft.com/office/drawing/2014/main" id="{E4C40830-AFB4-9B5D-B9F6-C22C8F968DCB}"/>
+                    </a:ext>
+                  </a:extLst>
+                </p14:cNvPr>
+                <p14:cNvContentPartPr/>
+                <p14:nvPr/>
+              </p14:nvContentPartPr>
+              <p14:xfrm>
+                <a:off x="7836491" y="1083555"/>
+                <a:ext cx="1089360" cy="559800"/>
+              </p14:xfrm>
+            </p:contentPart>
+          </mc:Choice>
+          <mc:Fallback>
+            <p:pic>
+              <p:nvPicPr>
+                <p:cNvPr id="12" name="Ink 11">
+                  <a:extLst>
+                    <a:ext uri="{FF2B5EF4-FFF2-40B4-BE49-F238E27FC236}">
+                      <a16:creationId xmlns:a16="http://schemas.microsoft.com/office/drawing/2014/main" id="{E4C40830-AFB4-9B5D-B9F6-C22C8F968DCB}"/>
+                    </a:ext>
+                  </a:extLst>
+                </p:cNvPr>
+                <p:cNvPicPr/>
+                <p:nvPr/>
+              </p:nvPicPr>
+              <p:blipFill>
+                <a:blip r:embed="rId13"/>
+                <a:stretch>
+                  <a:fillRect/>
+                </a:stretch>
+              </p:blipFill>
+              <p:spPr>
+                <a:xfrm>
+                  <a:off x="7800851" y="1047555"/>
+                  <a:ext cx="1161000" cy="631440"/>
+                </a:xfrm>
+                <a:prstGeom prst="rect">
+                  <a:avLst/>
+                </a:prstGeom>
+              </p:spPr>
+            </p:pic>
+          </mc:Fallback>
+        </mc:AlternateContent>
+        <mc:AlternateContent xmlns:mc="http://schemas.openxmlformats.org/markup-compatibility/2006">
+          <mc:Choice xmlns:p14="http://schemas.microsoft.com/office/powerpoint/2010/main" Requires="p14">
+            <p:contentPart p14:bwMode="auto" r:id="rId14">
+              <p14:nvContentPartPr>
+                <p14:cNvPr id="15" name="Ink 14">
+                  <a:extLst>
+                    <a:ext uri="{FF2B5EF4-FFF2-40B4-BE49-F238E27FC236}">
+                      <a16:creationId xmlns:a16="http://schemas.microsoft.com/office/drawing/2014/main" id="{97E98D99-F319-D54F-2969-4F5E90DF0C28}"/>
+                    </a:ext>
+                  </a:extLst>
+                </p14:cNvPr>
+                <p14:cNvContentPartPr/>
+                <p14:nvPr/>
+              </p14:nvContentPartPr>
+              <p14:xfrm>
+                <a:off x="8629571" y="978795"/>
+                <a:ext cx="384120" cy="334440"/>
+              </p14:xfrm>
+            </p:contentPart>
+          </mc:Choice>
+          <mc:Fallback>
+            <p:pic>
+              <p:nvPicPr>
+                <p:cNvPr id="15" name="Ink 14">
+                  <a:extLst>
+                    <a:ext uri="{FF2B5EF4-FFF2-40B4-BE49-F238E27FC236}">
+                      <a16:creationId xmlns:a16="http://schemas.microsoft.com/office/drawing/2014/main" id="{97E98D99-F319-D54F-2969-4F5E90DF0C28}"/>
+                    </a:ext>
+                  </a:extLst>
+                </p:cNvPr>
+                <p:cNvPicPr/>
+                <p:nvPr/>
+              </p:nvPicPr>
+              <p:blipFill>
+                <a:blip r:embed="rId15"/>
+                <a:stretch>
+                  <a:fillRect/>
+                </a:stretch>
+              </p:blipFill>
+              <p:spPr>
+                <a:xfrm>
+                  <a:off x="8593571" y="942795"/>
+                  <a:ext cx="455760" cy="406080"/>
+                </a:xfrm>
+                <a:prstGeom prst="rect">
+                  <a:avLst/>
+                </a:prstGeom>
+              </p:spPr>
+            </p:pic>
+          </mc:Fallback>
+        </mc:AlternateContent>
+      </p:grpSp>
+      <p:sp>
+        <p:nvSpPr>
+          <p:cNvPr id="18" name="TextBox 17">
+            <a:extLst>
+              <a:ext uri="{FF2B5EF4-FFF2-40B4-BE49-F238E27FC236}">
+                <a16:creationId xmlns:a16="http://schemas.microsoft.com/office/drawing/2014/main" id="{56078016-99D0-BFF0-054E-1E37F594D33B}"/>
+              </a:ext>
+            </a:extLst>
+          </p:cNvPr>
+          <p:cNvSpPr txBox="1"/>
+          <p:nvPr/>
+        </p:nvSpPr>
+        <p:spPr>
+          <a:xfrm>
+            <a:off x="6415088" y="421481"/>
+            <a:ext cx="1295035" cy="369332"/>
+          </a:xfrm>
+          <a:prstGeom prst="rect">
+            <a:avLst/>
+          </a:prstGeom>
+          <a:noFill/>
+        </p:spPr>
+        <p:txBody>
+          <a:bodyPr wrap="none" rtlCol="0">
+            <a:spAutoFit/>
+          </a:bodyPr>
+          <a:lstStyle/>
+          <a:p>
+            <a:r>
+              <a:rPr lang="fr-FR" b="1" dirty="0" err="1"/>
+              <a:t>Log</a:t>
+            </a:r>
+            <a:r>
+              <a:rPr lang="fr-FR" dirty="0" err="1"/>
+              <a:t>SoftMax</a:t>
+            </a:r>
+            <a:endParaRPr lang="fr-FR" dirty="0"/>
+          </a:p>
+        </p:txBody>
+      </p:sp>
+      <p:sp>
+        <p:nvSpPr>
+          <p:cNvPr id="19" name="TextBox 18">
+            <a:extLst>
+              <a:ext uri="{FF2B5EF4-FFF2-40B4-BE49-F238E27FC236}">
+                <a16:creationId xmlns:a16="http://schemas.microsoft.com/office/drawing/2014/main" id="{F3D4C484-FE6D-61CF-E936-8CC25BFA99FB}"/>
+              </a:ext>
+            </a:extLst>
+          </p:cNvPr>
+          <p:cNvSpPr txBox="1"/>
+          <p:nvPr/>
+        </p:nvSpPr>
+        <p:spPr>
+          <a:xfrm>
+            <a:off x="9165545" y="599493"/>
+            <a:ext cx="1319079" cy="369332"/>
+          </a:xfrm>
+          <a:prstGeom prst="rect">
+            <a:avLst/>
+          </a:prstGeom>
+          <a:noFill/>
+        </p:spPr>
+        <p:txBody>
+          <a:bodyPr wrap="none" rtlCol="0">
+            <a:spAutoFit/>
+          </a:bodyPr>
+          <a:lstStyle/>
+          <a:p>
+            <a:r>
+              <a:rPr lang="fr-FR" dirty="0" err="1"/>
+              <a:t>Log</a:t>
+            </a:r>
+            <a:r>
+              <a:rPr lang="fr-FR" b="1" dirty="0" err="1"/>
+              <a:t>SoftMax</a:t>
+            </a:r>
+            <a:endParaRPr lang="fr-FR" b="1" dirty="0"/>
+          </a:p>
+        </p:txBody>
+      </p:sp>
+    </p:spTree>
+    <p:extLst>
+      <p:ext uri="{BB962C8B-B14F-4D97-AF65-F5344CB8AC3E}">
+        <p14:creationId xmlns:p14="http://schemas.microsoft.com/office/powerpoint/2010/main" val="2924753049"/>
+      </p:ext>
+    </p:extLst>
+  </p:cSld>
+  <p:clrMapOvr>
+    <a:masterClrMapping/>
+  </p:clrMapOvr>
+  <mc:AlternateContent xmlns:mc="http://schemas.openxmlformats.org/markup-compatibility/2006">
+    <mc:Choice xmlns:p14="http://schemas.microsoft.com/office/powerpoint/2010/main" Requires="p14">
+      <p:transition spd="med" p14:dur="700">
+        <p:fade/>
+      </p:transition>
+    </mc:Choice>
+    <mc:Fallback>
+      <p:transition spd="med">
+        <p:fade/>
+      </p:transition>
+    </mc:Fallback>
+  </mc:AlternateContent>
+  <p:timing>
+    <p:tnLst>
+      <p:par>
+        <p:cTn id="1" dur="indefinite" restart="never" nodeType="tmRoot">
+          <p:childTnLst>
+            <p:seq concurrent="1" nextAc="seek">
+              <p:cTn id="2" dur="indefinite" nodeType="mainSeq">
+                <p:childTnLst>
+                  <p:par>
+                    <p:cTn id="3" fill="hold">
+                      <p:stCondLst>
+                        <p:cond delay="indefinite"/>
+                      </p:stCondLst>
+                      <p:childTnLst>
+                        <p:par>
+                          <p:cTn id="4" fill="hold">
+                            <p:stCondLst>
+                              <p:cond delay="0"/>
+                            </p:stCondLst>
+                            <p:childTnLst>
+                              <p:par>
+                                <p:cTn id="5" presetID="10" presetClass="entr" presetSubtype="0" fill="hold" nodeType="clickEffect">
+                                  <p:stCondLst>
+                                    <p:cond delay="0"/>
+                                  </p:stCondLst>
+                                  <p:childTnLst>
+                                    <p:set>
+                                      <p:cBhvr>
+                                        <p:cTn id="6" dur="1" fill="hold">
+                                          <p:stCondLst>
+                                            <p:cond delay="0"/>
+                                          </p:stCondLst>
+                                        </p:cTn>
+                                        <p:tgtEl>
+                                          <p:spTgt spid="13"/>
+                                        </p:tgtEl>
+                                        <p:attrNameLst>
+                                          <p:attrName>style.visibility</p:attrName>
+                                        </p:attrNameLst>
+                                      </p:cBhvr>
+                                      <p:to>
+                                        <p:strVal val="visible"/>
+                                      </p:to>
+                                    </p:set>
+                                    <p:animEffect transition="in" filter="fade">
+                                      <p:cBhvr>
+                                        <p:cTn id="7" dur="500"/>
+                                        <p:tgtEl>
+                                          <p:spTgt spid="13"/>
+                                        </p:tgtEl>
+                                      </p:cBhvr>
+                                    </p:animEffect>
+                                  </p:childTnLst>
+                                </p:cTn>
+                              </p:par>
+                              <p:par>
+                                <p:cTn id="8" presetID="10" presetClass="entr" presetSubtype="0" fill="hold" grpId="0" nodeType="withEffect">
+                                  <p:stCondLst>
+                                    <p:cond delay="0"/>
+                                  </p:stCondLst>
+                                  <p:childTnLst>
+                                    <p:set>
+                                      <p:cBhvr>
+                                        <p:cTn id="9" dur="1" fill="hold">
+                                          <p:stCondLst>
+                                            <p:cond delay="0"/>
+                                          </p:stCondLst>
+                                        </p:cTn>
+                                        <p:tgtEl>
+                                          <p:spTgt spid="16"/>
+                                        </p:tgtEl>
+                                        <p:attrNameLst>
+                                          <p:attrName>style.visibility</p:attrName>
+                                        </p:attrNameLst>
+                                      </p:cBhvr>
+                                      <p:to>
+                                        <p:strVal val="visible"/>
+                                      </p:to>
+                                    </p:set>
+                                    <p:animEffect transition="in" filter="fade">
+                                      <p:cBhvr>
+                                        <p:cTn id="10" dur="500"/>
+                                        <p:tgtEl>
+                                          <p:spTgt spid="16"/>
+                                        </p:tgtEl>
+                                      </p:cBhvr>
+                                    </p:animEffect>
+                                  </p:childTnLst>
+                                </p:cTn>
+                              </p:par>
+                            </p:childTnLst>
+                          </p:cTn>
+                        </p:par>
+                      </p:childTnLst>
+                    </p:cTn>
+                  </p:par>
+                </p:childTnLst>
+              </p:cTn>
+              <p:prevCondLst>
+                <p:cond evt="onPrev" delay="0">
+                  <p:tgtEl>
+                    <p:sldTgt/>
+                  </p:tgtEl>
+                </p:cond>
+              </p:prevCondLst>
+              <p:nextCondLst>
+                <p:cond evt="onNext" delay="0">
+                  <p:tgtEl>
+                    <p:sldTgt/>
+                  </p:tgtEl>
+                </p:cond>
+              </p:nextCondLst>
+            </p:seq>
+          </p:childTnLst>
+        </p:cTn>
+      </p:par>
+    </p:tnLst>
+    <p:bldLst>
+      <p:bldP spid="16" grpId="0"/>
+    </p:bldLst>
+  </p:timing>
+</p:sld>
+</file>
+
+<file path=ppt/slides/slide21.xml><?xml version="1.0" encoding="utf-8"?>
+<p:sld xmlns:a="http://schemas.openxmlformats.org/drawingml/2006/main" xmlns:r="http://schemas.openxmlformats.org/officeDocument/2006/relationships" xmlns:p="http://schemas.openxmlformats.org/presentationml/2006/main">
+  <p:cSld>
+    <p:spTree>
+      <p:nvGrpSpPr>
+        <p:cNvPr id="1" name=""/>
+        <p:cNvGrpSpPr/>
+        <p:nvPr/>
+      </p:nvGrpSpPr>
+      <p:grpSpPr>
+        <a:xfrm>
+          <a:off x="0" y="0"/>
+          <a:ext cx="0" cy="0"/>
+          <a:chOff x="0" y="0"/>
+          <a:chExt cx="0" cy="0"/>
+        </a:xfrm>
+      </p:grpSpPr>
+      <p:sp>
+        <p:nvSpPr>
+          <p:cNvPr id="5" name="Title 4">
+            <a:extLst>
+              <a:ext uri="{FF2B5EF4-FFF2-40B4-BE49-F238E27FC236}">
+                <a16:creationId xmlns:a16="http://schemas.microsoft.com/office/drawing/2014/main" id="{64213D2F-A106-3319-AA98-37F0C11F906C}"/>
+              </a:ext>
+            </a:extLst>
+          </p:cNvPr>
+          <p:cNvSpPr>
+            <a:spLocks noGrp="1"/>
+          </p:cNvSpPr>
+          <p:nvPr>
+            <p:ph type="title"/>
+          </p:nvPr>
+        </p:nvSpPr>
+        <p:spPr/>
+        <p:txBody>
+          <a:bodyPr/>
+          <a:lstStyle/>
+          <a:p>
+            <a:r>
+              <a:rPr lang="en-US" dirty="0"/>
+              <a:t>Why SoftMax?</a:t>
+            </a:r>
+          </a:p>
+        </p:txBody>
+      </p:sp>
+      <p:pic>
+        <p:nvPicPr>
+          <p:cNvPr id="8" name="Picture 7">
+            <a:extLst>
+              <a:ext uri="{FF2B5EF4-FFF2-40B4-BE49-F238E27FC236}">
+                <a16:creationId xmlns:a16="http://schemas.microsoft.com/office/drawing/2014/main" id="{1C784F72-ABB9-6954-7273-41629449F3CD}"/>
+              </a:ext>
+            </a:extLst>
+          </p:cNvPr>
+          <p:cNvPicPr>
+            <a:picLocks noChangeAspect="1"/>
+          </p:cNvPicPr>
+          <p:nvPr/>
+        </p:nvPicPr>
+        <p:blipFill>
+          <a:blip r:embed="rId3"/>
+          <a:stretch>
+            <a:fillRect/>
+          </a:stretch>
+        </p:blipFill>
+        <p:spPr>
+          <a:xfrm>
+            <a:off x="904150" y="1690688"/>
+            <a:ext cx="10528841" cy="4191215"/>
+          </a:xfrm>
+          <a:prstGeom prst="rect">
+            <a:avLst/>
+          </a:prstGeom>
+        </p:spPr>
+      </p:pic>
+      <p:sp>
+        <p:nvSpPr>
+          <p:cNvPr id="14" name="TextBox 13">
+            <a:extLst>
+              <a:ext uri="{FF2B5EF4-FFF2-40B4-BE49-F238E27FC236}">
+                <a16:creationId xmlns:a16="http://schemas.microsoft.com/office/drawing/2014/main" id="{03D26BCF-AFB6-9D1A-37AF-F350AB7BBCF7}"/>
+              </a:ext>
+            </a:extLst>
+          </p:cNvPr>
+          <p:cNvSpPr txBox="1"/>
+          <p:nvPr/>
+        </p:nvSpPr>
+        <p:spPr>
+          <a:xfrm>
+            <a:off x="6371771" y="6154057"/>
+            <a:ext cx="5341014" cy="923330"/>
+          </a:xfrm>
+          <a:prstGeom prst="rect">
+            <a:avLst/>
+          </a:prstGeom>
+          <a:noFill/>
+        </p:spPr>
+        <p:txBody>
+          <a:bodyPr wrap="none" rtlCol="0">
+            <a:spAutoFit/>
+          </a:bodyPr>
+          <a:lstStyle/>
+          <a:p>
+            <a:pPr algn="l"/>
+            <a:r>
+              <a:rPr lang="fr-FR" dirty="0" err="1"/>
+              <a:t>From</a:t>
+            </a:r>
+            <a:r>
+              <a:rPr lang="fr-FR" dirty="0"/>
+              <a:t> </a:t>
+            </a:r>
+            <a:r>
+              <a:rPr lang="en-US" i="1" dirty="0"/>
+              <a:t>Intuitively Understanding the Cross Entropy Loss</a:t>
+            </a:r>
+          </a:p>
+          <a:p>
+            <a:r>
+              <a:rPr lang="en-US" dirty="0" err="1"/>
+              <a:t>Adian</a:t>
+            </a:r>
+            <a:r>
+              <a:rPr lang="en-US" dirty="0"/>
+              <a:t> </a:t>
+            </a:r>
+            <a:r>
+              <a:rPr lang="en-US" dirty="0" err="1"/>
+              <a:t>Liusie</a:t>
+            </a:r>
+            <a:r>
+              <a:rPr lang="en-US" dirty="0"/>
+              <a:t> 2021</a:t>
+            </a:r>
+            <a:br>
+              <a:rPr lang="en-US" dirty="0"/>
+            </a:br>
+            <a:endParaRPr lang="fr-FR" dirty="0"/>
+          </a:p>
+        </p:txBody>
+      </p:sp>
+    </p:spTree>
+    <p:extLst>
+      <p:ext uri="{BB962C8B-B14F-4D97-AF65-F5344CB8AC3E}">
+        <p14:creationId xmlns:p14="http://schemas.microsoft.com/office/powerpoint/2010/main" val="1799763827"/>
+      </p:ext>
+    </p:extLst>
+  </p:cSld>
+  <p:clrMapOvr>
+    <a:masterClrMapping/>
+  </p:clrMapOvr>
+  <mc:AlternateContent xmlns:mc="http://schemas.openxmlformats.org/markup-compatibility/2006">
+    <mc:Choice xmlns:p14="http://schemas.microsoft.com/office/powerpoint/2010/main" Requires="p14">
+      <p:transition spd="med" p14:dur="700">
+        <p:fade/>
+      </p:transition>
+    </mc:Choice>
+    <mc:Fallback>
+      <p:transition spd="med">
+        <p:fade/>
+      </p:transition>
+    </mc:Fallback>
+  </mc:AlternateContent>
 </p:sld>
 </file>
 

</xml_diff>

<commit_message>
Added 'Why momentum Works' playground link
</commit_message>
<xml_diff>
--- a/Slides_3.pptx
+++ b/Slides_3.pptx
@@ -7914,13 +7914,13 @@
   <p:clrMapOvr>
     <a:masterClrMapping/>
   </p:clrMapOvr>
-  <mc:AlternateContent xmlns:mc="http://schemas.openxmlformats.org/markup-compatibility/2006">
-    <mc:Choice xmlns:p14="http://schemas.microsoft.com/office/powerpoint/2010/main" Requires="p14">
+  <mc:AlternateContent xmlns:mc="http://schemas.openxmlformats.org/markup-compatibility/2006" xmlns:p14="http://schemas.microsoft.com/office/powerpoint/2010/main">
+    <mc:Choice Requires="p14">
       <p:transition spd="med" p14:dur="700">
         <p:fade/>
       </p:transition>
     </mc:Choice>
-    <mc:Fallback>
+    <mc:Fallback xmlns="">
       <p:transition spd="med">
         <p:fade/>
       </p:transition>
@@ -8268,13 +8268,13 @@
   <p:clrMapOvr>
     <a:masterClrMapping/>
   </p:clrMapOvr>
-  <mc:AlternateContent xmlns:mc="http://schemas.openxmlformats.org/markup-compatibility/2006">
-    <mc:Choice xmlns:p14="http://schemas.microsoft.com/office/powerpoint/2010/main" Requires="p14">
+  <mc:AlternateContent xmlns:mc="http://schemas.openxmlformats.org/markup-compatibility/2006" xmlns:p14="http://schemas.microsoft.com/office/powerpoint/2010/main">
+    <mc:Choice Requires="p14">
       <p:transition spd="med" p14:dur="700">
         <p:fade/>
       </p:transition>
     </mc:Choice>
-    <mc:Fallback>
+    <mc:Fallback xmlns="">
       <p:transition spd="med">
         <p:fade/>
       </p:transition>
@@ -8408,8 +8408,8 @@
           </a:prstGeom>
         </p:spPr>
       </p:pic>
-      <mc:AlternateContent xmlns:mc="http://schemas.openxmlformats.org/markup-compatibility/2006">
-        <mc:Choice xmlns:a14="http://schemas.microsoft.com/office/drawing/2010/main" Requires="a14">
+      <mc:AlternateContent xmlns:mc="http://schemas.openxmlformats.org/markup-compatibility/2006" xmlns:a14="http://schemas.microsoft.com/office/drawing/2010/main">
+        <mc:Choice Requires="a14">
           <p:sp>
             <p:nvSpPr>
               <p:cNvPr id="11" name="TextBox 10">
@@ -8773,7 +8773,7 @@
             </p:txBody>
           </p:sp>
         </mc:Choice>
-        <mc:Fallback>
+        <mc:Fallback xmlns="">
           <p:sp>
             <p:nvSpPr>
               <p:cNvPr id="11" name="TextBox 10">
@@ -8933,13 +8933,13 @@
   <p:clrMapOvr>
     <a:masterClrMapping/>
   </p:clrMapOvr>
-  <mc:AlternateContent xmlns:mc="http://schemas.openxmlformats.org/markup-compatibility/2006">
-    <mc:Choice xmlns:p14="http://schemas.microsoft.com/office/powerpoint/2010/main" Requires="p14">
+  <mc:AlternateContent xmlns:mc="http://schemas.openxmlformats.org/markup-compatibility/2006" xmlns:p14="http://schemas.microsoft.com/office/powerpoint/2010/main">
+    <mc:Choice Requires="p14">
       <p:transition spd="med" p14:dur="700">
         <p:fade/>
       </p:transition>
     </mc:Choice>
-    <mc:Fallback>
+    <mc:Fallback xmlns="">
       <p:transition spd="med">
         <p:fade/>
       </p:transition>
@@ -9164,8 +9164,8 @@
             <a:chExt cx="6753960" cy="1299960"/>
           </a:xfrm>
         </p:grpSpPr>
-        <mc:AlternateContent xmlns:mc="http://schemas.openxmlformats.org/markup-compatibility/2006">
-          <mc:Choice xmlns:p14="http://schemas.microsoft.com/office/powerpoint/2010/main" Requires="p14">
+        <mc:AlternateContent xmlns:mc="http://schemas.openxmlformats.org/markup-compatibility/2006" xmlns:p14="http://schemas.microsoft.com/office/powerpoint/2010/main">
+          <mc:Choice Requires="p14">
             <p:contentPart p14:bwMode="auto" r:id="rId4">
               <p14:nvContentPartPr>
                 <p14:cNvPr id="12" name="Ink 11">
@@ -9184,7 +9184,7 @@
               </p14:xfrm>
             </p:contentPart>
           </mc:Choice>
-          <mc:Fallback>
+          <mc:Fallback xmlns="">
             <p:pic>
               <p:nvPicPr>
                 <p:cNvPr id="12" name="Ink 11">
@@ -9215,8 +9215,8 @@
             </p:pic>
           </mc:Fallback>
         </mc:AlternateContent>
-        <mc:AlternateContent xmlns:mc="http://schemas.openxmlformats.org/markup-compatibility/2006">
-          <mc:Choice xmlns:p14="http://schemas.microsoft.com/office/powerpoint/2010/main" Requires="p14">
+        <mc:AlternateContent xmlns:mc="http://schemas.openxmlformats.org/markup-compatibility/2006" xmlns:p14="http://schemas.microsoft.com/office/powerpoint/2010/main">
+          <mc:Choice Requires="p14">
             <p:contentPart p14:bwMode="auto" r:id="rId6">
               <p14:nvContentPartPr>
                 <p14:cNvPr id="14" name="Ink 13">
@@ -9235,7 +9235,7 @@
               </p14:xfrm>
             </p:contentPart>
           </mc:Choice>
-          <mc:Fallback>
+          <mc:Fallback xmlns="">
             <p:pic>
               <p:nvPicPr>
                 <p:cNvPr id="14" name="Ink 13">
@@ -9266,8 +9266,8 @@
             </p:pic>
           </mc:Fallback>
         </mc:AlternateContent>
-        <mc:AlternateContent xmlns:mc="http://schemas.openxmlformats.org/markup-compatibility/2006">
-          <mc:Choice xmlns:p14="http://schemas.microsoft.com/office/powerpoint/2010/main" Requires="p14">
+        <mc:AlternateContent xmlns:mc="http://schemas.openxmlformats.org/markup-compatibility/2006" xmlns:p14="http://schemas.microsoft.com/office/powerpoint/2010/main">
+          <mc:Choice Requires="p14">
             <p:contentPart p14:bwMode="auto" r:id="rId8">
               <p14:nvContentPartPr>
                 <p14:cNvPr id="15" name="Ink 14">
@@ -9286,7 +9286,7 @@
               </p14:xfrm>
             </p:contentPart>
           </mc:Choice>
-          <mc:Fallback>
+          <mc:Fallback xmlns="">
             <p:pic>
               <p:nvPicPr>
                 <p:cNvPr id="15" name="Ink 14">
@@ -9328,13 +9328,13 @@
   <p:clrMapOvr>
     <a:masterClrMapping/>
   </p:clrMapOvr>
-  <mc:AlternateContent xmlns:mc="http://schemas.openxmlformats.org/markup-compatibility/2006">
-    <mc:Choice xmlns:p14="http://schemas.microsoft.com/office/powerpoint/2010/main" Requires="p14">
+  <mc:AlternateContent xmlns:mc="http://schemas.openxmlformats.org/markup-compatibility/2006" xmlns:p14="http://schemas.microsoft.com/office/powerpoint/2010/main">
+    <mc:Choice Requires="p14">
       <p:transition spd="med" p14:dur="700">
         <p:fade/>
       </p:transition>
     </mc:Choice>
-    <mc:Fallback>
+    <mc:Fallback xmlns="">
       <p:transition spd="med">
         <p:fade/>
       </p:transition>
@@ -9875,8 +9875,8 @@
           </a:p>
         </p:txBody>
       </p:sp>
-      <mc:AlternateContent xmlns:mc="http://schemas.openxmlformats.org/markup-compatibility/2006">
-        <mc:Choice xmlns:a14="http://schemas.microsoft.com/office/drawing/2010/main" Requires="a14">
+      <mc:AlternateContent xmlns:mc="http://schemas.openxmlformats.org/markup-compatibility/2006" xmlns:a14="http://schemas.microsoft.com/office/drawing/2010/main">
+        <mc:Choice Requires="a14">
           <p:sp>
             <p:nvSpPr>
               <p:cNvPr id="11" name="TextBox 10">
@@ -10170,7 +10170,7 @@
             </p:txBody>
           </p:sp>
         </mc:Choice>
-        <mc:Fallback>
+        <mc:Fallback xmlns="">
           <p:sp>
             <p:nvSpPr>
               <p:cNvPr id="11" name="TextBox 10">
@@ -10370,8 +10370,8 @@
             <a:chExt cx="624600" cy="726480"/>
           </a:xfrm>
         </p:grpSpPr>
-        <mc:AlternateContent xmlns:mc="http://schemas.openxmlformats.org/markup-compatibility/2006">
-          <mc:Choice xmlns:p14="http://schemas.microsoft.com/office/powerpoint/2010/main" Requires="p14">
+        <mc:AlternateContent xmlns:mc="http://schemas.openxmlformats.org/markup-compatibility/2006" xmlns:p14="http://schemas.microsoft.com/office/powerpoint/2010/main">
+          <mc:Choice Requires="p14">
             <p:contentPart p14:bwMode="auto" r:id="rId6">
               <p14:nvContentPartPr>
                 <p14:cNvPr id="4" name="Ink 3">
@@ -10390,7 +10390,7 @@
               </p14:xfrm>
             </p:contentPart>
           </mc:Choice>
-          <mc:Fallback>
+          <mc:Fallback xmlns="">
             <p:pic>
               <p:nvPicPr>
                 <p:cNvPr id="4" name="Ink 3">
@@ -10421,8 +10421,8 @@
             </p:pic>
           </mc:Fallback>
         </mc:AlternateContent>
-        <mc:AlternateContent xmlns:mc="http://schemas.openxmlformats.org/markup-compatibility/2006">
-          <mc:Choice xmlns:p14="http://schemas.microsoft.com/office/powerpoint/2010/main" Requires="p14">
+        <mc:AlternateContent xmlns:mc="http://schemas.openxmlformats.org/markup-compatibility/2006" xmlns:p14="http://schemas.microsoft.com/office/powerpoint/2010/main">
+          <mc:Choice Requires="p14">
             <p:contentPart p14:bwMode="auto" r:id="rId8">
               <p14:nvContentPartPr>
                 <p14:cNvPr id="6" name="Ink 5">
@@ -10441,7 +10441,7 @@
               </p14:xfrm>
             </p:contentPart>
           </mc:Choice>
-          <mc:Fallback>
+          <mc:Fallback xmlns="">
             <p:pic>
               <p:nvPicPr>
                 <p:cNvPr id="6" name="Ink 5">
@@ -10493,8 +10493,8 @@
             <a:chExt cx="1334160" cy="1050480"/>
           </a:xfrm>
         </p:grpSpPr>
-        <mc:AlternateContent xmlns:mc="http://schemas.openxmlformats.org/markup-compatibility/2006">
-          <mc:Choice xmlns:p14="http://schemas.microsoft.com/office/powerpoint/2010/main" Requires="p14">
+        <mc:AlternateContent xmlns:mc="http://schemas.openxmlformats.org/markup-compatibility/2006" xmlns:p14="http://schemas.microsoft.com/office/powerpoint/2010/main">
+          <mc:Choice Requires="p14">
             <p:contentPart p14:bwMode="auto" r:id="rId10">
               <p14:nvContentPartPr>
                 <p14:cNvPr id="10" name="Ink 9">
@@ -10513,7 +10513,7 @@
               </p14:xfrm>
             </p:contentPart>
           </mc:Choice>
-          <mc:Fallback>
+          <mc:Fallback xmlns="">
             <p:pic>
               <p:nvPicPr>
                 <p:cNvPr id="10" name="Ink 9">
@@ -10544,8 +10544,8 @@
             </p:pic>
           </mc:Fallback>
         </mc:AlternateContent>
-        <mc:AlternateContent xmlns:mc="http://schemas.openxmlformats.org/markup-compatibility/2006">
-          <mc:Choice xmlns:p14="http://schemas.microsoft.com/office/powerpoint/2010/main" Requires="p14">
+        <mc:AlternateContent xmlns:mc="http://schemas.openxmlformats.org/markup-compatibility/2006" xmlns:p14="http://schemas.microsoft.com/office/powerpoint/2010/main">
+          <mc:Choice Requires="p14">
             <p:contentPart p14:bwMode="auto" r:id="rId12">
               <p14:nvContentPartPr>
                 <p14:cNvPr id="12" name="Ink 11">
@@ -10564,7 +10564,7 @@
               </p14:xfrm>
             </p:contentPart>
           </mc:Choice>
-          <mc:Fallback>
+          <mc:Fallback xmlns="">
             <p:pic>
               <p:nvPicPr>
                 <p:cNvPr id="12" name="Ink 11">
@@ -10595,8 +10595,8 @@
             </p:pic>
           </mc:Fallback>
         </mc:AlternateContent>
-        <mc:AlternateContent xmlns:mc="http://schemas.openxmlformats.org/markup-compatibility/2006">
-          <mc:Choice xmlns:p14="http://schemas.microsoft.com/office/powerpoint/2010/main" Requires="p14">
+        <mc:AlternateContent xmlns:mc="http://schemas.openxmlformats.org/markup-compatibility/2006" xmlns:p14="http://schemas.microsoft.com/office/powerpoint/2010/main">
+          <mc:Choice Requires="p14">
             <p:contentPart p14:bwMode="auto" r:id="rId14">
               <p14:nvContentPartPr>
                 <p14:cNvPr id="15" name="Ink 14">
@@ -10615,7 +10615,7 @@
               </p14:xfrm>
             </p:contentPart>
           </mc:Choice>
-          <mc:Fallback>
+          <mc:Fallback xmlns="">
             <p:pic>
               <p:nvPicPr>
                 <p:cNvPr id="15" name="Ink 14">
@@ -10737,13 +10737,13 @@
   <p:clrMapOvr>
     <a:masterClrMapping/>
   </p:clrMapOvr>
-  <mc:AlternateContent xmlns:mc="http://schemas.openxmlformats.org/markup-compatibility/2006">
-    <mc:Choice xmlns:p14="http://schemas.microsoft.com/office/powerpoint/2010/main" Requires="p14">
+  <mc:AlternateContent xmlns:mc="http://schemas.openxmlformats.org/markup-compatibility/2006" xmlns:p14="http://schemas.microsoft.com/office/powerpoint/2010/main">
+    <mc:Choice Requires="p14">
       <p:transition spd="med" p14:dur="700">
         <p:fade/>
       </p:transition>
     </mc:Choice>
-    <mc:Fallback>
+    <mc:Fallback xmlns="">
       <p:transition spd="med">
         <p:fade/>
       </p:transition>
@@ -11024,13 +11024,13 @@
   <p:clrMapOvr>
     <a:masterClrMapping/>
   </p:clrMapOvr>
-  <mc:AlternateContent xmlns:mc="http://schemas.openxmlformats.org/markup-compatibility/2006">
-    <mc:Choice xmlns:p14="http://schemas.microsoft.com/office/powerpoint/2010/main" Requires="p14">
+  <mc:AlternateContent xmlns:mc="http://schemas.openxmlformats.org/markup-compatibility/2006" xmlns:p14="http://schemas.microsoft.com/office/powerpoint/2010/main">
+    <mc:Choice Requires="p14">
       <p:transition spd="med" p14:dur="700">
         <p:fade/>
       </p:transition>
     </mc:Choice>
-    <mc:Fallback>
+    <mc:Fallback xmlns="">
       <p:transition spd="med">
         <p:fade/>
       </p:transition>
@@ -14324,8 +14324,8 @@
           </a:p>
         </p:txBody>
       </p:sp>
-      <mc:AlternateContent xmlns:mc="http://schemas.openxmlformats.org/markup-compatibility/2006" xmlns:a14="http://schemas.microsoft.com/office/drawing/2010/main">
-        <mc:Choice Requires="a14">
+      <mc:AlternateContent xmlns:mc="http://schemas.openxmlformats.org/markup-compatibility/2006">
+        <mc:Choice xmlns:a14="http://schemas.microsoft.com/office/drawing/2010/main" Requires="a14">
           <p:sp>
             <p:nvSpPr>
               <p:cNvPr id="6" name="Content Placeholder 5">
@@ -14690,10 +14690,26 @@
                   <a:t>-&gt; New hyperparameter!</a:t>
                 </a:r>
               </a:p>
+              <a:p>
+                <a:pPr marL="0" indent="0" algn="just">
+                  <a:buNone/>
+                </a:pPr>
+                <a:r>
+                  <a:rPr lang="en-US" dirty="0"/>
+                  <a:t>-&gt; </a:t>
+                </a:r>
+                <a:r>
+                  <a:rPr lang="en-US" dirty="0">
+                    <a:hlinkClick r:id="rId3"/>
+                  </a:rPr>
+                  <a:t>Why momentum really works</a:t>
+                </a:r>
+                <a:endParaRPr lang="en-US" dirty="0"/>
+              </a:p>
             </p:txBody>
           </p:sp>
         </mc:Choice>
-        <mc:Fallback xmlns="">
+        <mc:Fallback>
           <p:sp>
             <p:nvSpPr>
               <p:cNvPr id="6" name="Content Placeholder 5">
@@ -14716,7 +14732,7 @@
                 <a:ext cx="10515600" cy="4538304"/>
               </a:xfrm>
               <a:blipFill>
-                <a:blip r:embed="rId3"/>
+                <a:blip r:embed="rId4"/>
                 <a:stretch>
                   <a:fillRect l="-1217"/>
                 </a:stretch>
@@ -14739,7 +14755,7 @@
       </mc:AlternateContent>
       <mc:AlternateContent xmlns:mc="http://schemas.openxmlformats.org/markup-compatibility/2006" xmlns:p14="http://schemas.microsoft.com/office/powerpoint/2010/main">
         <mc:Choice Requires="p14">
-          <p:contentPart p14:bwMode="auto" r:id="rId4">
+          <p:contentPart p14:bwMode="auto" r:id="rId5">
             <p14:nvContentPartPr>
               <p14:cNvPr id="13" name="Ink 12">
                 <a:extLst>
@@ -14771,7 +14787,7 @@
               <p:nvPr/>
             </p:nvPicPr>
             <p:blipFill>
-              <a:blip r:embed="rId5"/>
+              <a:blip r:embed="rId6"/>
               <a:stretch>
                 <a:fillRect/>
               </a:stretch>

</xml_diff>